<commit_message>
* Avanzando con la presentacion
</commit_message>
<xml_diff>
--- a/TesisPaper/Defensa/Biased Random Key Genetic Algorithm.pptx
+++ b/TesisPaper/Defensa/Biased Random Key Genetic Algorithm.pptx
@@ -14,13 +14,14 @@
     <p:sldId id="261" r:id="rId8"/>
     <p:sldId id="272" r:id="rId9"/>
     <p:sldId id="262" r:id="rId10"/>
-    <p:sldId id="263" r:id="rId11"/>
-    <p:sldId id="265" r:id="rId12"/>
-    <p:sldId id="266" r:id="rId13"/>
-    <p:sldId id="267" r:id="rId14"/>
-    <p:sldId id="268" r:id="rId15"/>
-    <p:sldId id="269" r:id="rId16"/>
-    <p:sldId id="270" r:id="rId17"/>
+    <p:sldId id="273" r:id="rId11"/>
+    <p:sldId id="263" r:id="rId12"/>
+    <p:sldId id="265" r:id="rId13"/>
+    <p:sldId id="274" r:id="rId14"/>
+    <p:sldId id="275" r:id="rId15"/>
+    <p:sldId id="268" r:id="rId16"/>
+    <p:sldId id="269" r:id="rId17"/>
+    <p:sldId id="270" r:id="rId18"/>
   </p:sldIdLst>
   <p:sldSz cx="9144000" cy="6858000" type="screen4x3"/>
   <p:notesSz cx="6858000" cy="9144000"/>
@@ -3287,397 +3288,39 @@
           </a:p>
         </p:txBody>
       </p:sp>
-      <p:sp>
-        <p:nvSpPr>
-          <p:cNvPr id="3" name="Content Placeholder 2"/>
-          <p:cNvSpPr>
-            <a:spLocks noGrp="1"/>
-          </p:cNvSpPr>
+      <p:pic>
+        <p:nvPicPr>
+          <p:cNvPr id="8" name="Content Placeholder 7"/>
+          <p:cNvPicPr>
+            <a:picLocks noGrp="1" noChangeAspect="1"/>
+          </p:cNvPicPr>
           <p:nvPr>
             <p:ph idx="1"/>
           </p:nvPr>
-        </p:nvSpPr>
+        </p:nvPicPr>
+        <p:blipFill>
+          <a:blip r:embed="rId2" cstate="print">
+            <a:extLst>
+              <a:ext uri="{28A0092B-C50C-407E-A947-70E740481C1C}">
+                <a14:useLocalDpi xmlns:a14="http://schemas.microsoft.com/office/drawing/2010/main" val="0"/>
+              </a:ext>
+            </a:extLst>
+          </a:blip>
+          <a:stretch>
+            <a:fillRect/>
+          </a:stretch>
+        </p:blipFill>
         <p:spPr>
           <a:xfrm>
-            <a:off x="457200" y="908720"/>
-            <a:ext cx="8229600" cy="5217443"/>
+            <a:off x="1331640" y="764704"/>
+            <a:ext cx="6662973" cy="5953253"/>
           </a:xfrm>
         </p:spPr>
-        <p:txBody>
-          <a:bodyPr>
-            <a:normAutofit/>
-          </a:bodyPr>
-          <a:lstStyle/>
-          <a:p>
-            <a:r>
-              <a:rPr lang="en-US" sz="2000" dirty="0" err="1" smtClean="0"/>
-              <a:t>Inicializacion</a:t>
-            </a:r>
-            <a:r>
-              <a:rPr lang="en-US" sz="2000" dirty="0" smtClean="0"/>
-              <a:t> de la </a:t>
-            </a:r>
-            <a:r>
-              <a:rPr lang="en-US" sz="2000" dirty="0" err="1" smtClean="0"/>
-              <a:t>Poblacion</a:t>
-            </a:r>
-            <a:endParaRPr lang="en-US" sz="2000" dirty="0" smtClean="0"/>
-          </a:p>
-          <a:p>
-            <a:pPr lvl="1"/>
-            <a:r>
-              <a:rPr lang="en-US" sz="1600" dirty="0" err="1" smtClean="0"/>
-              <a:t>Generacion</a:t>
-            </a:r>
-            <a:r>
-              <a:rPr lang="en-US" sz="1600" dirty="0" smtClean="0"/>
-              <a:t> de </a:t>
-            </a:r>
-            <a:r>
-              <a:rPr lang="en-US" sz="1600" dirty="0" err="1" smtClean="0"/>
-              <a:t>vectores</a:t>
-            </a:r>
-            <a:r>
-              <a:rPr lang="en-US" sz="1600" dirty="0" smtClean="0"/>
-              <a:t> de </a:t>
-            </a:r>
-            <a:r>
-              <a:rPr lang="en-US" sz="1600" dirty="0" err="1" smtClean="0"/>
-              <a:t>enteros</a:t>
-            </a:r>
-            <a:r>
-              <a:rPr lang="en-US" sz="1600" dirty="0" smtClean="0"/>
-              <a:t> </a:t>
-            </a:r>
-            <a:r>
-              <a:rPr lang="en-US" sz="1600" dirty="0" err="1" smtClean="0"/>
-              <a:t>aleatorios</a:t>
-            </a:r>
-            <a:endParaRPr lang="en-US" sz="1600" dirty="0" smtClean="0"/>
-          </a:p>
-          <a:p>
-            <a:r>
-              <a:rPr lang="en-US" sz="2000" dirty="0" err="1" smtClean="0"/>
-              <a:t>Decodificacion</a:t>
-            </a:r>
-            <a:r>
-              <a:rPr lang="en-US" sz="2000" dirty="0" smtClean="0"/>
-              <a:t> de la </a:t>
-            </a:r>
-            <a:r>
-              <a:rPr lang="en-US" sz="2000" dirty="0" err="1" smtClean="0"/>
-              <a:t>poblacion</a:t>
-            </a:r>
-            <a:endParaRPr lang="en-US" sz="2000" dirty="0" smtClean="0"/>
-          </a:p>
-          <a:p>
-            <a:pPr lvl="1"/>
-            <a:r>
-              <a:rPr lang="en-US" sz="1600" dirty="0" err="1" smtClean="0"/>
-              <a:t>Decodificacion</a:t>
-            </a:r>
-            <a:r>
-              <a:rPr lang="en-US" sz="1600" dirty="0" smtClean="0"/>
-              <a:t> de un vector de </a:t>
-            </a:r>
-            <a:r>
-              <a:rPr lang="en-US" sz="1600" dirty="0" err="1" smtClean="0"/>
-              <a:t>enteros</a:t>
-            </a:r>
-            <a:r>
-              <a:rPr lang="en-US" sz="1600" dirty="0" smtClean="0"/>
-              <a:t> en </a:t>
-            </a:r>
-            <a:r>
-              <a:rPr lang="en-US" sz="1600" dirty="0" err="1" smtClean="0"/>
-              <a:t>una</a:t>
-            </a:r>
-            <a:r>
-              <a:rPr lang="en-US" sz="1600" dirty="0" smtClean="0"/>
-              <a:t> </a:t>
-            </a:r>
-            <a:r>
-              <a:rPr lang="en-US" sz="1600" dirty="0" err="1" smtClean="0"/>
-              <a:t>solucion</a:t>
-            </a:r>
-            <a:r>
-              <a:rPr lang="en-US" sz="1600" dirty="0" smtClean="0"/>
-              <a:t> </a:t>
-            </a:r>
-            <a:r>
-              <a:rPr lang="en-US" sz="1600" dirty="0" err="1" smtClean="0"/>
-              <a:t>valida</a:t>
-            </a:r>
-            <a:r>
-              <a:rPr lang="en-US" sz="1600" dirty="0" smtClean="0"/>
-              <a:t> del </a:t>
-            </a:r>
-            <a:r>
-              <a:rPr lang="en-US" sz="1600" dirty="0" err="1" smtClean="0"/>
-              <a:t>problema</a:t>
-            </a:r>
-            <a:endParaRPr lang="en-US" sz="1600" dirty="0" smtClean="0"/>
-          </a:p>
-          <a:p>
-            <a:r>
-              <a:rPr lang="en-US" sz="2000" dirty="0" err="1" smtClean="0"/>
-              <a:t>Evolucion</a:t>
-            </a:r>
-            <a:r>
-              <a:rPr lang="en-US" sz="2000" dirty="0" smtClean="0"/>
-              <a:t> de </a:t>
-            </a:r>
-            <a:r>
-              <a:rPr lang="en-US" sz="2000" dirty="0" err="1" smtClean="0"/>
-              <a:t>poblacion</a:t>
-            </a:r>
-            <a:endParaRPr lang="en-US" sz="2000" dirty="0" smtClean="0"/>
-          </a:p>
-          <a:p>
-            <a:pPr lvl="1"/>
-            <a:r>
-              <a:rPr lang="en-US" sz="1600" dirty="0" err="1" smtClean="0"/>
-              <a:t>Ordenamiento</a:t>
-            </a:r>
-            <a:r>
-              <a:rPr lang="en-US" sz="1600" dirty="0" smtClean="0"/>
-              <a:t> </a:t>
-            </a:r>
-            <a:r>
-              <a:rPr lang="en-US" sz="1600" dirty="0" err="1" smtClean="0"/>
-              <a:t>por</a:t>
-            </a:r>
-            <a:r>
-              <a:rPr lang="en-US" sz="1600" dirty="0" smtClean="0"/>
-              <a:t> </a:t>
-            </a:r>
-            <a:r>
-              <a:rPr lang="en-US" sz="1600" dirty="0" err="1" smtClean="0"/>
-              <a:t>aptitud</a:t>
-            </a:r>
-            <a:r>
-              <a:rPr lang="en-US" sz="1600" dirty="0" smtClean="0"/>
-              <a:t> </a:t>
-            </a:r>
-            <a:r>
-              <a:rPr lang="en-US" sz="1600" dirty="0" err="1" smtClean="0"/>
-              <a:t>fisica</a:t>
-            </a:r>
-            <a:endParaRPr lang="en-US" sz="1600" dirty="0" smtClean="0"/>
-          </a:p>
-          <a:p>
-            <a:pPr lvl="1"/>
-            <a:r>
-              <a:rPr lang="en-US" sz="1600" dirty="0" smtClean="0"/>
-              <a:t>Elites </a:t>
-            </a:r>
-            <a:r>
-              <a:rPr lang="en-US" sz="1600" dirty="0" err="1" smtClean="0"/>
-              <a:t>pasan</a:t>
-            </a:r>
-            <a:r>
-              <a:rPr lang="en-US" sz="1600" dirty="0" smtClean="0"/>
-              <a:t> </a:t>
-            </a:r>
-            <a:r>
-              <a:rPr lang="en-US" sz="1600" dirty="0" err="1" smtClean="0"/>
-              <a:t>directo</a:t>
-            </a:r>
-            <a:r>
-              <a:rPr lang="en-US" sz="1600" dirty="0" smtClean="0"/>
-              <a:t> a la </a:t>
-            </a:r>
-            <a:r>
-              <a:rPr lang="en-US" sz="1600" dirty="0" err="1" smtClean="0"/>
-              <a:t>siguiente</a:t>
-            </a:r>
-            <a:r>
-              <a:rPr lang="en-US" sz="1600" dirty="0" smtClean="0"/>
-              <a:t> </a:t>
-            </a:r>
-            <a:r>
-              <a:rPr lang="en-US" sz="1600" dirty="0" err="1" smtClean="0"/>
-              <a:t>generacion</a:t>
-            </a:r>
-            <a:endParaRPr lang="en-US" sz="1600" dirty="0" smtClean="0"/>
-          </a:p>
-          <a:p>
-            <a:pPr lvl="1"/>
-            <a:r>
-              <a:rPr lang="en-US" sz="1600" dirty="0" smtClean="0"/>
-              <a:t>Crossover entre elites y no elites</a:t>
-            </a:r>
-          </a:p>
-          <a:p>
-            <a:pPr lvl="1"/>
-            <a:r>
-              <a:rPr lang="en-US" sz="1600" dirty="0" err="1" smtClean="0"/>
-              <a:t>Geneacion</a:t>
-            </a:r>
-            <a:r>
-              <a:rPr lang="en-US" sz="1600" dirty="0" smtClean="0"/>
-              <a:t> de </a:t>
-            </a:r>
-            <a:r>
-              <a:rPr lang="en-US" sz="1600" dirty="0" err="1" smtClean="0"/>
-              <a:t>mutantes</a:t>
-            </a:r>
-            <a:endParaRPr lang="en-US" sz="1600" dirty="0" smtClean="0"/>
-          </a:p>
-          <a:p>
-            <a:r>
-              <a:rPr lang="en-US" sz="2000" dirty="0" err="1" smtClean="0"/>
-              <a:t>Busquedas</a:t>
-            </a:r>
-            <a:r>
-              <a:rPr lang="en-US" sz="2000" dirty="0" smtClean="0"/>
-              <a:t> locales a </a:t>
-            </a:r>
-            <a:r>
-              <a:rPr lang="en-US" sz="2000" dirty="0" err="1" smtClean="0"/>
-              <a:t>mejor</a:t>
-            </a:r>
-            <a:r>
-              <a:rPr lang="en-US" sz="2000" dirty="0" smtClean="0"/>
-              <a:t> </a:t>
-            </a:r>
-            <a:r>
-              <a:rPr lang="en-US" sz="2000" dirty="0" err="1" smtClean="0"/>
-              <a:t>solucion</a:t>
-            </a:r>
-            <a:endParaRPr lang="en-US" sz="2000" dirty="0" smtClean="0"/>
-          </a:p>
-          <a:p>
-            <a:pPr lvl="1"/>
-            <a:r>
-              <a:rPr lang="en-US" sz="1600" dirty="0" smtClean="0"/>
-              <a:t>Insert, Replace Simple, Replace multiple, Swap, 2-opt</a:t>
-            </a:r>
-          </a:p>
-          <a:p>
-            <a:pPr lvl="1"/>
-            <a:r>
-              <a:rPr lang="en-US" sz="1600" dirty="0" err="1" smtClean="0"/>
-              <a:t>Actualizacion</a:t>
-            </a:r>
-            <a:r>
-              <a:rPr lang="en-US" sz="1600" dirty="0" smtClean="0"/>
-              <a:t> de </a:t>
-            </a:r>
-            <a:r>
-              <a:rPr lang="en-US" sz="1600" dirty="0" err="1" smtClean="0"/>
-              <a:t>su</a:t>
-            </a:r>
-            <a:r>
-              <a:rPr lang="en-US" sz="1600" dirty="0" smtClean="0"/>
-              <a:t> </a:t>
-            </a:r>
-            <a:r>
-              <a:rPr lang="en-US" sz="1600" dirty="0" err="1" smtClean="0"/>
-              <a:t>codigo</a:t>
-            </a:r>
-            <a:r>
-              <a:rPr lang="en-US" sz="1600" dirty="0" smtClean="0"/>
-              <a:t> </a:t>
-            </a:r>
-            <a:r>
-              <a:rPr lang="en-US" sz="1600" dirty="0" err="1" smtClean="0"/>
-              <a:t>genetico</a:t>
-            </a:r>
-            <a:endParaRPr lang="en-US" sz="1600" dirty="0" smtClean="0"/>
-          </a:p>
-          <a:p>
-            <a:r>
-              <a:rPr lang="en-US" sz="2000" dirty="0" err="1" smtClean="0"/>
-              <a:t>Evaluacion</a:t>
-            </a:r>
-            <a:r>
-              <a:rPr lang="en-US" sz="2000" dirty="0" smtClean="0"/>
-              <a:t> de </a:t>
-            </a:r>
-            <a:r>
-              <a:rPr lang="en-US" sz="2000" dirty="0" err="1" smtClean="0"/>
-              <a:t>condicion</a:t>
-            </a:r>
-            <a:r>
-              <a:rPr lang="en-US" sz="2000" dirty="0" smtClean="0"/>
-              <a:t> de </a:t>
-            </a:r>
-            <a:r>
-              <a:rPr lang="en-US" sz="2000" dirty="0" err="1" smtClean="0"/>
-              <a:t>corte</a:t>
-            </a:r>
-            <a:endParaRPr lang="en-US" sz="2000" dirty="0" smtClean="0"/>
-          </a:p>
-          <a:p>
-            <a:pPr lvl="1"/>
-            <a:r>
-              <a:rPr lang="en-US" sz="1600" dirty="0" smtClean="0"/>
-              <a:t>Si no se </a:t>
-            </a:r>
-            <a:r>
-              <a:rPr lang="en-US" sz="1600" dirty="0" err="1" smtClean="0"/>
-              <a:t>cumple</a:t>
-            </a:r>
-            <a:r>
-              <a:rPr lang="en-US" sz="1600" dirty="0" smtClean="0"/>
-              <a:t>,  </a:t>
-            </a:r>
-            <a:r>
-              <a:rPr lang="en-US" sz="1600" dirty="0" err="1" smtClean="0"/>
-              <a:t>vuelve</a:t>
-            </a:r>
-            <a:r>
-              <a:rPr lang="en-US" sz="1600" dirty="0" smtClean="0"/>
-              <a:t> al </a:t>
-            </a:r>
-            <a:r>
-              <a:rPr lang="en-US" sz="1600" dirty="0" err="1" smtClean="0"/>
-              <a:t>paso</a:t>
-            </a:r>
-            <a:r>
-              <a:rPr lang="en-US" sz="1600" dirty="0" smtClean="0"/>
-              <a:t> de </a:t>
-            </a:r>
-            <a:r>
-              <a:rPr lang="en-US" sz="1600" dirty="0" err="1" smtClean="0"/>
-              <a:t>decodificacion</a:t>
-            </a:r>
-            <a:endParaRPr lang="en-US" sz="1600" dirty="0" smtClean="0"/>
-          </a:p>
-          <a:p>
-            <a:r>
-              <a:rPr lang="en-US" sz="2000" dirty="0" err="1" smtClean="0"/>
-              <a:t>Retorno</a:t>
-            </a:r>
-            <a:r>
-              <a:rPr lang="en-US" sz="2000" dirty="0" smtClean="0"/>
-              <a:t> de la </a:t>
-            </a:r>
-            <a:r>
-              <a:rPr lang="en-US" sz="2000" dirty="0" err="1" smtClean="0"/>
-              <a:t>mejor</a:t>
-            </a:r>
-            <a:r>
-              <a:rPr lang="en-US" sz="2000" dirty="0" smtClean="0"/>
-              <a:t> </a:t>
-            </a:r>
-            <a:r>
-              <a:rPr lang="en-US" sz="2000" dirty="0" err="1" smtClean="0"/>
-              <a:t>solucion</a:t>
-            </a:r>
-            <a:endParaRPr lang="en-US" sz="2000" dirty="0" smtClean="0"/>
-          </a:p>
-          <a:p>
-            <a:pPr lvl="1"/>
-            <a:endParaRPr lang="es-AR" sz="1600" dirty="0"/>
-          </a:p>
-        </p:txBody>
-      </p:sp>
+      </p:pic>
     </p:spTree>
     <p:extLst>
       <p:ext uri="{BB962C8B-B14F-4D97-AF65-F5344CB8AC3E}">
-        <p14:creationId xmlns:p14="http://schemas.microsoft.com/office/powerpoint/2010/main" val="604376514"/>
+        <p14:creationId xmlns:p14="http://schemas.microsoft.com/office/powerpoint/2010/main" val="3867251395"/>
       </p:ext>
     </p:extLst>
   </p:cSld>
@@ -3766,44 +3409,211 @@
           <a:lstStyle/>
           <a:p>
             <a:r>
+              <a:rPr lang="en-US" sz="2800" dirty="0" err="1" smtClean="0"/>
+              <a:t>Generación</a:t>
+            </a:r>
+            <a:r>
+              <a:rPr lang="en-US" sz="2800" dirty="0" smtClean="0"/>
+              <a:t> de la </a:t>
+            </a:r>
+            <a:r>
+              <a:rPr lang="en-US" sz="2800" dirty="0" err="1" smtClean="0"/>
+              <a:t>población</a:t>
+            </a:r>
+            <a:r>
+              <a:rPr lang="en-US" sz="2800" dirty="0" smtClean="0"/>
+              <a:t> </a:t>
+            </a:r>
+            <a:r>
+              <a:rPr lang="en-US" sz="2800" dirty="0" err="1" smtClean="0"/>
+              <a:t>inicial</a:t>
+            </a:r>
+            <a:endParaRPr lang="en-US" sz="2800" dirty="0" smtClean="0"/>
+          </a:p>
+          <a:p>
+            <a:pPr lvl="1">
+              <a:buFont typeface="Wingdings" pitchFamily="2" charset="2"/>
+              <a:buChar char="§"/>
+            </a:pPr>
+            <a:r>
+              <a:rPr lang="en-US" sz="2000" dirty="0" smtClean="0"/>
+              <a:t>Se </a:t>
+            </a:r>
+            <a:r>
+              <a:rPr lang="en-US" sz="2000" dirty="0" err="1" smtClean="0"/>
+              <a:t>crea</a:t>
+            </a:r>
+            <a:r>
+              <a:rPr lang="en-US" sz="2000" dirty="0" smtClean="0"/>
+              <a:t> </a:t>
+            </a:r>
+            <a:r>
+              <a:rPr lang="en-US" sz="2000" dirty="0" err="1" smtClean="0"/>
+              <a:t>una</a:t>
+            </a:r>
+            <a:r>
+              <a:rPr lang="en-US" sz="2000" dirty="0" smtClean="0"/>
+              <a:t> </a:t>
+            </a:r>
+            <a:r>
+              <a:rPr lang="en-US" sz="2000" dirty="0" err="1" smtClean="0"/>
+              <a:t>cantidad</a:t>
+            </a:r>
+            <a:r>
+              <a:rPr lang="en-US" sz="2000" dirty="0" smtClean="0"/>
+              <a:t> de </a:t>
+            </a:r>
+            <a:r>
+              <a:rPr lang="en-US" sz="2000" dirty="0" err="1" smtClean="0"/>
+              <a:t>vectores</a:t>
+            </a:r>
+            <a:r>
+              <a:rPr lang="en-US" sz="2000" dirty="0" smtClean="0"/>
+              <a:t> de </a:t>
+            </a:r>
+            <a:r>
+              <a:rPr lang="en-US" sz="2000" dirty="0" err="1" smtClean="0"/>
+              <a:t>enteros</a:t>
+            </a:r>
+            <a:r>
+              <a:rPr lang="en-US" sz="2000" dirty="0" smtClean="0"/>
+              <a:t> </a:t>
+            </a:r>
+            <a:r>
+              <a:rPr lang="en-US" sz="2000" dirty="0" err="1" smtClean="0"/>
+              <a:t>aleatorios</a:t>
+            </a:r>
+            <a:r>
+              <a:rPr lang="en-US" sz="2000" dirty="0" smtClean="0"/>
+              <a:t> </a:t>
+            </a:r>
+            <a:r>
+              <a:rPr lang="en-US" sz="2000" dirty="0" err="1" smtClean="0"/>
+              <a:t>igual</a:t>
+            </a:r>
+            <a:r>
+              <a:rPr lang="en-US" sz="2000" dirty="0" smtClean="0"/>
+              <a:t> a la </a:t>
+            </a:r>
+            <a:r>
+              <a:rPr lang="en-US" sz="2000" dirty="0" err="1" smtClean="0"/>
+              <a:t>cantidad</a:t>
+            </a:r>
+            <a:r>
+              <a:rPr lang="en-US" sz="2000" dirty="0" smtClean="0"/>
+              <a:t> de  </a:t>
+            </a:r>
+            <a:r>
+              <a:rPr lang="en-US" sz="2000" dirty="0" err="1" smtClean="0"/>
+              <a:t>soluciones</a:t>
+            </a:r>
+            <a:r>
+              <a:rPr lang="en-US" sz="2000" dirty="0" smtClean="0"/>
+              <a:t> </a:t>
+            </a:r>
+            <a:r>
+              <a:rPr lang="en-US" sz="2000" dirty="0" err="1" smtClean="0"/>
+              <a:t>por</a:t>
+            </a:r>
+            <a:r>
+              <a:rPr lang="en-US" sz="2000" dirty="0" smtClean="0"/>
+              <a:t> </a:t>
+            </a:r>
+            <a:r>
+              <a:rPr lang="en-US" sz="2000" dirty="0" err="1" smtClean="0"/>
+              <a:t>generacion</a:t>
+            </a:r>
+            <a:r>
+              <a:rPr lang="en-US" sz="2000" dirty="0" smtClean="0"/>
+              <a:t> </a:t>
+            </a:r>
+            <a:r>
+              <a:rPr lang="en-US" sz="2000" dirty="0" err="1" smtClean="0"/>
+              <a:t>que</a:t>
+            </a:r>
+            <a:r>
+              <a:rPr lang="en-US" sz="2000" dirty="0" smtClean="0"/>
+              <a:t> se </a:t>
+            </a:r>
+            <a:r>
+              <a:rPr lang="en-US" sz="2000" dirty="0" err="1" smtClean="0"/>
+              <a:t>desea</a:t>
+            </a:r>
+            <a:endParaRPr lang="en-US" sz="2400" dirty="0" smtClean="0"/>
+          </a:p>
+          <a:p>
+            <a:r>
+              <a:rPr lang="en-US" sz="2800" dirty="0" err="1" smtClean="0"/>
+              <a:t>Decodificación</a:t>
+            </a:r>
+            <a:r>
+              <a:rPr lang="en-US" sz="2800" dirty="0" smtClean="0"/>
+              <a:t> </a:t>
+            </a:r>
+            <a:r>
+              <a:rPr lang="en-US" sz="2800" dirty="0" smtClean="0"/>
+              <a:t>de la </a:t>
+            </a:r>
+            <a:r>
+              <a:rPr lang="en-US" sz="2800" dirty="0" err="1" smtClean="0"/>
+              <a:t>población</a:t>
+            </a:r>
+            <a:endParaRPr lang="en-US" sz="2800" dirty="0" smtClean="0"/>
+          </a:p>
+          <a:p>
+            <a:pPr lvl="1">
+              <a:buFont typeface="Wingdings" pitchFamily="2" charset="2"/>
+              <a:buChar char="§"/>
+            </a:pPr>
+            <a:r>
+              <a:rPr lang="en-US" sz="2000" dirty="0" err="1" smtClean="0"/>
+              <a:t>Orden</a:t>
+            </a:r>
+            <a:r>
+              <a:rPr lang="en-US" sz="2000" dirty="0" smtClean="0"/>
+              <a:t> en </a:t>
+            </a:r>
+            <a:r>
+              <a:rPr lang="en-US" sz="2000" dirty="0" err="1" smtClean="0"/>
+              <a:t>que</a:t>
+            </a:r>
+            <a:r>
+              <a:rPr lang="en-US" sz="2000" dirty="0" smtClean="0"/>
+              <a:t> se </a:t>
+            </a:r>
+            <a:r>
+              <a:rPr lang="en-US" sz="2000" dirty="0" err="1" smtClean="0"/>
+              <a:t>seleccionan</a:t>
+            </a:r>
+            <a:r>
+              <a:rPr lang="en-US" sz="2000" dirty="0" smtClean="0"/>
+              <a:t> los </a:t>
+            </a:r>
+            <a:r>
+              <a:rPr lang="en-US" sz="2000" dirty="0" err="1" smtClean="0"/>
+              <a:t>clientes</a:t>
+            </a:r>
+            <a:endParaRPr lang="en-US" sz="2000" dirty="0" smtClean="0"/>
+          </a:p>
+          <a:p>
+            <a:pPr lvl="1">
+              <a:buFont typeface="Wingdings" pitchFamily="2" charset="2"/>
+              <a:buChar char="§"/>
+            </a:pPr>
+            <a:r>
               <a:rPr lang="en-US" sz="2000" dirty="0" err="1" smtClean="0"/>
               <a:t>Decodificador</a:t>
             </a:r>
-            <a:endParaRPr lang="en-US" sz="2000" dirty="0"/>
-          </a:p>
-          <a:p>
-            <a:pPr lvl="1"/>
-            <a:r>
-              <a:rPr lang="en-US" sz="1600" dirty="0" err="1" smtClean="0"/>
-              <a:t>Orden</a:t>
-            </a:r>
-            <a:r>
-              <a:rPr lang="en-US" sz="1600" dirty="0" smtClean="0"/>
-              <a:t> en </a:t>
-            </a:r>
-            <a:r>
-              <a:rPr lang="en-US" sz="1600" dirty="0" err="1" smtClean="0"/>
-              <a:t>que</a:t>
-            </a:r>
-            <a:r>
-              <a:rPr lang="en-US" sz="1600" dirty="0" smtClean="0"/>
-              <a:t> se </a:t>
-            </a:r>
-            <a:r>
-              <a:rPr lang="en-US" sz="1600" dirty="0" err="1" smtClean="0"/>
-              <a:t>seleccionan</a:t>
-            </a:r>
-            <a:r>
-              <a:rPr lang="en-US" sz="1600" dirty="0" smtClean="0"/>
-              <a:t> los </a:t>
-            </a:r>
-            <a:r>
-              <a:rPr lang="en-US" sz="1600" dirty="0" err="1" smtClean="0"/>
-              <a:t>clientes</a:t>
-            </a:r>
-            <a:endParaRPr lang="en-US" sz="1600" dirty="0" smtClean="0"/>
-          </a:p>
-          <a:p>
+            <a:r>
+              <a:rPr lang="en-US" sz="2000" dirty="0" smtClean="0"/>
+              <a:t> Simple</a:t>
+            </a:r>
+          </a:p>
+          <a:p>
+            <a:pPr lvl="1">
+              <a:buFont typeface="Wingdings" pitchFamily="2" charset="2"/>
+              <a:buChar char="§"/>
+            </a:pPr>
             <a:r>
               <a:rPr lang="en-US" sz="2000" dirty="0" err="1" smtClean="0"/>
               <a:t>Decodificador</a:t>
@@ -3813,230 +3623,122 @@
               <a:t> </a:t>
             </a:r>
             <a:r>
-              <a:rPr lang="en-US" sz="2000" dirty="0" smtClean="0"/>
-              <a:t>Simple</a:t>
-            </a:r>
-          </a:p>
-          <a:p>
-            <a:pPr lvl="1"/>
-            <a:r>
-              <a:rPr lang="en-US" sz="1600" dirty="0" smtClean="0"/>
-              <a:t>Al </a:t>
-            </a:r>
-            <a:r>
-              <a:rPr lang="en-US" sz="1600" dirty="0" err="1" smtClean="0"/>
-              <a:t>encontrar</a:t>
-            </a:r>
-            <a:r>
-              <a:rPr lang="en-US" sz="1600" dirty="0" smtClean="0"/>
-              <a:t> un </a:t>
-            </a:r>
-            <a:r>
-              <a:rPr lang="en-US" sz="1600" dirty="0" err="1" smtClean="0"/>
-              <a:t>cliente</a:t>
-            </a:r>
-            <a:r>
-              <a:rPr lang="en-US" sz="1600" dirty="0" smtClean="0"/>
-              <a:t> </a:t>
-            </a:r>
-            <a:r>
-              <a:rPr lang="en-US" sz="1600" dirty="0" err="1" smtClean="0"/>
-              <a:t>que</a:t>
-            </a:r>
-            <a:r>
-              <a:rPr lang="en-US" sz="1600" dirty="0" smtClean="0"/>
-              <a:t> no </a:t>
-            </a:r>
-            <a:r>
-              <a:rPr lang="en-US" sz="1600" dirty="0" err="1" smtClean="0"/>
-              <a:t>puede</a:t>
-            </a:r>
-            <a:r>
-              <a:rPr lang="en-US" sz="1600" dirty="0" smtClean="0"/>
-              <a:t> </a:t>
-            </a:r>
-            <a:r>
-              <a:rPr lang="en-US" sz="1600" dirty="0" err="1" smtClean="0"/>
-              <a:t>ser</a:t>
-            </a:r>
-            <a:r>
-              <a:rPr lang="en-US" sz="1600" dirty="0" smtClean="0"/>
-              <a:t> </a:t>
-            </a:r>
-            <a:r>
-              <a:rPr lang="en-US" sz="1600" dirty="0" err="1" smtClean="0"/>
-              <a:t>asignado</a:t>
-            </a:r>
-            <a:r>
-              <a:rPr lang="en-US" sz="1600" dirty="0" smtClean="0"/>
-              <a:t>, </a:t>
-            </a:r>
-            <a:r>
-              <a:rPr lang="en-US" sz="1600" dirty="0" err="1" smtClean="0"/>
-              <a:t>cambiamos</a:t>
-            </a:r>
-            <a:r>
-              <a:rPr lang="en-US" sz="1600" dirty="0" smtClean="0"/>
-              <a:t> de </a:t>
-            </a:r>
-            <a:r>
-              <a:rPr lang="en-US" sz="1600" dirty="0" err="1" smtClean="0"/>
-              <a:t>vehículo</a:t>
-            </a:r>
-            <a:endParaRPr lang="en-US" sz="1600" dirty="0" smtClean="0"/>
-          </a:p>
-          <a:p>
-            <a:r>
-              <a:rPr lang="en-US" sz="2000" dirty="0" err="1" smtClean="0"/>
-              <a:t>Decodificador</a:t>
-            </a:r>
-            <a:r>
-              <a:rPr lang="en-US" sz="2000" dirty="0" smtClean="0"/>
-              <a:t> </a:t>
-            </a:r>
-            <a:r>
               <a:rPr lang="en-US" sz="2000" dirty="0" err="1" smtClean="0"/>
               <a:t>Goloso</a:t>
             </a:r>
             <a:endParaRPr lang="en-US" sz="2000" dirty="0" smtClean="0"/>
           </a:p>
           <a:p>
-            <a:pPr lvl="1"/>
-            <a:r>
-              <a:rPr lang="en-US" sz="1600" dirty="0" smtClean="0"/>
-              <a:t>Se </a:t>
-            </a:r>
-            <a:r>
-              <a:rPr lang="en-US" sz="1600" dirty="0" err="1" smtClean="0"/>
-              <a:t>prueban</a:t>
-            </a:r>
-            <a:r>
-              <a:rPr lang="en-US" sz="1600" dirty="0" smtClean="0"/>
-              <a:t> </a:t>
-            </a:r>
-            <a:r>
-              <a:rPr lang="en-US" sz="1600" dirty="0" err="1" smtClean="0"/>
-              <a:t>todos</a:t>
-            </a:r>
-            <a:r>
-              <a:rPr lang="en-US" sz="1600" dirty="0" smtClean="0"/>
-              <a:t> los </a:t>
-            </a:r>
-            <a:r>
-              <a:rPr lang="en-US" sz="1600" dirty="0" err="1" smtClean="0"/>
-              <a:t>clientes</a:t>
-            </a:r>
-            <a:r>
-              <a:rPr lang="en-US" sz="1600" dirty="0" smtClean="0"/>
-              <a:t> </a:t>
-            </a:r>
-            <a:r>
-              <a:rPr lang="en-US" sz="1600" dirty="0" err="1" smtClean="0"/>
-              <a:t>disponibleas</a:t>
-            </a:r>
-            <a:r>
-              <a:rPr lang="en-US" sz="1600" dirty="0" smtClean="0"/>
-              <a:t> </a:t>
-            </a:r>
-            <a:r>
-              <a:rPr lang="en-US" sz="1600" dirty="0" err="1" smtClean="0"/>
-              <a:t>para</a:t>
-            </a:r>
-            <a:r>
-              <a:rPr lang="en-US" sz="1600" dirty="0" smtClean="0"/>
-              <a:t> </a:t>
-            </a:r>
-            <a:r>
-              <a:rPr lang="en-US" sz="1600" dirty="0" err="1" smtClean="0"/>
-              <a:t>cada</a:t>
-            </a:r>
-            <a:r>
-              <a:rPr lang="en-US" sz="1600" dirty="0" smtClean="0"/>
-              <a:t> </a:t>
-            </a:r>
-            <a:r>
-              <a:rPr lang="en-US" sz="1600" dirty="0" err="1" smtClean="0"/>
-              <a:t>vehículo</a:t>
-            </a:r>
-            <a:r>
-              <a:rPr lang="en-US" sz="1600" dirty="0" smtClean="0"/>
-              <a:t> </a:t>
-            </a:r>
-            <a:r>
-              <a:rPr lang="en-US" sz="1600" dirty="0" err="1" smtClean="0"/>
-              <a:t>respetando</a:t>
-            </a:r>
-            <a:r>
-              <a:rPr lang="en-US" sz="1600" dirty="0" smtClean="0"/>
-              <a:t> </a:t>
-            </a:r>
-            <a:r>
-              <a:rPr lang="en-US" sz="1600" dirty="0" err="1" smtClean="0"/>
-              <a:t>orden</a:t>
-            </a:r>
-            <a:endParaRPr lang="en-US" sz="1600" dirty="0" smtClean="0"/>
-          </a:p>
-          <a:p>
-            <a:r>
-              <a:rPr lang="en-US" sz="2000" dirty="0" smtClean="0"/>
-              <a:t>TODO </a:t>
-            </a:r>
-            <a:r>
-              <a:rPr lang="en-US" sz="2000" dirty="0" err="1" smtClean="0"/>
-              <a:t>imagen</a:t>
-            </a:r>
-            <a:r>
-              <a:rPr lang="en-US" sz="2000" dirty="0" smtClean="0"/>
-              <a:t> con </a:t>
-            </a:r>
-            <a:r>
-              <a:rPr lang="en-US" sz="2000" dirty="0" err="1" smtClean="0"/>
-              <a:t>asignacion</a:t>
-            </a:r>
-            <a:r>
-              <a:rPr lang="en-US" sz="2000" dirty="0" smtClean="0"/>
-              <a:t> de </a:t>
-            </a:r>
-            <a:r>
-              <a:rPr lang="en-US" sz="2000" dirty="0" err="1" smtClean="0"/>
-              <a:t>clientes</a:t>
-            </a:r>
-            <a:r>
-              <a:rPr lang="en-US" sz="2000" dirty="0" smtClean="0"/>
-              <a:t> </a:t>
-            </a:r>
-            <a:r>
-              <a:rPr lang="en-US" sz="2000" dirty="0" err="1" smtClean="0"/>
-              <a:t>segun</a:t>
-            </a:r>
-            <a:r>
-              <a:rPr lang="en-US" sz="2000" dirty="0" smtClean="0"/>
-              <a:t> </a:t>
-            </a:r>
-            <a:r>
-              <a:rPr lang="en-US" sz="2000" dirty="0" err="1" smtClean="0"/>
-              <a:t>alguno</a:t>
-            </a:r>
-            <a:r>
-              <a:rPr lang="en-US" sz="2000" dirty="0" smtClean="0"/>
-              <a:t> de los </a:t>
-            </a:r>
-            <a:r>
-              <a:rPr lang="en-US" sz="2000" dirty="0" err="1" smtClean="0"/>
-              <a:t>decos</a:t>
-            </a:r>
-            <a:endParaRPr lang="en-US" sz="2000" dirty="0" smtClean="0"/>
-          </a:p>
-          <a:p>
-            <a:pPr lvl="1"/>
-            <a:endParaRPr lang="es-AR" sz="1600" dirty="0"/>
-          </a:p>
-        </p:txBody>
-      </p:sp>
+            <a:pPr lvl="1">
+              <a:buFont typeface="Wingdings" pitchFamily="2" charset="2"/>
+              <a:buChar char="§"/>
+            </a:pPr>
+            <a:r>
+              <a:rPr lang="en-US" sz="2000" dirty="0" err="1" smtClean="0"/>
+              <a:t>Cada</a:t>
+            </a:r>
+            <a:r>
+              <a:rPr lang="en-US" sz="2000" dirty="0" smtClean="0"/>
+              <a:t> vector </a:t>
+            </a:r>
+            <a:r>
+              <a:rPr lang="en-US" sz="2000" dirty="0" smtClean="0"/>
+              <a:t>de </a:t>
+            </a:r>
+            <a:r>
+              <a:rPr lang="en-US" sz="2000" dirty="0" err="1" smtClean="0"/>
+              <a:t>enteros</a:t>
+            </a:r>
+            <a:r>
+              <a:rPr lang="en-US" sz="2000" dirty="0" smtClean="0"/>
+              <a:t> </a:t>
+            </a:r>
+            <a:r>
+              <a:rPr lang="en-US" sz="2000" dirty="0" smtClean="0"/>
+              <a:t>se </a:t>
+            </a:r>
+            <a:r>
+              <a:rPr lang="en-US" sz="2000" dirty="0" err="1" smtClean="0"/>
+              <a:t>decodifica</a:t>
+            </a:r>
+            <a:r>
+              <a:rPr lang="en-US" sz="2000" dirty="0" smtClean="0"/>
+              <a:t> </a:t>
+            </a:r>
+            <a:r>
+              <a:rPr lang="en-US" sz="2000" dirty="0" smtClean="0"/>
+              <a:t>en </a:t>
+            </a:r>
+            <a:r>
+              <a:rPr lang="en-US" sz="2000" dirty="0" err="1" smtClean="0"/>
+              <a:t>una</a:t>
+            </a:r>
+            <a:r>
+              <a:rPr lang="en-US" sz="2000" dirty="0" smtClean="0"/>
+              <a:t> </a:t>
+            </a:r>
+            <a:r>
+              <a:rPr lang="en-US" sz="2000" dirty="0" err="1" smtClean="0"/>
+              <a:t>solución</a:t>
+            </a:r>
+            <a:r>
+              <a:rPr lang="en-US" sz="2000" dirty="0" smtClean="0"/>
+              <a:t> </a:t>
+            </a:r>
+            <a:r>
+              <a:rPr lang="en-US" sz="2000" dirty="0" err="1" smtClean="0"/>
+              <a:t>válida</a:t>
+            </a:r>
+            <a:r>
+              <a:rPr lang="en-US" sz="2000" dirty="0" smtClean="0"/>
+              <a:t> </a:t>
+            </a:r>
+            <a:r>
+              <a:rPr lang="en-US" sz="2000" dirty="0" smtClean="0"/>
+              <a:t>del </a:t>
+            </a:r>
+            <a:r>
+              <a:rPr lang="en-US" sz="2000" dirty="0" err="1" smtClean="0"/>
+              <a:t>problema</a:t>
+            </a:r>
+            <a:endParaRPr lang="es-AR" sz="2000" dirty="0"/>
+          </a:p>
+        </p:txBody>
+      </p:sp>
+      <p:pic>
+        <p:nvPicPr>
+          <p:cNvPr id="5" name="Picture 4"/>
+          <p:cNvPicPr>
+            <a:picLocks noChangeAspect="1"/>
+          </p:cNvPicPr>
+          <p:nvPr/>
+        </p:nvPicPr>
+        <p:blipFill>
+          <a:blip r:embed="rId2">
+            <a:extLst>
+              <a:ext uri="{28A0092B-C50C-407E-A947-70E740481C1C}">
+                <a14:useLocalDpi xmlns:a14="http://schemas.microsoft.com/office/drawing/2010/main" val="0"/>
+              </a:ext>
+            </a:extLst>
+          </a:blip>
+          <a:stretch>
+            <a:fillRect/>
+          </a:stretch>
+        </p:blipFill>
+        <p:spPr>
+          <a:xfrm>
+            <a:off x="27353" y="4365104"/>
+            <a:ext cx="9144000" cy="2310938"/>
+          </a:xfrm>
+          <a:prstGeom prst="rect">
+            <a:avLst/>
+          </a:prstGeom>
+        </p:spPr>
+      </p:pic>
     </p:spTree>
     <p:extLst>
       <p:ext uri="{BB962C8B-B14F-4D97-AF65-F5344CB8AC3E}">
-        <p14:creationId xmlns:p14="http://schemas.microsoft.com/office/powerpoint/2010/main" val="2391434657"/>
+        <p14:creationId xmlns:p14="http://schemas.microsoft.com/office/powerpoint/2010/main" val="604376514"/>
       </p:ext>
     </p:extLst>
   </p:cSld>
@@ -4120,409 +3822,261 @@
         </p:spPr>
         <p:txBody>
           <a:bodyPr>
-            <a:normAutofit/>
+            <a:normAutofit lnSpcReduction="10000"/>
           </a:bodyPr>
           <a:lstStyle/>
           <a:p>
-            <a:r>
-              <a:rPr lang="en-US" sz="2000" dirty="0" smtClean="0"/>
-              <a:t>Centro de </a:t>
-            </a:r>
-            <a:r>
-              <a:rPr lang="en-US" sz="2000" dirty="0" err="1" smtClean="0"/>
-              <a:t>Gravedad</a:t>
-            </a:r>
-            <a:endParaRPr lang="en-US" sz="2000" dirty="0" smtClean="0"/>
-          </a:p>
-          <a:p>
-            <a:pPr lvl="1"/>
-            <a:r>
-              <a:rPr lang="en-US" sz="1600" dirty="0" err="1" smtClean="0"/>
-              <a:t>Orden</a:t>
-            </a:r>
-            <a:r>
-              <a:rPr lang="en-US" sz="1600" dirty="0" smtClean="0"/>
-              <a:t> en </a:t>
-            </a:r>
-            <a:r>
-              <a:rPr lang="en-US" sz="1600" dirty="0" err="1" smtClean="0"/>
-              <a:t>que</a:t>
-            </a:r>
-            <a:r>
-              <a:rPr lang="en-US" sz="1600" dirty="0" smtClean="0"/>
-              <a:t> se  </a:t>
-            </a:r>
-            <a:r>
-              <a:rPr lang="en-US" sz="1600" dirty="0" err="1" smtClean="0"/>
-              <a:t>seleccionan</a:t>
-            </a:r>
-            <a:r>
-              <a:rPr lang="en-US" sz="1600" dirty="0" smtClean="0"/>
-              <a:t> los </a:t>
-            </a:r>
-            <a:r>
-              <a:rPr lang="en-US" sz="1600" dirty="0" err="1" smtClean="0"/>
-              <a:t>clientes</a:t>
-            </a:r>
-            <a:r>
-              <a:rPr lang="en-US" sz="1600" dirty="0" smtClean="0"/>
-              <a:t> no </a:t>
-            </a:r>
-            <a:r>
-              <a:rPr lang="en-US" sz="1600" dirty="0" err="1" smtClean="0"/>
-              <a:t>visitados</a:t>
-            </a:r>
-            <a:endParaRPr lang="en-US" sz="1600" dirty="0" smtClean="0"/>
-          </a:p>
-          <a:p>
-            <a:r>
-              <a:rPr lang="en-US" sz="2000" dirty="0" err="1" smtClean="0"/>
-              <a:t>Busquedas</a:t>
-            </a:r>
-            <a:r>
-              <a:rPr lang="en-US" sz="2000" dirty="0" smtClean="0"/>
-              <a:t> Locales</a:t>
-            </a:r>
-          </a:p>
-          <a:p>
-            <a:pPr lvl="1"/>
-            <a:r>
-              <a:rPr lang="en-US" sz="1600" dirty="0" err="1" smtClean="0"/>
-              <a:t>Aplica</a:t>
-            </a:r>
-            <a:r>
-              <a:rPr lang="en-US" sz="1600" dirty="0" smtClean="0"/>
-              <a:t> </a:t>
-            </a:r>
-            <a:r>
-              <a:rPr lang="en-US" sz="1600" dirty="0" err="1" smtClean="0"/>
-              <a:t>una</a:t>
-            </a:r>
-            <a:r>
-              <a:rPr lang="en-US" sz="1600" dirty="0" smtClean="0"/>
-              <a:t> </a:t>
-            </a:r>
-            <a:r>
-              <a:rPr lang="en-US" sz="1600" dirty="0" err="1" smtClean="0"/>
-              <a:t>secuencia</a:t>
-            </a:r>
-            <a:r>
-              <a:rPr lang="en-US" sz="1600" dirty="0" smtClean="0"/>
-              <a:t> de BL a </a:t>
-            </a:r>
-            <a:r>
-              <a:rPr lang="en-US" sz="1600" dirty="0" err="1" smtClean="0"/>
+            <a:endParaRPr lang="en-US" sz="2800" dirty="0" smtClean="0"/>
+          </a:p>
+          <a:p>
+            <a:endParaRPr lang="en-US" sz="2800" dirty="0"/>
+          </a:p>
+          <a:p>
+            <a:endParaRPr lang="en-US" sz="2800" dirty="0" smtClean="0"/>
+          </a:p>
+          <a:p>
+            <a:endParaRPr lang="en-US" sz="2800" dirty="0"/>
+          </a:p>
+          <a:p>
+            <a:r>
+              <a:rPr lang="en-US" sz="2800" dirty="0" err="1" smtClean="0"/>
+              <a:t>Evolución</a:t>
+            </a:r>
+            <a:r>
+              <a:rPr lang="en-US" sz="2800" dirty="0" smtClean="0"/>
+              <a:t> </a:t>
+            </a:r>
+            <a:r>
+              <a:rPr lang="en-US" sz="2800" dirty="0"/>
+              <a:t>de </a:t>
+            </a:r>
+            <a:r>
+              <a:rPr lang="en-US" sz="2800" dirty="0" err="1"/>
+              <a:t>población</a:t>
+            </a:r>
+            <a:endParaRPr lang="en-US" sz="2800" dirty="0"/>
+          </a:p>
+          <a:p>
+            <a:pPr lvl="1">
+              <a:buFont typeface="Wingdings" pitchFamily="2" charset="2"/>
+              <a:buChar char="§"/>
+            </a:pPr>
+            <a:r>
+              <a:rPr lang="en-US" sz="2000" dirty="0" err="1"/>
+              <a:t>Ordenamiento</a:t>
+            </a:r>
+            <a:r>
+              <a:rPr lang="en-US" sz="2000" dirty="0"/>
+              <a:t> de </a:t>
+            </a:r>
+            <a:r>
+              <a:rPr lang="en-US" sz="2000" dirty="0" err="1"/>
               <a:t>las</a:t>
             </a:r>
             <a:r>
-              <a:rPr lang="en-US" sz="1600" dirty="0" smtClean="0"/>
-              <a:t> </a:t>
-            </a:r>
-            <a:r>
-              <a:rPr lang="en-US" sz="1600" dirty="0" err="1" smtClean="0"/>
-              <a:t>mejores</a:t>
-            </a:r>
-            <a:r>
-              <a:rPr lang="en-US" sz="1600" dirty="0" smtClean="0"/>
-              <a:t> N </a:t>
-            </a:r>
-            <a:r>
-              <a:rPr lang="en-US" sz="1600" dirty="0" err="1" smtClean="0"/>
+              <a:rPr lang="en-US" sz="2000" dirty="0"/>
+              <a:t> </a:t>
+            </a:r>
+            <a:r>
+              <a:rPr lang="en-US" sz="2000" dirty="0" err="1"/>
               <a:t>soluciones</a:t>
             </a:r>
             <a:r>
-              <a:rPr lang="en-US" sz="1600" dirty="0" smtClean="0"/>
-              <a:t> en </a:t>
-            </a:r>
-            <a:r>
-              <a:rPr lang="en-US" sz="1600" dirty="0" err="1" smtClean="0"/>
-              <a:t>cada</a:t>
-            </a:r>
-            <a:r>
-              <a:rPr lang="en-US" sz="1600" dirty="0" smtClean="0"/>
-              <a:t> </a:t>
-            </a:r>
-            <a:r>
-              <a:rPr lang="en-US" sz="1600" dirty="0" err="1" smtClean="0"/>
-              <a:t>generacion</a:t>
-            </a:r>
-            <a:endParaRPr lang="en-US" sz="1600" dirty="0" smtClean="0"/>
-          </a:p>
-          <a:p>
-            <a:pPr lvl="1"/>
-            <a:r>
-              <a:rPr lang="en-US" sz="1600" dirty="0" smtClean="0"/>
-              <a:t>Swap: </a:t>
-            </a:r>
-            <a:r>
-              <a:rPr lang="en-US" sz="1600" dirty="0" err="1" smtClean="0"/>
-              <a:t>Intercambio</a:t>
-            </a:r>
-            <a:r>
-              <a:rPr lang="en-US" sz="1600" dirty="0" smtClean="0"/>
-              <a:t> de </a:t>
-            </a:r>
-            <a:r>
-              <a:rPr lang="en-US" sz="1600" dirty="0" err="1" smtClean="0"/>
-              <a:t>clientes</a:t>
-            </a:r>
-            <a:r>
-              <a:rPr lang="en-US" sz="1600" dirty="0" smtClean="0"/>
-              <a:t> entre </a:t>
-            </a:r>
-            <a:r>
-              <a:rPr lang="en-US" sz="1600" dirty="0" err="1" smtClean="0"/>
-              <a:t>distintos</a:t>
-            </a:r>
-            <a:r>
-              <a:rPr lang="en-US" sz="1600" dirty="0" smtClean="0"/>
-              <a:t> </a:t>
-            </a:r>
-            <a:r>
-              <a:rPr lang="en-US" sz="1600" dirty="0" err="1" smtClean="0"/>
-              <a:t>vehículos</a:t>
-            </a:r>
-            <a:endParaRPr lang="en-US" sz="1600" dirty="0" smtClean="0"/>
-          </a:p>
-          <a:p>
-            <a:pPr lvl="1"/>
-            <a:r>
-              <a:rPr lang="en-US" sz="1600" dirty="0" smtClean="0"/>
-              <a:t>2-Opt: </a:t>
-            </a:r>
-            <a:r>
-              <a:rPr lang="en-US" sz="1600" dirty="0" err="1" smtClean="0"/>
-              <a:t>Reordenamiento</a:t>
-            </a:r>
-            <a:r>
-              <a:rPr lang="en-US" sz="1600" dirty="0" smtClean="0"/>
-              <a:t> de </a:t>
-            </a:r>
-            <a:r>
-              <a:rPr lang="en-US" sz="1600" dirty="0" err="1" smtClean="0"/>
-              <a:t>clientes</a:t>
-            </a:r>
-            <a:r>
-              <a:rPr lang="en-US" sz="1600" dirty="0" smtClean="0"/>
-              <a:t> a </a:t>
-            </a:r>
-            <a:r>
-              <a:rPr lang="en-US" sz="1600" dirty="0" err="1" smtClean="0"/>
-              <a:t>visitar</a:t>
-            </a:r>
-            <a:r>
-              <a:rPr lang="en-US" sz="1600" dirty="0" smtClean="0"/>
-              <a:t> </a:t>
-            </a:r>
-            <a:r>
-              <a:rPr lang="en-US" sz="1600" dirty="0" err="1" smtClean="0"/>
+              <a:rPr lang="en-US" sz="2000" dirty="0"/>
+              <a:t> </a:t>
+            </a:r>
+            <a:r>
+              <a:rPr lang="en-US" sz="2000" dirty="0" err="1"/>
+              <a:t>por</a:t>
+            </a:r>
+            <a:r>
+              <a:rPr lang="en-US" sz="2000" dirty="0"/>
+              <a:t> </a:t>
+            </a:r>
+            <a:r>
+              <a:rPr lang="en-US" sz="2000" dirty="0" err="1"/>
+              <a:t>aptitud</a:t>
+            </a:r>
+            <a:r>
+              <a:rPr lang="en-US" sz="2000" dirty="0"/>
+              <a:t> </a:t>
+            </a:r>
+            <a:r>
+              <a:rPr lang="en-US" sz="2000" dirty="0" err="1"/>
+              <a:t>física</a:t>
+            </a:r>
+            <a:endParaRPr lang="en-US" sz="2000" dirty="0"/>
+          </a:p>
+          <a:p>
+            <a:pPr lvl="1">
+              <a:buFont typeface="Wingdings" pitchFamily="2" charset="2"/>
+              <a:buChar char="§"/>
+            </a:pPr>
+            <a:r>
+              <a:rPr lang="es-AR" sz="2000" dirty="0"/>
+              <a:t>Clasificación de las soluciones en elite o no-elite</a:t>
+            </a:r>
+            <a:endParaRPr lang="en-US" sz="2000" dirty="0"/>
+          </a:p>
+          <a:p>
+            <a:pPr lvl="1">
+              <a:buFont typeface="Wingdings" pitchFamily="2" charset="2"/>
+              <a:buChar char="§"/>
+            </a:pPr>
+            <a:r>
+              <a:rPr lang="es-AR" sz="2000" dirty="0"/>
+              <a:t>Soluciones de elite pasan directamente a la siguiente generación</a:t>
+            </a:r>
+            <a:endParaRPr lang="en-US" sz="2000" dirty="0"/>
+          </a:p>
+          <a:p>
+            <a:pPr lvl="1">
+              <a:buFont typeface="Wingdings" pitchFamily="2" charset="2"/>
+              <a:buChar char="§"/>
+            </a:pPr>
+            <a:r>
+              <a:rPr lang="es-AR" sz="2000" dirty="0"/>
+              <a:t>Generación de soluciones hijos utilizando el método de </a:t>
+            </a:r>
+            <a:r>
+              <a:rPr lang="es-AR" sz="2000" i="1" dirty="0"/>
+              <a:t>crossover</a:t>
+            </a:r>
+          </a:p>
+          <a:p>
+            <a:pPr lvl="1">
+              <a:buFont typeface="Wingdings" pitchFamily="2" charset="2"/>
+              <a:buChar char="§"/>
+            </a:pPr>
+            <a:r>
+              <a:rPr lang="en-US" sz="2000" dirty="0" smtClean="0"/>
+              <a:t>No se </a:t>
+            </a:r>
+            <a:r>
+              <a:rPr lang="en-US" sz="2000" dirty="0" err="1" smtClean="0"/>
+              <a:t>permiten</a:t>
+            </a:r>
+            <a:r>
+              <a:rPr lang="en-US" sz="2000" dirty="0" smtClean="0"/>
+              <a:t> </a:t>
+            </a:r>
+            <a:r>
+              <a:rPr lang="en-US" sz="2000" dirty="0" err="1" smtClean="0"/>
+              <a:t>soluciones</a:t>
+            </a:r>
+            <a:r>
+              <a:rPr lang="en-US" sz="2000" dirty="0" smtClean="0"/>
+              <a:t> </a:t>
+            </a:r>
+            <a:r>
+              <a:rPr lang="en-US" sz="2000" dirty="0" err="1" smtClean="0"/>
+              <a:t>repetidas</a:t>
+            </a:r>
+            <a:r>
+              <a:rPr lang="en-US" sz="2000" dirty="0" smtClean="0"/>
+              <a:t>, se </a:t>
+            </a:r>
+            <a:r>
+              <a:rPr lang="en-US" sz="2000" dirty="0" err="1" smtClean="0"/>
+              <a:t>utiliza</a:t>
+            </a:r>
+            <a:r>
+              <a:rPr lang="en-US" sz="2000" dirty="0" smtClean="0"/>
+              <a:t> el hash </a:t>
+            </a:r>
+            <a:r>
+              <a:rPr lang="en-US" sz="2000" dirty="0" err="1" smtClean="0"/>
               <a:t>para</a:t>
             </a:r>
             <a:r>
-              <a:rPr lang="en-US" sz="1600" dirty="0" smtClean="0"/>
-              <a:t> un </a:t>
-            </a:r>
-            <a:r>
-              <a:rPr lang="en-US" sz="1600" dirty="0" err="1" smtClean="0"/>
-              <a:t>vehículo</a:t>
-            </a:r>
-            <a:endParaRPr lang="en-US" sz="1600" dirty="0" smtClean="0"/>
-          </a:p>
-          <a:p>
-            <a:pPr lvl="1"/>
-            <a:r>
-              <a:rPr lang="en-US" sz="1600" dirty="0" smtClean="0"/>
-              <a:t>Insert: </a:t>
-            </a:r>
-            <a:r>
-              <a:rPr lang="en-US" sz="1600" dirty="0" err="1" smtClean="0"/>
-              <a:t>Insertar</a:t>
-            </a:r>
-            <a:r>
-              <a:rPr lang="en-US" sz="1600" dirty="0" smtClean="0"/>
-              <a:t> </a:t>
-            </a:r>
-            <a:r>
-              <a:rPr lang="en-US" sz="1600" dirty="0" err="1" smtClean="0"/>
-              <a:t>cliente</a:t>
-            </a:r>
-            <a:r>
-              <a:rPr lang="en-US" sz="1600" dirty="0" smtClean="0"/>
-              <a:t> no </a:t>
-            </a:r>
-            <a:r>
-              <a:rPr lang="en-US" sz="1600" dirty="0" err="1" smtClean="0"/>
-              <a:t>visitado</a:t>
-            </a:r>
-            <a:r>
-              <a:rPr lang="en-US" sz="1600" dirty="0" smtClean="0"/>
-              <a:t> en </a:t>
-            </a:r>
-            <a:r>
-              <a:rPr lang="en-US" sz="1600" dirty="0" err="1" smtClean="0"/>
-              <a:t>alguna</a:t>
-            </a:r>
-            <a:r>
-              <a:rPr lang="en-US" sz="1600" dirty="0" smtClean="0"/>
-              <a:t> </a:t>
-            </a:r>
-            <a:r>
-              <a:rPr lang="en-US" sz="1600" dirty="0" err="1" smtClean="0"/>
-              <a:t>ruta</a:t>
-            </a:r>
-            <a:endParaRPr lang="en-US" sz="1600" dirty="0" smtClean="0"/>
-          </a:p>
-          <a:p>
-            <a:pPr lvl="1"/>
-            <a:r>
-              <a:rPr lang="en-US" sz="1600" dirty="0" smtClean="0"/>
-              <a:t>Replace Simple: </a:t>
-            </a:r>
-            <a:r>
-              <a:rPr lang="en-US" sz="1600" dirty="0" err="1" smtClean="0"/>
-              <a:t>Insertar</a:t>
-            </a:r>
-            <a:r>
-              <a:rPr lang="en-US" sz="1600" dirty="0" smtClean="0"/>
-              <a:t> un </a:t>
-            </a:r>
-            <a:r>
-              <a:rPr lang="en-US" sz="1600" dirty="0" err="1" smtClean="0"/>
-              <a:t>cliente</a:t>
-            </a:r>
-            <a:r>
-              <a:rPr lang="en-US" sz="1600" dirty="0" smtClean="0"/>
-              <a:t> no </a:t>
-            </a:r>
-            <a:r>
-              <a:rPr lang="en-US" sz="1600" dirty="0" err="1" smtClean="0"/>
-              <a:t>visitado</a:t>
-            </a:r>
-            <a:r>
-              <a:rPr lang="en-US" sz="1600" dirty="0" smtClean="0"/>
-              <a:t> </a:t>
-            </a:r>
-            <a:r>
-              <a:rPr lang="en-US" sz="1600" dirty="0" err="1" smtClean="0"/>
-              <a:t>por</a:t>
-            </a:r>
-            <a:r>
-              <a:rPr lang="en-US" sz="1600" dirty="0" smtClean="0"/>
-              <a:t> </a:t>
-            </a:r>
-            <a:r>
-              <a:rPr lang="en-US" sz="1600" dirty="0" err="1" smtClean="0"/>
-              <a:t>uno</a:t>
-            </a:r>
-            <a:r>
-              <a:rPr lang="en-US" sz="1600" dirty="0" smtClean="0"/>
-              <a:t> </a:t>
-            </a:r>
-            <a:r>
-              <a:rPr lang="en-US" sz="1600" dirty="0" err="1" smtClean="0"/>
-              <a:t>visitado</a:t>
-            </a:r>
-            <a:r>
-              <a:rPr lang="en-US" sz="1600" dirty="0" smtClean="0"/>
-              <a:t> en </a:t>
-            </a:r>
-            <a:r>
-              <a:rPr lang="en-US" sz="1600" dirty="0" err="1" smtClean="0"/>
-              <a:t>alguna</a:t>
-            </a:r>
-            <a:r>
-              <a:rPr lang="en-US" sz="1600" dirty="0" smtClean="0"/>
-              <a:t> </a:t>
-            </a:r>
-            <a:r>
-              <a:rPr lang="en-US" sz="1600" dirty="0" err="1" smtClean="0"/>
-              <a:t>ruta</a:t>
-            </a:r>
-            <a:endParaRPr lang="en-US" sz="1600" dirty="0" smtClean="0"/>
-          </a:p>
-          <a:p>
-            <a:pPr lvl="1"/>
-            <a:r>
-              <a:rPr lang="en-US" sz="1600" dirty="0" smtClean="0"/>
-              <a:t>Replace Multiple: </a:t>
-            </a:r>
-            <a:r>
-              <a:rPr lang="en-US" sz="1600" dirty="0" err="1" smtClean="0"/>
-              <a:t>Insertar</a:t>
-            </a:r>
-            <a:r>
-              <a:rPr lang="en-US" sz="1600" dirty="0" smtClean="0"/>
-              <a:t> un </a:t>
-            </a:r>
-            <a:r>
-              <a:rPr lang="en-US" sz="1600" dirty="0" err="1" smtClean="0"/>
-              <a:t>cliente</a:t>
-            </a:r>
-            <a:r>
-              <a:rPr lang="en-US" sz="1600" dirty="0" smtClean="0"/>
-              <a:t> no </a:t>
-            </a:r>
-            <a:r>
-              <a:rPr lang="en-US" sz="1600" dirty="0" err="1" smtClean="0"/>
-              <a:t>visitado</a:t>
-            </a:r>
-            <a:r>
-              <a:rPr lang="en-US" sz="1600" dirty="0" smtClean="0"/>
-              <a:t> </a:t>
-            </a:r>
-            <a:r>
-              <a:rPr lang="en-US" sz="1600" dirty="0" err="1" smtClean="0"/>
-              <a:t>por</a:t>
-            </a:r>
-            <a:r>
-              <a:rPr lang="en-US" sz="1600" dirty="0" smtClean="0"/>
-              <a:t> </a:t>
-            </a:r>
-            <a:r>
-              <a:rPr lang="en-US" sz="1600" dirty="0" err="1" smtClean="0"/>
-              <a:t>uno</a:t>
-            </a:r>
-            <a:r>
-              <a:rPr lang="en-US" sz="1600" dirty="0" smtClean="0"/>
-              <a:t> a </a:t>
-            </a:r>
-            <a:r>
-              <a:rPr lang="en-US" sz="1600" dirty="0" err="1" smtClean="0"/>
-              <a:t>varios</a:t>
-            </a:r>
-            <a:r>
-              <a:rPr lang="en-US" sz="1600" dirty="0" smtClean="0"/>
-              <a:t> en </a:t>
-            </a:r>
-            <a:r>
-              <a:rPr lang="en-US" sz="1600" dirty="0" err="1" smtClean="0"/>
-              <a:t>alguna</a:t>
-            </a:r>
-            <a:r>
-              <a:rPr lang="en-US" sz="1600" dirty="0" smtClean="0"/>
-              <a:t> </a:t>
-            </a:r>
-            <a:r>
-              <a:rPr lang="en-US" sz="1600" dirty="0" err="1" smtClean="0"/>
-              <a:t>ruta</a:t>
-            </a:r>
-            <a:endParaRPr lang="en-US" sz="1600" dirty="0" smtClean="0"/>
-          </a:p>
-          <a:p>
-            <a:r>
-              <a:rPr lang="es-ES" sz="2000" dirty="0" smtClean="0"/>
-              <a:t>TODO: Imagen centro de gravedad?</a:t>
-            </a:r>
-          </a:p>
-          <a:p>
-            <a:endParaRPr lang="es-ES" sz="2000" dirty="0" smtClean="0"/>
-          </a:p>
-        </p:txBody>
-      </p:sp>
+              <a:rPr lang="en-US" sz="2000" dirty="0" smtClean="0"/>
+              <a:t> </a:t>
+            </a:r>
+            <a:r>
+              <a:rPr lang="en-US" sz="2000" dirty="0" err="1" smtClean="0"/>
+              <a:t>determinar</a:t>
+            </a:r>
+            <a:r>
+              <a:rPr lang="en-US" sz="2000" dirty="0" smtClean="0"/>
+              <a:t> </a:t>
+            </a:r>
+            <a:r>
+              <a:rPr lang="en-US" sz="2000" dirty="0" err="1" smtClean="0"/>
+              <a:t>si</a:t>
+            </a:r>
+            <a:r>
+              <a:rPr lang="en-US" sz="2000" dirty="0" smtClean="0"/>
+              <a:t> dos </a:t>
+            </a:r>
+            <a:r>
+              <a:rPr lang="en-US" sz="2000" dirty="0" err="1" smtClean="0"/>
+              <a:t>soluciones</a:t>
+            </a:r>
+            <a:r>
+              <a:rPr lang="en-US" sz="2000" dirty="0" smtClean="0"/>
+              <a:t> son </a:t>
+            </a:r>
+            <a:r>
+              <a:rPr lang="en-US" sz="2000" dirty="0" err="1" smtClean="0"/>
+              <a:t>iguales</a:t>
+            </a:r>
+            <a:endParaRPr lang="es-AR" sz="2000" dirty="0" smtClean="0"/>
+          </a:p>
+          <a:p>
+            <a:pPr lvl="1">
+              <a:buFont typeface="Wingdings" pitchFamily="2" charset="2"/>
+              <a:buChar char="§"/>
+            </a:pPr>
+            <a:r>
+              <a:rPr lang="es-AR" sz="2000" dirty="0" smtClean="0"/>
+              <a:t>Se </a:t>
+            </a:r>
+            <a:r>
+              <a:rPr lang="es-AR" sz="2000" dirty="0"/>
+              <a:t>completa la nueva generación con soluciones mutantes, soluciones aleatorias para escapar de los mínimos </a:t>
+            </a:r>
+            <a:r>
+              <a:rPr lang="es-AR" sz="2000" dirty="0" smtClean="0"/>
+              <a:t>locales</a:t>
+            </a:r>
+            <a:endParaRPr lang="es-AR" sz="2000" dirty="0"/>
+          </a:p>
+        </p:txBody>
+      </p:sp>
+      <p:pic>
+        <p:nvPicPr>
+          <p:cNvPr id="4" name="Picture 3"/>
+          <p:cNvPicPr>
+            <a:picLocks noChangeAspect="1"/>
+          </p:cNvPicPr>
+          <p:nvPr/>
+        </p:nvPicPr>
+        <p:blipFill>
+          <a:blip r:embed="rId2">
+            <a:extLst>
+              <a:ext uri="{28A0092B-C50C-407E-A947-70E740481C1C}">
+                <a14:useLocalDpi xmlns:a14="http://schemas.microsoft.com/office/drawing/2010/main" val="0"/>
+              </a:ext>
+            </a:extLst>
+          </a:blip>
+          <a:stretch>
+            <a:fillRect/>
+          </a:stretch>
+        </p:blipFill>
+        <p:spPr>
+          <a:xfrm>
+            <a:off x="-2379" y="620688"/>
+            <a:ext cx="9144000" cy="2310938"/>
+          </a:xfrm>
+          <a:prstGeom prst="rect">
+            <a:avLst/>
+          </a:prstGeom>
+        </p:spPr>
+      </p:pic>
     </p:spTree>
     <p:extLst>
       <p:ext uri="{BB962C8B-B14F-4D97-AF65-F5344CB8AC3E}">
-        <p14:creationId xmlns:p14="http://schemas.microsoft.com/office/powerpoint/2010/main" val="4055364157"/>
+        <p14:creationId xmlns:p14="http://schemas.microsoft.com/office/powerpoint/2010/main" val="2391434657"/>
       </p:ext>
     </p:extLst>
   </p:cSld>
@@ -4611,103 +4165,486 @@
           <a:lstStyle/>
           <a:p>
             <a:r>
-              <a:rPr lang="en-US" sz="2000" dirty="0" err="1" smtClean="0"/>
-              <a:t>Codificador</a:t>
-            </a:r>
-            <a:endParaRPr lang="en-US" sz="2000" dirty="0" smtClean="0"/>
-          </a:p>
-          <a:p>
-            <a:pPr lvl="1"/>
-            <a:r>
-              <a:rPr lang="en-US" sz="1600" dirty="0" err="1" smtClean="0"/>
-              <a:t>Actualizacion</a:t>
-            </a:r>
-            <a:r>
-              <a:rPr lang="en-US" sz="1600" dirty="0" smtClean="0"/>
+              <a:rPr lang="en-US" sz="2800" dirty="0" err="1" smtClean="0"/>
+              <a:t>Búsquedas</a:t>
+            </a:r>
+            <a:r>
+              <a:rPr lang="en-US" sz="2800" dirty="0" smtClean="0"/>
+              <a:t> </a:t>
+            </a:r>
+            <a:r>
+              <a:rPr lang="en-US" sz="2800" dirty="0" smtClean="0"/>
+              <a:t>locales </a:t>
+            </a:r>
+            <a:r>
+              <a:rPr lang="en-US" sz="2800" dirty="0" smtClean="0"/>
+              <a:t>a </a:t>
+            </a:r>
+            <a:r>
+              <a:rPr lang="en-US" sz="2800" dirty="0" err="1" smtClean="0"/>
+              <a:t>las</a:t>
+            </a:r>
+            <a:r>
+              <a:rPr lang="en-US" sz="2800" dirty="0" smtClean="0"/>
+              <a:t> </a:t>
+            </a:r>
+            <a:r>
+              <a:rPr lang="en-US" sz="2800" dirty="0" err="1" smtClean="0"/>
+              <a:t>mejores</a:t>
+            </a:r>
+            <a:r>
+              <a:rPr lang="en-US" sz="2800" dirty="0" smtClean="0"/>
+              <a:t> N </a:t>
+            </a:r>
+            <a:r>
+              <a:rPr lang="en-US" sz="2800" dirty="0" err="1" smtClean="0"/>
+              <a:t>soluciones</a:t>
+            </a:r>
+            <a:endParaRPr lang="en-US" sz="2800" dirty="0" smtClean="0"/>
+          </a:p>
+          <a:p>
+            <a:pPr lvl="1">
+              <a:buFont typeface="Wingdings" pitchFamily="2" charset="2"/>
+              <a:buChar char="§"/>
+            </a:pPr>
+            <a:r>
+              <a:rPr lang="en-US" sz="2200" dirty="0" smtClean="0"/>
+              <a:t>Se </a:t>
+            </a:r>
+            <a:r>
+              <a:rPr lang="en-US" sz="2200" dirty="0" err="1" smtClean="0"/>
+              <a:t>aplica</a:t>
+            </a:r>
+            <a:r>
+              <a:rPr lang="en-US" sz="2200" dirty="0" smtClean="0"/>
+              <a:t> </a:t>
+            </a:r>
+            <a:r>
+              <a:rPr lang="en-US" sz="2200" dirty="0" err="1" smtClean="0"/>
+              <a:t>una</a:t>
+            </a:r>
+            <a:r>
+              <a:rPr lang="en-US" sz="2200" dirty="0" smtClean="0"/>
+              <a:t> </a:t>
+            </a:r>
+            <a:r>
+              <a:rPr lang="en-US" sz="2200" dirty="0" err="1" smtClean="0"/>
+              <a:t>secuencia</a:t>
+            </a:r>
+            <a:r>
+              <a:rPr lang="en-US" sz="2200" dirty="0" smtClean="0"/>
+              <a:t> de BL a </a:t>
+            </a:r>
+            <a:r>
+              <a:rPr lang="en-US" sz="2200" dirty="0" err="1" smtClean="0"/>
+              <a:t>las</a:t>
+            </a:r>
+            <a:r>
+              <a:rPr lang="en-US" sz="2200" dirty="0" smtClean="0"/>
+              <a:t> </a:t>
+            </a:r>
+            <a:r>
+              <a:rPr lang="en-US" sz="2200" dirty="0" err="1" smtClean="0"/>
+              <a:t>mejores</a:t>
+            </a:r>
+            <a:r>
+              <a:rPr lang="en-US" sz="2200" dirty="0" smtClean="0"/>
+              <a:t> N </a:t>
+            </a:r>
+            <a:r>
+              <a:rPr lang="en-US" sz="2200" dirty="0" err="1" smtClean="0"/>
+              <a:t>soluciones</a:t>
+            </a:r>
+            <a:r>
+              <a:rPr lang="en-US" sz="2200" dirty="0" smtClean="0"/>
+              <a:t> en </a:t>
+            </a:r>
+            <a:r>
+              <a:rPr lang="en-US" sz="2200" dirty="0" err="1" smtClean="0"/>
+              <a:t>cada</a:t>
+            </a:r>
+            <a:r>
+              <a:rPr lang="en-US" sz="2200" dirty="0" smtClean="0"/>
+              <a:t> </a:t>
+            </a:r>
+            <a:r>
+              <a:rPr lang="en-US" sz="2200" dirty="0" err="1" smtClean="0"/>
+              <a:t>generacion</a:t>
+            </a:r>
+            <a:endParaRPr lang="en-US" sz="2200" dirty="0" smtClean="0"/>
+          </a:p>
+          <a:p>
+            <a:pPr lvl="1">
+              <a:buFont typeface="Wingdings" pitchFamily="2" charset="2"/>
+              <a:buChar char="§"/>
+            </a:pPr>
+            <a:r>
+              <a:rPr lang="en-US" sz="2200" b="1" dirty="0" smtClean="0"/>
+              <a:t>Swap</a:t>
+            </a:r>
+            <a:r>
+              <a:rPr lang="en-US" sz="2200" dirty="0" smtClean="0"/>
+              <a:t>: </a:t>
+            </a:r>
+            <a:r>
+              <a:rPr lang="en-US" sz="2200" dirty="0" err="1" smtClean="0"/>
+              <a:t>Intercambio</a:t>
+            </a:r>
+            <a:r>
+              <a:rPr lang="en-US" sz="2200" dirty="0" smtClean="0"/>
+              <a:t> de </a:t>
+            </a:r>
+            <a:r>
+              <a:rPr lang="en-US" sz="2200" dirty="0" err="1" smtClean="0"/>
+              <a:t>clientes</a:t>
+            </a:r>
+            <a:r>
+              <a:rPr lang="en-US" sz="2200" dirty="0" smtClean="0"/>
+              <a:t> entre </a:t>
+            </a:r>
+            <a:r>
+              <a:rPr lang="en-US" sz="2200" dirty="0" err="1" smtClean="0"/>
+              <a:t>distintos</a:t>
+            </a:r>
+            <a:r>
+              <a:rPr lang="en-US" sz="2200" dirty="0" smtClean="0"/>
+              <a:t> </a:t>
+            </a:r>
+            <a:r>
+              <a:rPr lang="en-US" sz="2200" dirty="0" err="1" smtClean="0"/>
+              <a:t>vehículos</a:t>
+            </a:r>
+            <a:endParaRPr lang="en-US" sz="2200" dirty="0" smtClean="0"/>
+          </a:p>
+          <a:p>
+            <a:pPr lvl="1">
+              <a:buFont typeface="Wingdings" pitchFamily="2" charset="2"/>
+              <a:buChar char="§"/>
+            </a:pPr>
+            <a:r>
+              <a:rPr lang="en-US" sz="2200" b="1" dirty="0" smtClean="0"/>
+              <a:t>2-Opt</a:t>
+            </a:r>
+            <a:r>
+              <a:rPr lang="en-US" sz="2200" dirty="0"/>
+              <a:t>: </a:t>
+            </a:r>
+            <a:r>
+              <a:rPr lang="en-US" sz="2200" dirty="0" err="1"/>
+              <a:t>Reordenamiento</a:t>
+            </a:r>
+            <a:r>
+              <a:rPr lang="en-US" sz="2200" dirty="0"/>
+              <a:t> de </a:t>
+            </a:r>
+            <a:r>
+              <a:rPr lang="en-US" sz="2200" dirty="0" err="1"/>
+              <a:t>clientes</a:t>
+            </a:r>
+            <a:r>
+              <a:rPr lang="en-US" sz="2200" dirty="0"/>
+              <a:t> a </a:t>
+            </a:r>
+            <a:r>
+              <a:rPr lang="en-US" sz="2200" dirty="0" err="1"/>
+              <a:t>visitar</a:t>
+            </a:r>
+            <a:r>
+              <a:rPr lang="en-US" sz="2200" dirty="0"/>
+              <a:t> </a:t>
+            </a:r>
+            <a:r>
+              <a:rPr lang="en-US" sz="2200" dirty="0" err="1"/>
+              <a:t>para</a:t>
+            </a:r>
+            <a:r>
+              <a:rPr lang="en-US" sz="2200" dirty="0"/>
+              <a:t> un </a:t>
+            </a:r>
+            <a:r>
+              <a:rPr lang="en-US" sz="2200" dirty="0" err="1"/>
+              <a:t>vehículo</a:t>
+            </a:r>
+            <a:endParaRPr lang="en-US" sz="2200" dirty="0"/>
+          </a:p>
+          <a:p>
+            <a:pPr lvl="1">
+              <a:buFont typeface="Wingdings" pitchFamily="2" charset="2"/>
+              <a:buChar char="§"/>
+            </a:pPr>
+            <a:r>
+              <a:rPr lang="en-US" sz="2200" b="1" dirty="0"/>
+              <a:t>Insert</a:t>
+            </a:r>
+            <a:r>
+              <a:rPr lang="en-US" sz="2200" dirty="0"/>
+              <a:t>: </a:t>
+            </a:r>
+            <a:r>
+              <a:rPr lang="en-US" sz="2200" dirty="0" err="1"/>
+              <a:t>Insertar</a:t>
+            </a:r>
+            <a:r>
+              <a:rPr lang="en-US" sz="2200" dirty="0"/>
+              <a:t> </a:t>
+            </a:r>
+            <a:r>
+              <a:rPr lang="en-US" sz="2200" dirty="0" err="1"/>
+              <a:t>cliente</a:t>
+            </a:r>
+            <a:r>
+              <a:rPr lang="en-US" sz="2200" dirty="0"/>
+              <a:t> no </a:t>
+            </a:r>
+            <a:r>
+              <a:rPr lang="en-US" sz="2200" dirty="0" err="1"/>
+              <a:t>visitado</a:t>
+            </a:r>
+            <a:r>
+              <a:rPr lang="en-US" sz="2200" dirty="0"/>
+              <a:t> en </a:t>
+            </a:r>
+            <a:r>
+              <a:rPr lang="en-US" sz="2200" dirty="0" err="1"/>
+              <a:t>alguna</a:t>
+            </a:r>
+            <a:r>
+              <a:rPr lang="en-US" sz="2200" dirty="0"/>
+              <a:t> </a:t>
+            </a:r>
+            <a:r>
+              <a:rPr lang="en-US" sz="2200" dirty="0" err="1"/>
+              <a:t>ruta</a:t>
+            </a:r>
+            <a:endParaRPr lang="en-US" sz="2200" dirty="0"/>
+          </a:p>
+          <a:p>
+            <a:pPr lvl="1">
+              <a:buFont typeface="Wingdings" pitchFamily="2" charset="2"/>
+              <a:buChar char="§"/>
+            </a:pPr>
+            <a:r>
+              <a:rPr lang="en-US" sz="2200" b="1" dirty="0"/>
+              <a:t>Replace Simple</a:t>
+            </a:r>
+            <a:r>
+              <a:rPr lang="en-US" sz="2200" dirty="0"/>
+              <a:t>: </a:t>
+            </a:r>
+            <a:r>
+              <a:rPr lang="en-US" sz="2200" dirty="0" err="1"/>
+              <a:t>Insertar</a:t>
+            </a:r>
+            <a:r>
+              <a:rPr lang="en-US" sz="2200" dirty="0"/>
+              <a:t> un </a:t>
+            </a:r>
+            <a:r>
+              <a:rPr lang="en-US" sz="2200" dirty="0" err="1"/>
+              <a:t>cliente</a:t>
+            </a:r>
+            <a:r>
+              <a:rPr lang="en-US" sz="2200" dirty="0"/>
+              <a:t> no </a:t>
+            </a:r>
+            <a:r>
+              <a:rPr lang="en-US" sz="2200" dirty="0" err="1"/>
+              <a:t>visitado</a:t>
+            </a:r>
+            <a:r>
+              <a:rPr lang="en-US" sz="2200" dirty="0"/>
+              <a:t> </a:t>
+            </a:r>
+            <a:r>
+              <a:rPr lang="en-US" sz="2200" dirty="0" err="1"/>
+              <a:t>por</a:t>
+            </a:r>
+            <a:r>
+              <a:rPr lang="en-US" sz="2200" dirty="0"/>
+              <a:t> </a:t>
+            </a:r>
+            <a:r>
+              <a:rPr lang="en-US" sz="2200" dirty="0" err="1"/>
+              <a:t>uno</a:t>
+            </a:r>
+            <a:r>
+              <a:rPr lang="en-US" sz="2200" dirty="0"/>
+              <a:t> </a:t>
+            </a:r>
+            <a:r>
+              <a:rPr lang="en-US" sz="2200" dirty="0" err="1"/>
+              <a:t>visitado</a:t>
+            </a:r>
+            <a:r>
+              <a:rPr lang="en-US" sz="2200" dirty="0"/>
+              <a:t> en </a:t>
+            </a:r>
+            <a:r>
+              <a:rPr lang="en-US" sz="2200" dirty="0" err="1"/>
+              <a:t>alguna</a:t>
+            </a:r>
+            <a:r>
+              <a:rPr lang="en-US" sz="2200" dirty="0"/>
+              <a:t> </a:t>
+            </a:r>
+            <a:r>
+              <a:rPr lang="en-US" sz="2200" dirty="0" err="1"/>
+              <a:t>ruta</a:t>
+            </a:r>
+            <a:endParaRPr lang="en-US" sz="2200" dirty="0"/>
+          </a:p>
+          <a:p>
+            <a:pPr lvl="1">
+              <a:buFont typeface="Wingdings" pitchFamily="2" charset="2"/>
+              <a:buChar char="§"/>
+            </a:pPr>
+            <a:r>
+              <a:rPr lang="en-US" sz="2200" b="1" dirty="0"/>
+              <a:t>Replace Multiple</a:t>
+            </a:r>
+            <a:r>
+              <a:rPr lang="en-US" sz="2200" dirty="0"/>
+              <a:t>: </a:t>
+            </a:r>
+            <a:r>
+              <a:rPr lang="en-US" sz="2200" dirty="0" err="1"/>
+              <a:t>Insertar</a:t>
+            </a:r>
+            <a:r>
+              <a:rPr lang="en-US" sz="2200" dirty="0"/>
+              <a:t> un </a:t>
+            </a:r>
+            <a:r>
+              <a:rPr lang="en-US" sz="2200" dirty="0" err="1"/>
+              <a:t>cliente</a:t>
+            </a:r>
+            <a:r>
+              <a:rPr lang="en-US" sz="2200" dirty="0"/>
+              <a:t> no </a:t>
+            </a:r>
+            <a:r>
+              <a:rPr lang="en-US" sz="2200" dirty="0" err="1"/>
+              <a:t>visitado</a:t>
+            </a:r>
+            <a:r>
+              <a:rPr lang="en-US" sz="2200" dirty="0"/>
+              <a:t> </a:t>
+            </a:r>
+            <a:r>
+              <a:rPr lang="en-US" sz="2200" dirty="0" err="1"/>
+              <a:t>por</a:t>
+            </a:r>
+            <a:r>
+              <a:rPr lang="en-US" sz="2200" dirty="0"/>
+              <a:t> </a:t>
+            </a:r>
+            <a:r>
+              <a:rPr lang="en-US" sz="2200" dirty="0" err="1"/>
+              <a:t>uno</a:t>
+            </a:r>
+            <a:r>
+              <a:rPr lang="en-US" sz="2200" dirty="0"/>
+              <a:t> a </a:t>
+            </a:r>
+            <a:r>
+              <a:rPr lang="en-US" sz="2200" dirty="0" err="1"/>
+              <a:t>varios</a:t>
+            </a:r>
+            <a:r>
+              <a:rPr lang="en-US" sz="2200" dirty="0"/>
+              <a:t> en </a:t>
+            </a:r>
+            <a:r>
+              <a:rPr lang="en-US" sz="2200" dirty="0" err="1"/>
+              <a:t>alguna</a:t>
+            </a:r>
+            <a:r>
+              <a:rPr lang="en-US" sz="2200" dirty="0"/>
+              <a:t> </a:t>
+            </a:r>
+            <a:r>
+              <a:rPr lang="en-US" sz="2200" dirty="0" err="1" smtClean="0"/>
+              <a:t>ruta</a:t>
+            </a:r>
+            <a:endParaRPr lang="en-US" sz="2200" dirty="0" smtClean="0"/>
+          </a:p>
+          <a:p>
+            <a:pPr lvl="1">
+              <a:buFont typeface="Wingdings" pitchFamily="2" charset="2"/>
+              <a:buChar char="§"/>
+            </a:pPr>
+            <a:r>
+              <a:rPr lang="en-US" sz="2200" dirty="0"/>
+              <a:t>Se </a:t>
+            </a:r>
+            <a:r>
+              <a:rPr lang="en-US" sz="2200" dirty="0" err="1"/>
+              <a:t>activa</a:t>
+            </a:r>
+            <a:r>
+              <a:rPr lang="en-US" sz="2200" dirty="0"/>
+              <a:t> el </a:t>
+            </a:r>
+            <a:r>
+              <a:rPr lang="en-US" sz="2200" dirty="0" err="1"/>
+              <a:t>cálculo</a:t>
+            </a:r>
+            <a:r>
+              <a:rPr lang="en-US" sz="2200" dirty="0"/>
+              <a:t> del COG </a:t>
+            </a:r>
+            <a:r>
+              <a:rPr lang="en-US" sz="2200" dirty="0" err="1"/>
+              <a:t>para</a:t>
+            </a:r>
+            <a:r>
+              <a:rPr lang="en-US" sz="2200" dirty="0"/>
+              <a:t> Insert y Replace. A </a:t>
+            </a:r>
+            <a:r>
+              <a:rPr lang="en-US" sz="2200" dirty="0" err="1"/>
+              <a:t>cada</a:t>
+            </a:r>
+            <a:r>
+              <a:rPr lang="en-US" sz="2200" dirty="0"/>
+              <a:t> </a:t>
+            </a:r>
+            <a:r>
+              <a:rPr lang="en-US" sz="2200" dirty="0" err="1"/>
+              <a:t>cambio</a:t>
+            </a:r>
+            <a:r>
+              <a:rPr lang="en-US" sz="2200" dirty="0"/>
+              <a:t> en la </a:t>
+            </a:r>
+            <a:r>
+              <a:rPr lang="en-US" sz="2200" dirty="0" err="1"/>
+              <a:t>ruta</a:t>
+            </a:r>
+            <a:r>
+              <a:rPr lang="en-US" sz="2200" dirty="0"/>
               <a:t> del </a:t>
             </a:r>
             <a:r>
-              <a:rPr lang="en-US" sz="1600" dirty="0" err="1" smtClean="0"/>
-              <a:t>codigo</a:t>
-            </a:r>
-            <a:r>
-              <a:rPr lang="en-US" sz="1600" dirty="0" smtClean="0"/>
-              <a:t> </a:t>
-            </a:r>
-            <a:r>
-              <a:rPr lang="en-US" sz="1600" dirty="0" err="1" smtClean="0"/>
-              <a:t>genetico</a:t>
-            </a:r>
-            <a:r>
-              <a:rPr lang="en-US" sz="1600" dirty="0" smtClean="0"/>
-              <a:t> post </a:t>
-            </a:r>
-            <a:r>
-              <a:rPr lang="en-US" sz="1600" dirty="0" err="1" smtClean="0"/>
-              <a:t>busqueda</a:t>
-            </a:r>
-            <a:r>
-              <a:rPr lang="en-US" sz="1600" dirty="0" smtClean="0"/>
-              <a:t> local</a:t>
-            </a:r>
-          </a:p>
-          <a:p>
-            <a:r>
-              <a:rPr lang="en-US" sz="2000" dirty="0" err="1" smtClean="0"/>
-              <a:t>Condicion</a:t>
-            </a:r>
-            <a:r>
-              <a:rPr lang="en-US" sz="2000" dirty="0" smtClean="0"/>
-              <a:t> de Corte</a:t>
-            </a:r>
-          </a:p>
-          <a:p>
-            <a:pPr lvl="1"/>
-            <a:r>
-              <a:rPr lang="en-US" sz="1600" dirty="0" err="1" smtClean="0"/>
-              <a:t>Geneaciones</a:t>
-            </a:r>
-            <a:r>
-              <a:rPr lang="en-US" sz="1600" dirty="0" smtClean="0"/>
-              <a:t> </a:t>
-            </a:r>
-            <a:r>
-              <a:rPr lang="en-US" sz="1600" dirty="0" err="1" smtClean="0"/>
-              <a:t>Minimas</a:t>
-            </a:r>
-            <a:endParaRPr lang="en-US" sz="1600" dirty="0" smtClean="0"/>
-          </a:p>
-          <a:p>
-            <a:pPr lvl="1"/>
-            <a:r>
-              <a:rPr lang="en-US" sz="1600" dirty="0" err="1" smtClean="0"/>
-              <a:t>Generaciones</a:t>
-            </a:r>
-            <a:r>
-              <a:rPr lang="en-US" sz="1600" dirty="0" smtClean="0"/>
-              <a:t> sin </a:t>
-            </a:r>
-            <a:r>
-              <a:rPr lang="en-US" sz="1600" dirty="0" err="1" smtClean="0"/>
-              <a:t>mejoras</a:t>
-            </a:r>
-            <a:endParaRPr lang="en-US" sz="1600" dirty="0" smtClean="0"/>
-          </a:p>
-          <a:p>
-            <a:r>
-              <a:rPr lang="es-ES" sz="2000" dirty="0" smtClean="0"/>
-              <a:t>TODO: Imagen Codificador?</a:t>
-            </a:r>
-          </a:p>
-          <a:p>
-            <a:endParaRPr lang="es-ES" sz="2000" dirty="0" smtClean="0"/>
+              <a:rPr lang="en-US" sz="2200" dirty="0" err="1"/>
+              <a:t>vehículo</a:t>
+            </a:r>
+            <a:r>
+              <a:rPr lang="en-US" sz="2200" dirty="0"/>
+              <a:t> el COG se </a:t>
+            </a:r>
+            <a:r>
+              <a:rPr lang="en-US" sz="2200" dirty="0" err="1" smtClean="0"/>
+              <a:t>actualiza</a:t>
+            </a:r>
+            <a:endParaRPr lang="es-AR" sz="1600" dirty="0"/>
           </a:p>
         </p:txBody>
       </p:sp>
     </p:spTree>
     <p:extLst>
       <p:ext uri="{BB962C8B-B14F-4D97-AF65-F5344CB8AC3E}">
-        <p14:creationId xmlns:p14="http://schemas.microsoft.com/office/powerpoint/2010/main" val="2901096675"/>
+        <p14:creationId xmlns:p14="http://schemas.microsoft.com/office/powerpoint/2010/main" val="2038407458"/>
       </p:ext>
     </p:extLst>
   </p:cSld>
@@ -4759,6 +4696,469 @@
             <a:pPr algn="r"/>
             <a:r>
               <a:rPr lang="en-US" sz="2400" dirty="0" err="1" smtClean="0"/>
+              <a:t>Algoritmo</a:t>
+            </a:r>
+            <a:r>
+              <a:rPr lang="en-US" sz="2400" dirty="0" smtClean="0"/>
+              <a:t> </a:t>
+            </a:r>
+            <a:r>
+              <a:rPr lang="en-US" sz="2400" dirty="0" err="1" smtClean="0"/>
+              <a:t>Propuesto</a:t>
+            </a:r>
+            <a:endParaRPr lang="en-US" sz="2400" dirty="0" smtClean="0"/>
+          </a:p>
+        </p:txBody>
+      </p:sp>
+      <p:sp>
+        <p:nvSpPr>
+          <p:cNvPr id="3" name="Content Placeholder 2"/>
+          <p:cNvSpPr>
+            <a:spLocks noGrp="1"/>
+          </p:cNvSpPr>
+          <p:nvPr>
+            <p:ph idx="1"/>
+          </p:nvPr>
+        </p:nvSpPr>
+        <p:spPr>
+          <a:xfrm>
+            <a:off x="457200" y="908720"/>
+            <a:ext cx="8229600" cy="5217443"/>
+          </a:xfrm>
+        </p:spPr>
+        <p:txBody>
+          <a:bodyPr>
+            <a:normAutofit/>
+          </a:bodyPr>
+          <a:lstStyle/>
+          <a:p>
+            <a:r>
+              <a:rPr lang="en-US" sz="2800" dirty="0" smtClean="0"/>
+              <a:t>Centro de </a:t>
+            </a:r>
+            <a:r>
+              <a:rPr lang="en-US" sz="2800" dirty="0" err="1" smtClean="0"/>
+              <a:t>Gravedad</a:t>
+            </a:r>
+            <a:r>
+              <a:rPr lang="en-US" sz="2800" dirty="0" smtClean="0"/>
+              <a:t> (COG)</a:t>
+            </a:r>
+          </a:p>
+          <a:p>
+            <a:pPr lvl="1">
+              <a:buFont typeface="Wingdings" pitchFamily="2" charset="2"/>
+              <a:buChar char="§"/>
+            </a:pPr>
+            <a:r>
+              <a:rPr lang="en-US" sz="2000" dirty="0" err="1" smtClean="0"/>
+              <a:t>Todo</a:t>
+            </a:r>
+            <a:r>
+              <a:rPr lang="en-US" sz="2000" dirty="0" smtClean="0"/>
+              <a:t>: </a:t>
+            </a:r>
+            <a:r>
+              <a:rPr lang="en-US" sz="2000" dirty="0" err="1" smtClean="0"/>
+              <a:t>Imagen</a:t>
+            </a:r>
+            <a:r>
+              <a:rPr lang="en-US" sz="2000" dirty="0" smtClean="0"/>
+              <a:t> de </a:t>
+            </a:r>
+            <a:r>
+              <a:rPr lang="en-US" sz="2000" dirty="0" err="1" smtClean="0"/>
+              <a:t>ejemplo</a:t>
+            </a:r>
+            <a:endParaRPr lang="en-US" sz="2000" dirty="0" smtClean="0"/>
+          </a:p>
+          <a:p>
+            <a:r>
+              <a:rPr lang="en-US" sz="2800" dirty="0" err="1" smtClean="0"/>
+              <a:t>Codificación</a:t>
+            </a:r>
+            <a:r>
+              <a:rPr lang="en-US" sz="2800" dirty="0" smtClean="0"/>
+              <a:t> de </a:t>
+            </a:r>
+            <a:r>
+              <a:rPr lang="en-US" sz="2800" dirty="0" err="1" smtClean="0"/>
+              <a:t>las</a:t>
+            </a:r>
+            <a:r>
+              <a:rPr lang="en-US" sz="2800" dirty="0" smtClean="0"/>
+              <a:t> </a:t>
+            </a:r>
+            <a:r>
+              <a:rPr lang="en-US" sz="2800" dirty="0" err="1" smtClean="0"/>
+              <a:t>soluciones</a:t>
+            </a:r>
+            <a:r>
+              <a:rPr lang="en-US" sz="2800" dirty="0" smtClean="0"/>
+              <a:t> </a:t>
+            </a:r>
+            <a:r>
+              <a:rPr lang="en-US" sz="2800" dirty="0" err="1" smtClean="0"/>
+              <a:t>mejoradas</a:t>
+            </a:r>
+            <a:endParaRPr lang="en-US" sz="2800" dirty="0" smtClean="0"/>
+          </a:p>
+          <a:p>
+            <a:pPr lvl="1">
+              <a:buFont typeface="Wingdings" pitchFamily="2" charset="2"/>
+              <a:buChar char="§"/>
+            </a:pPr>
+            <a:r>
+              <a:rPr lang="en-US" sz="2000" dirty="0" err="1" smtClean="0"/>
+              <a:t>Actualización</a:t>
+            </a:r>
+            <a:r>
+              <a:rPr lang="en-US" sz="2000" dirty="0" smtClean="0"/>
+              <a:t> </a:t>
+            </a:r>
+            <a:r>
+              <a:rPr lang="en-US" sz="2000" dirty="0"/>
+              <a:t>del </a:t>
+            </a:r>
+            <a:r>
+              <a:rPr lang="en-US" sz="2000" dirty="0" err="1" smtClean="0"/>
+              <a:t>código</a:t>
+            </a:r>
+            <a:r>
+              <a:rPr lang="en-US" sz="2000" dirty="0" smtClean="0"/>
+              <a:t> </a:t>
+            </a:r>
+            <a:r>
+              <a:rPr lang="en-US" sz="2000" dirty="0" err="1" smtClean="0"/>
+              <a:t>genético</a:t>
+            </a:r>
+            <a:r>
+              <a:rPr lang="en-US" sz="2000" dirty="0" smtClean="0"/>
+              <a:t> </a:t>
+            </a:r>
+            <a:r>
+              <a:rPr lang="en-US" sz="2000" dirty="0"/>
+              <a:t>post </a:t>
+            </a:r>
+            <a:r>
+              <a:rPr lang="en-US" sz="2000" dirty="0" err="1" smtClean="0"/>
+              <a:t>búsqueda</a:t>
+            </a:r>
+            <a:r>
+              <a:rPr lang="en-US" sz="2000" dirty="0" smtClean="0"/>
+              <a:t> local</a:t>
+            </a:r>
+          </a:p>
+          <a:p>
+            <a:pPr lvl="1">
+              <a:buFont typeface="Wingdings" pitchFamily="2" charset="2"/>
+              <a:buChar char="§"/>
+            </a:pPr>
+            <a:r>
+              <a:rPr lang="en-US" sz="2000" dirty="0" err="1" smtClean="0"/>
+              <a:t>Todo</a:t>
+            </a:r>
+            <a:r>
+              <a:rPr lang="en-US" sz="2000" dirty="0" smtClean="0"/>
+              <a:t>: </a:t>
+            </a:r>
+            <a:r>
+              <a:rPr lang="en-US" sz="2000" dirty="0" err="1" smtClean="0"/>
+              <a:t>Imagen</a:t>
+            </a:r>
+            <a:r>
+              <a:rPr lang="en-US" sz="2000" dirty="0" smtClean="0"/>
+              <a:t> del </a:t>
+            </a:r>
+            <a:r>
+              <a:rPr lang="en-US" sz="2000" dirty="0" err="1" smtClean="0"/>
+              <a:t>codificador</a:t>
+            </a:r>
+            <a:r>
+              <a:rPr lang="en-US" sz="2000" dirty="0" smtClean="0"/>
+              <a:t> (</a:t>
+            </a:r>
+            <a:r>
+              <a:rPr lang="en-US" sz="2000" dirty="0" err="1" smtClean="0"/>
+              <a:t>reconstruccion</a:t>
+            </a:r>
+            <a:r>
+              <a:rPr lang="en-US" sz="2000" dirty="0" smtClean="0"/>
+              <a:t>) ?</a:t>
+            </a:r>
+          </a:p>
+          <a:p>
+            <a:r>
+              <a:rPr lang="en-US" sz="2800" dirty="0" err="1" smtClean="0"/>
+              <a:t>Evaluacion</a:t>
+            </a:r>
+            <a:r>
+              <a:rPr lang="en-US" sz="2800" dirty="0" smtClean="0"/>
+              <a:t> </a:t>
+            </a:r>
+            <a:r>
+              <a:rPr lang="en-US" sz="2800" dirty="0" smtClean="0"/>
+              <a:t>de </a:t>
+            </a:r>
+            <a:r>
+              <a:rPr lang="en-US" sz="2800" dirty="0" err="1" smtClean="0"/>
+              <a:t>condicion</a:t>
+            </a:r>
+            <a:r>
+              <a:rPr lang="en-US" sz="2800" dirty="0" smtClean="0"/>
+              <a:t> de </a:t>
+            </a:r>
+            <a:r>
+              <a:rPr lang="en-US" sz="2800" dirty="0" err="1" smtClean="0"/>
+              <a:t>corte</a:t>
+            </a:r>
+            <a:endParaRPr lang="en-US" sz="2800" dirty="0" smtClean="0"/>
+          </a:p>
+          <a:p>
+            <a:pPr lvl="1">
+              <a:buFont typeface="Wingdings" pitchFamily="2" charset="2"/>
+              <a:buChar char="§"/>
+            </a:pPr>
+            <a:r>
+              <a:rPr lang="en-US" sz="2000" dirty="0" err="1" smtClean="0"/>
+              <a:t>Mínima</a:t>
+            </a:r>
+            <a:r>
+              <a:rPr lang="en-US" sz="2000" dirty="0" smtClean="0"/>
+              <a:t> </a:t>
+            </a:r>
+            <a:r>
+              <a:rPr lang="en-US" sz="2000" dirty="0" err="1" smtClean="0"/>
+              <a:t>cantidad</a:t>
+            </a:r>
+            <a:r>
+              <a:rPr lang="en-US" sz="2000" dirty="0" smtClean="0"/>
+              <a:t> de </a:t>
+            </a:r>
+            <a:r>
+              <a:rPr lang="en-US" sz="2000" dirty="0" err="1" smtClean="0"/>
+              <a:t>generaciones</a:t>
+            </a:r>
+            <a:endParaRPr lang="en-US" sz="2000" dirty="0" smtClean="0"/>
+          </a:p>
+          <a:p>
+            <a:pPr lvl="1">
+              <a:buFont typeface="Wingdings" pitchFamily="2" charset="2"/>
+              <a:buChar char="§"/>
+            </a:pPr>
+            <a:r>
+              <a:rPr lang="en-US" sz="2000" dirty="0" err="1" smtClean="0"/>
+              <a:t>Ultimas</a:t>
+            </a:r>
+            <a:r>
+              <a:rPr lang="en-US" sz="2000" dirty="0" smtClean="0"/>
+              <a:t> X </a:t>
+            </a:r>
+            <a:r>
+              <a:rPr lang="en-US" sz="2000" dirty="0" err="1" smtClean="0"/>
+              <a:t>generaci</a:t>
+            </a:r>
+            <a:r>
+              <a:rPr lang="en-US" sz="2000" dirty="0" err="1" smtClean="0"/>
+              <a:t>ónes</a:t>
+            </a:r>
+            <a:r>
+              <a:rPr lang="en-US" sz="2000" dirty="0" smtClean="0"/>
+              <a:t> sin  </a:t>
+            </a:r>
+            <a:r>
+              <a:rPr lang="en-US" sz="2000" dirty="0" err="1" smtClean="0"/>
+              <a:t>que</a:t>
+            </a:r>
+            <a:r>
+              <a:rPr lang="en-US" sz="2000" dirty="0" smtClean="0"/>
+              <a:t> se </a:t>
+            </a:r>
+            <a:r>
+              <a:rPr lang="en-US" sz="2000" dirty="0" err="1" smtClean="0"/>
+              <a:t>haya</a:t>
+            </a:r>
+            <a:r>
+              <a:rPr lang="en-US" sz="2000" dirty="0" smtClean="0"/>
+              <a:t> </a:t>
+            </a:r>
+            <a:r>
+              <a:rPr lang="en-US" sz="2000" dirty="0" err="1" smtClean="0"/>
+              <a:t>modificado</a:t>
+            </a:r>
+            <a:r>
+              <a:rPr lang="en-US" sz="2000" dirty="0" smtClean="0"/>
+              <a:t> el </a:t>
+            </a:r>
+            <a:r>
+              <a:rPr lang="en-US" sz="2000" dirty="0" err="1" smtClean="0"/>
+              <a:t>mejor</a:t>
+            </a:r>
+            <a:r>
+              <a:rPr lang="en-US" sz="2000" dirty="0" smtClean="0"/>
+              <a:t> </a:t>
+            </a:r>
+            <a:r>
+              <a:rPr lang="en-US" sz="2000" dirty="0" err="1" smtClean="0"/>
+              <a:t>beneficio</a:t>
+            </a:r>
+            <a:r>
+              <a:rPr lang="en-US" sz="2000" dirty="0" smtClean="0"/>
+              <a:t> </a:t>
+            </a:r>
+            <a:r>
+              <a:rPr lang="en-US" sz="2000" dirty="0" err="1" smtClean="0"/>
+              <a:t>obtenido</a:t>
+            </a:r>
+            <a:endParaRPr lang="en-US" sz="2000" dirty="0" smtClean="0"/>
+          </a:p>
+          <a:p>
+            <a:pPr lvl="1">
+              <a:buFont typeface="Wingdings" pitchFamily="2" charset="2"/>
+              <a:buChar char="§"/>
+            </a:pPr>
+            <a:r>
+              <a:rPr lang="en-US" sz="2000" dirty="0" smtClean="0"/>
+              <a:t>Si no se </a:t>
+            </a:r>
+            <a:r>
+              <a:rPr lang="en-US" sz="2000" dirty="0" err="1" smtClean="0"/>
+              <a:t>cumple</a:t>
+            </a:r>
+            <a:r>
+              <a:rPr lang="en-US" sz="2000" dirty="0" err="1" smtClean="0"/>
+              <a:t>n</a:t>
+            </a:r>
+            <a:r>
+              <a:rPr lang="en-US" sz="2000" dirty="0" smtClean="0"/>
+              <a:t> </a:t>
+            </a:r>
+            <a:r>
+              <a:rPr lang="en-US" sz="2000" dirty="0" err="1" smtClean="0"/>
+              <a:t>las</a:t>
+            </a:r>
+            <a:r>
+              <a:rPr lang="en-US" sz="2000" dirty="0" smtClean="0"/>
+              <a:t> </a:t>
+            </a:r>
+            <a:r>
+              <a:rPr lang="en-US" sz="2000" dirty="0" err="1" smtClean="0"/>
+              <a:t>condiciones</a:t>
+            </a:r>
+            <a:r>
+              <a:rPr lang="en-US" sz="2000" dirty="0" smtClean="0"/>
+              <a:t>, </a:t>
+            </a:r>
+            <a:r>
+              <a:rPr lang="en-US" sz="2000" dirty="0" err="1" smtClean="0"/>
+              <a:t>vuelve</a:t>
+            </a:r>
+            <a:r>
+              <a:rPr lang="en-US" sz="2000" dirty="0" smtClean="0"/>
+              <a:t> a </a:t>
+            </a:r>
+            <a:r>
+              <a:rPr lang="en-US" sz="2000" dirty="0" err="1" smtClean="0"/>
+              <a:t>evolucionar</a:t>
+            </a:r>
+            <a:r>
+              <a:rPr lang="en-US" sz="2000" dirty="0" smtClean="0"/>
+              <a:t> la </a:t>
+            </a:r>
+            <a:r>
+              <a:rPr lang="en-US" sz="2000" dirty="0" err="1" smtClean="0"/>
+              <a:t>población</a:t>
+            </a:r>
+            <a:r>
+              <a:rPr lang="en-US" sz="2000" dirty="0" smtClean="0"/>
+              <a:t>  </a:t>
+            </a:r>
+            <a:endParaRPr lang="en-US" sz="2000" dirty="0" smtClean="0"/>
+          </a:p>
+          <a:p>
+            <a:r>
+              <a:rPr lang="en-US" sz="2800" dirty="0" err="1" smtClean="0"/>
+              <a:t>Retorno</a:t>
+            </a:r>
+            <a:r>
+              <a:rPr lang="en-US" sz="2800" dirty="0" smtClean="0"/>
+              <a:t> de la </a:t>
+            </a:r>
+            <a:r>
+              <a:rPr lang="en-US" sz="2800" dirty="0" err="1" smtClean="0"/>
+              <a:t>mejor</a:t>
+            </a:r>
+            <a:r>
+              <a:rPr lang="en-US" sz="2800" dirty="0" smtClean="0"/>
+              <a:t> </a:t>
+            </a:r>
+            <a:r>
+              <a:rPr lang="en-US" sz="2800" dirty="0" err="1" smtClean="0"/>
+              <a:t>solucion</a:t>
+            </a:r>
+            <a:endParaRPr lang="en-US" sz="2800" dirty="0" smtClean="0"/>
+          </a:p>
+          <a:p>
+            <a:pPr lvl="1"/>
+            <a:endParaRPr lang="es-AR" sz="1600" dirty="0"/>
+          </a:p>
+        </p:txBody>
+      </p:sp>
+    </p:spTree>
+    <p:extLst>
+      <p:ext uri="{BB962C8B-B14F-4D97-AF65-F5344CB8AC3E}">
+        <p14:creationId xmlns:p14="http://schemas.microsoft.com/office/powerpoint/2010/main" val="2330373657"/>
+      </p:ext>
+    </p:extLst>
+  </p:cSld>
+  <p:clrMapOvr>
+    <a:masterClrMapping/>
+  </p:clrMapOvr>
+</p:sld>
+</file>
+
+<file path=ppt/slides/slide15.xml><?xml version="1.0" encoding="utf-8"?>
+<p:sld xmlns:a="http://schemas.openxmlformats.org/drawingml/2006/main" xmlns:r="http://schemas.openxmlformats.org/officeDocument/2006/relationships" xmlns:p="http://schemas.openxmlformats.org/presentationml/2006/main">
+  <p:cSld>
+    <p:spTree>
+      <p:nvGrpSpPr>
+        <p:cNvPr id="1" name=""/>
+        <p:cNvGrpSpPr/>
+        <p:nvPr/>
+      </p:nvGrpSpPr>
+      <p:grpSpPr>
+        <a:xfrm>
+          <a:off x="0" y="0"/>
+          <a:ext cx="0" cy="0"/>
+          <a:chOff x="0" y="0"/>
+          <a:chExt cx="0" cy="0"/>
+        </a:xfrm>
+      </p:grpSpPr>
+      <p:sp>
+        <p:nvSpPr>
+          <p:cNvPr id="2" name="Title 1"/>
+          <p:cNvSpPr>
+            <a:spLocks noGrp="1"/>
+          </p:cNvSpPr>
+          <p:nvPr>
+            <p:ph type="title"/>
+          </p:nvPr>
+        </p:nvSpPr>
+        <p:spPr>
+          <a:xfrm>
+            <a:off x="457200" y="274638"/>
+            <a:ext cx="8229600" cy="418058"/>
+          </a:xfrm>
+        </p:spPr>
+        <p:txBody>
+          <a:bodyPr>
+            <a:normAutofit fontScale="90000"/>
+          </a:bodyPr>
+          <a:lstStyle/>
+          <a:p>
+            <a:pPr algn="r"/>
+            <a:r>
+              <a:rPr lang="en-US" sz="2400" dirty="0" err="1" smtClean="0"/>
               <a:t>Resultados</a:t>
             </a:r>
             <a:endParaRPr lang="en-US" sz="2400" dirty="0" smtClean="0"/>
@@ -5019,7 +5419,7 @@
           <a:graphicData uri="http://schemas.openxmlformats.org/presentationml/2006/ole">
             <mc:AlternateContent xmlns:mc="http://schemas.openxmlformats.org/markup-compatibility/2006">
               <mc:Choice xmlns:v="urn:schemas-microsoft-com:vml" Requires="v">
-                <p:oleObj spid="_x0000_s1032" name="Equation" r:id="rId3" imgW="1409400" imgH="342720" progId="Equation.3">
+                <p:oleObj spid="_x0000_s1047" name="Equation" r:id="rId3" imgW="1409400" imgH="342720" progId="Equation.3">
                   <p:embed/>
                 </p:oleObj>
               </mc:Choice>
@@ -5067,7 +5467,7 @@
 </p:sld>
 </file>
 
-<file path=ppt/slides/slide15.xml><?xml version="1.0" encoding="utf-8"?>
+<file path=ppt/slides/slide16.xml><?xml version="1.0" encoding="utf-8"?>
 <p:sld xmlns:a="http://schemas.openxmlformats.org/drawingml/2006/main" xmlns:r="http://schemas.openxmlformats.org/officeDocument/2006/relationships" xmlns:p="http://schemas.openxmlformats.org/presentationml/2006/main">
   <p:cSld>
     <p:spTree>
@@ -5338,7 +5738,7 @@
 </p:sld>
 </file>
 
-<file path=ppt/slides/slide16.xml><?xml version="1.0" encoding="utf-8"?>
+<file path=ppt/slides/slide17.xml><?xml version="1.0" encoding="utf-8"?>
 <p:sld xmlns:a="http://schemas.openxmlformats.org/drawingml/2006/main" xmlns:r="http://schemas.openxmlformats.org/officeDocument/2006/relationships" xmlns:p="http://schemas.openxmlformats.org/presentationml/2006/main">
   <p:cSld>
     <p:spTree>
@@ -6180,7 +6580,10 @@
             </a:r>
           </a:p>
           <a:p>
-            <a:pPr lvl="1"/>
+            <a:pPr lvl="1">
+              <a:buFont typeface="Wingdings" pitchFamily="2" charset="2"/>
+              <a:buChar char="§"/>
+            </a:pPr>
             <a:r>
               <a:rPr lang="en-US" sz="2000" dirty="0" err="1" smtClean="0"/>
               <a:t>Extiende</a:t>
@@ -7148,8 +7551,8 @@
         </p:nvSpPr>
         <p:spPr>
           <a:xfrm>
-            <a:off x="457200" y="274638"/>
-            <a:ext cx="8229600" cy="418058"/>
+            <a:off x="3995936" y="274638"/>
+            <a:ext cx="4690864" cy="418058"/>
           </a:xfrm>
         </p:spPr>
         <p:txBody>
@@ -7863,30 +8266,40 @@
           </a:p>
           <a:p>
             <a:pPr lvl="1"/>
-            <a:r>
-              <a:rPr lang="en-US" sz="2000" dirty="0" smtClean="0"/>
-              <a:t>TODO: </a:t>
-            </a:r>
-            <a:r>
-              <a:rPr lang="en-US" sz="2000" dirty="0" err="1" smtClean="0"/>
-              <a:t>Imagen</a:t>
-            </a:r>
-            <a:r>
-              <a:rPr lang="en-US" sz="2000" dirty="0" smtClean="0"/>
-              <a:t> Bias Crossover de la </a:t>
-            </a:r>
-            <a:r>
-              <a:rPr lang="en-US" sz="2000" dirty="0" err="1" smtClean="0"/>
-              <a:t>tesis</a:t>
-            </a:r>
-            <a:endParaRPr lang="es-AR" sz="2000" dirty="0" smtClean="0"/>
-          </a:p>
-          <a:p>
-            <a:pPr lvl="1"/>
             <a:endParaRPr lang="es-AR" sz="1600" dirty="0"/>
           </a:p>
         </p:txBody>
       </p:sp>
+      <p:pic>
+        <p:nvPicPr>
+          <p:cNvPr id="4" name="Picture 3"/>
+          <p:cNvPicPr>
+            <a:picLocks noChangeAspect="1"/>
+          </p:cNvPicPr>
+          <p:nvPr/>
+        </p:nvPicPr>
+        <p:blipFill>
+          <a:blip r:embed="rId2" cstate="print">
+            <a:extLst>
+              <a:ext uri="{28A0092B-C50C-407E-A947-70E740481C1C}">
+                <a14:useLocalDpi xmlns:a14="http://schemas.microsoft.com/office/drawing/2010/main" val="0"/>
+              </a:ext>
+            </a:extLst>
+          </a:blip>
+          <a:stretch>
+            <a:fillRect/>
+          </a:stretch>
+        </p:blipFill>
+        <p:spPr>
+          <a:xfrm>
+            <a:off x="1475656" y="2618050"/>
+            <a:ext cx="6090414" cy="4263290"/>
+          </a:xfrm>
+          <a:prstGeom prst="rect">
+            <a:avLst/>
+          </a:prstGeom>
+        </p:spPr>
+      </p:pic>
     </p:spTree>
     <p:extLst>
       <p:ext uri="{BB962C8B-B14F-4D97-AF65-F5344CB8AC3E}">
@@ -7941,185 +8354,42 @@
           <a:p>
             <a:pPr algn="r"/>
             <a:r>
-              <a:rPr lang="en-US" sz="2400" dirty="0" err="1" smtClean="0"/>
-              <a:t>Algoritmo</a:t>
-            </a:r>
-            <a:r>
-              <a:rPr lang="en-US" sz="2400" dirty="0" smtClean="0"/>
-              <a:t> </a:t>
-            </a:r>
-            <a:r>
-              <a:rPr lang="en-US" sz="2400" dirty="0" err="1" smtClean="0"/>
-              <a:t>Propuesto</a:t>
-            </a:r>
-            <a:endParaRPr lang="en-US" sz="2400" dirty="0" smtClean="0"/>
-          </a:p>
-        </p:txBody>
-      </p:sp>
-      <p:sp>
-        <p:nvSpPr>
-          <p:cNvPr id="3" name="Content Placeholder 2"/>
-          <p:cNvSpPr>
-            <a:spLocks noGrp="1"/>
-          </p:cNvSpPr>
+              <a:rPr lang="en-US" sz="2400" dirty="0"/>
+              <a:t>Biased Random Key Genetic Algorithm</a:t>
+            </a:r>
+            <a:endParaRPr lang="es-AR" sz="2400" dirty="0"/>
+          </a:p>
+        </p:txBody>
+      </p:sp>
+      <p:pic>
+        <p:nvPicPr>
+          <p:cNvPr id="7" name="Content Placeholder 6"/>
+          <p:cNvPicPr>
+            <a:picLocks noGrp="1" noChangeAspect="1"/>
+          </p:cNvPicPr>
           <p:nvPr>
             <p:ph idx="1"/>
           </p:nvPr>
-        </p:nvSpPr>
+        </p:nvPicPr>
+        <p:blipFill>
+          <a:blip r:embed="rId2">
+            <a:extLst>
+              <a:ext uri="{28A0092B-C50C-407E-A947-70E740481C1C}">
+                <a14:useLocalDpi xmlns:a14="http://schemas.microsoft.com/office/drawing/2010/main" val="0"/>
+              </a:ext>
+            </a:extLst>
+          </a:blip>
+          <a:stretch>
+            <a:fillRect/>
+          </a:stretch>
+        </p:blipFill>
         <p:spPr>
           <a:xfrm>
-            <a:off x="457200" y="908720"/>
-            <a:ext cx="8229600" cy="5217443"/>
+            <a:off x="395536" y="764704"/>
+            <a:ext cx="8443399" cy="5760293"/>
           </a:xfrm>
         </p:spPr>
-        <p:txBody>
-          <a:bodyPr>
-            <a:normAutofit/>
-          </a:bodyPr>
-          <a:lstStyle/>
-          <a:p>
-            <a:r>
-              <a:rPr lang="en-US" sz="2000" dirty="0" smtClean="0"/>
-              <a:t>TODO: </a:t>
-            </a:r>
-            <a:r>
-              <a:rPr lang="en-US" sz="2000" dirty="0" err="1" smtClean="0"/>
-              <a:t>Imagen</a:t>
-            </a:r>
-            <a:r>
-              <a:rPr lang="en-US" sz="2000" dirty="0" smtClean="0"/>
-              <a:t> </a:t>
-            </a:r>
-            <a:r>
-              <a:rPr lang="en-US" sz="2000" dirty="0" err="1" smtClean="0"/>
-              <a:t>cuadrados</a:t>
-            </a:r>
-            <a:r>
-              <a:rPr lang="en-US" sz="2000" dirty="0" smtClean="0"/>
-              <a:t> y </a:t>
-            </a:r>
-            <a:r>
-              <a:rPr lang="en-US" sz="2000" dirty="0" err="1" smtClean="0"/>
-              <a:t>flujo</a:t>
-            </a:r>
-            <a:r>
-              <a:rPr lang="en-US" sz="2000" dirty="0" smtClean="0"/>
-              <a:t> Global</a:t>
-            </a:r>
-          </a:p>
-          <a:p>
-            <a:r>
-              <a:rPr lang="en-US" sz="2000" dirty="0" smtClean="0"/>
-              <a:t>Se </a:t>
-            </a:r>
-            <a:r>
-              <a:rPr lang="en-US" sz="2000" dirty="0" err="1" smtClean="0"/>
-              <a:t>tiene</a:t>
-            </a:r>
-            <a:r>
-              <a:rPr lang="en-US" sz="2000" dirty="0" smtClean="0"/>
-              <a:t> </a:t>
-            </a:r>
-            <a:r>
-              <a:rPr lang="en-US" sz="2000" dirty="0" err="1" smtClean="0"/>
-              <a:t>que</a:t>
-            </a:r>
-            <a:r>
-              <a:rPr lang="en-US" sz="2000" dirty="0" smtClean="0"/>
-              <a:t> </a:t>
-            </a:r>
-            <a:r>
-              <a:rPr lang="en-US" sz="2000" dirty="0" err="1" smtClean="0"/>
-              <a:t>ver</a:t>
-            </a:r>
-            <a:r>
-              <a:rPr lang="en-US" sz="2000" dirty="0" smtClean="0"/>
-              <a:t> </a:t>
-            </a:r>
-            <a:r>
-              <a:rPr lang="en-US" sz="2000" dirty="0" err="1" smtClean="0"/>
-              <a:t>Decodificador</a:t>
-            </a:r>
-            <a:r>
-              <a:rPr lang="en-US" sz="2000" dirty="0" smtClean="0"/>
-              <a:t>, Crossover, BL, </a:t>
-            </a:r>
-            <a:r>
-              <a:rPr lang="en-US" sz="2000" dirty="0" err="1" smtClean="0"/>
-              <a:t>condicion</a:t>
-            </a:r>
-            <a:r>
-              <a:rPr lang="en-US" sz="2000" dirty="0" smtClean="0"/>
-              <a:t> de </a:t>
-            </a:r>
-            <a:r>
-              <a:rPr lang="en-US" sz="2000" dirty="0" err="1" smtClean="0"/>
-              <a:t>corte</a:t>
-            </a:r>
-            <a:r>
-              <a:rPr lang="en-US" sz="2000" dirty="0" smtClean="0"/>
-              <a:t> y </a:t>
-            </a:r>
-            <a:r>
-              <a:rPr lang="en-US" sz="2000" dirty="0" err="1" smtClean="0"/>
-              <a:t>codificador</a:t>
-            </a:r>
-            <a:r>
-              <a:rPr lang="en-US" sz="2000" dirty="0" smtClean="0"/>
-              <a:t> (</a:t>
-            </a:r>
-            <a:r>
-              <a:rPr lang="en-US" sz="2000" dirty="0" err="1" smtClean="0"/>
-              <a:t>buscar</a:t>
-            </a:r>
-            <a:r>
-              <a:rPr lang="en-US" sz="2000" dirty="0" smtClean="0"/>
-              <a:t> la </a:t>
-            </a:r>
-            <a:r>
-              <a:rPr lang="en-US" sz="2000" dirty="0" err="1" smtClean="0"/>
-              <a:t>que</a:t>
-            </a:r>
-            <a:r>
-              <a:rPr lang="en-US" sz="2000" dirty="0" smtClean="0"/>
-              <a:t> </a:t>
-            </a:r>
-            <a:r>
-              <a:rPr lang="en-US" sz="2000" dirty="0" err="1" smtClean="0"/>
-              <a:t>sabes</a:t>
-            </a:r>
-            <a:r>
-              <a:rPr lang="en-US" sz="2000" dirty="0" smtClean="0"/>
-              <a:t> y </a:t>
-            </a:r>
-            <a:r>
-              <a:rPr lang="en-US" sz="2000" dirty="0" err="1" smtClean="0"/>
-              <a:t>acomodarla</a:t>
-            </a:r>
-            <a:r>
-              <a:rPr lang="en-US" sz="2000" dirty="0" smtClean="0"/>
-              <a:t> a </a:t>
-            </a:r>
-            <a:r>
-              <a:rPr lang="en-US" sz="2000" dirty="0" err="1" smtClean="0"/>
-              <a:t>tu</a:t>
-            </a:r>
-            <a:r>
-              <a:rPr lang="en-US" sz="2000" dirty="0" smtClean="0"/>
-              <a:t> </a:t>
-            </a:r>
-            <a:r>
-              <a:rPr lang="en-US" sz="2000" dirty="0" err="1" smtClean="0"/>
-              <a:t>implementacion</a:t>
-            </a:r>
-            <a:r>
-              <a:rPr lang="en-US" sz="2000" dirty="0" smtClean="0"/>
-              <a:t>)</a:t>
-            </a:r>
-            <a:endParaRPr lang="es-AR" sz="2000" dirty="0"/>
-          </a:p>
-        </p:txBody>
-      </p:sp>
+      </p:pic>
     </p:spTree>
     <p:extLst>
       <p:ext uri="{BB962C8B-B14F-4D97-AF65-F5344CB8AC3E}">

</xml_diff>

<commit_message>
Avance un poco. Falta: 1. Resultados 2. Corregir 3. Ponerle un minimo de color
</commit_message>
<xml_diff>
--- a/TesisPaper/Defensa/Biased Random Key Genetic Algorithm.pptx
+++ b/TesisPaper/Defensa/Biased Random Key Genetic Algorithm.pptx
@@ -19,9 +19,13 @@
     <p:sldId id="265" r:id="rId13"/>
     <p:sldId id="274" r:id="rId14"/>
     <p:sldId id="275" r:id="rId15"/>
-    <p:sldId id="268" r:id="rId16"/>
-    <p:sldId id="269" r:id="rId17"/>
-    <p:sldId id="270" r:id="rId18"/>
+    <p:sldId id="276" r:id="rId16"/>
+    <p:sldId id="277" r:id="rId17"/>
+    <p:sldId id="278" r:id="rId18"/>
+    <p:sldId id="268" r:id="rId19"/>
+    <p:sldId id="269" r:id="rId20"/>
+    <p:sldId id="279" r:id="rId21"/>
+    <p:sldId id="270" r:id="rId22"/>
   </p:sldIdLst>
   <p:sldSz cx="9144000" cy="6858000" type="screen4x3"/>
   <p:notesSz cx="6858000" cy="9144000"/>
@@ -304,7 +308,7 @@
           <a:p>
             <a:fld id="{187174D4-BBC9-49E1-BF8F-684BE480328B}" type="datetimeFigureOut">
               <a:rPr lang="es-AR" smtClean="0"/>
-              <a:t>18/4/2018</a:t>
+              <a:t>26/4/2018</a:t>
             </a:fld>
             <a:endParaRPr lang="es-AR"/>
           </a:p>
@@ -474,7 +478,7 @@
           <a:p>
             <a:fld id="{187174D4-BBC9-49E1-BF8F-684BE480328B}" type="datetimeFigureOut">
               <a:rPr lang="es-AR" smtClean="0"/>
-              <a:t>18/4/2018</a:t>
+              <a:t>26/4/2018</a:t>
             </a:fld>
             <a:endParaRPr lang="es-AR"/>
           </a:p>
@@ -654,7 +658,7 @@
           <a:p>
             <a:fld id="{187174D4-BBC9-49E1-BF8F-684BE480328B}" type="datetimeFigureOut">
               <a:rPr lang="es-AR" smtClean="0"/>
-              <a:t>18/4/2018</a:t>
+              <a:t>26/4/2018</a:t>
             </a:fld>
             <a:endParaRPr lang="es-AR"/>
           </a:p>
@@ -824,7 +828,7 @@
           <a:p>
             <a:fld id="{187174D4-BBC9-49E1-BF8F-684BE480328B}" type="datetimeFigureOut">
               <a:rPr lang="es-AR" smtClean="0"/>
-              <a:t>18/4/2018</a:t>
+              <a:t>26/4/2018</a:t>
             </a:fld>
             <a:endParaRPr lang="es-AR"/>
           </a:p>
@@ -1070,7 +1074,7 @@
           <a:p>
             <a:fld id="{187174D4-BBC9-49E1-BF8F-684BE480328B}" type="datetimeFigureOut">
               <a:rPr lang="es-AR" smtClean="0"/>
-              <a:t>18/4/2018</a:t>
+              <a:t>26/4/2018</a:t>
             </a:fld>
             <a:endParaRPr lang="es-AR"/>
           </a:p>
@@ -1358,7 +1362,7 @@
           <a:p>
             <a:fld id="{187174D4-BBC9-49E1-BF8F-684BE480328B}" type="datetimeFigureOut">
               <a:rPr lang="es-AR" smtClean="0"/>
-              <a:t>18/4/2018</a:t>
+              <a:t>26/4/2018</a:t>
             </a:fld>
             <a:endParaRPr lang="es-AR"/>
           </a:p>
@@ -1780,7 +1784,7 @@
           <a:p>
             <a:fld id="{187174D4-BBC9-49E1-BF8F-684BE480328B}" type="datetimeFigureOut">
               <a:rPr lang="es-AR" smtClean="0"/>
-              <a:t>18/4/2018</a:t>
+              <a:t>26/4/2018</a:t>
             </a:fld>
             <a:endParaRPr lang="es-AR"/>
           </a:p>
@@ -1898,7 +1902,7 @@
           <a:p>
             <a:fld id="{187174D4-BBC9-49E1-BF8F-684BE480328B}" type="datetimeFigureOut">
               <a:rPr lang="es-AR" smtClean="0"/>
-              <a:t>18/4/2018</a:t>
+              <a:t>26/4/2018</a:t>
             </a:fld>
             <a:endParaRPr lang="es-AR"/>
           </a:p>
@@ -1993,7 +1997,7 @@
           <a:p>
             <a:fld id="{187174D4-BBC9-49E1-BF8F-684BE480328B}" type="datetimeFigureOut">
               <a:rPr lang="es-AR" smtClean="0"/>
-              <a:t>18/4/2018</a:t>
+              <a:t>26/4/2018</a:t>
             </a:fld>
             <a:endParaRPr lang="es-AR"/>
           </a:p>
@@ -2270,7 +2274,7 @@
           <a:p>
             <a:fld id="{187174D4-BBC9-49E1-BF8F-684BE480328B}" type="datetimeFigureOut">
               <a:rPr lang="es-AR" smtClean="0"/>
-              <a:t>18/4/2018</a:t>
+              <a:t>26/4/2018</a:t>
             </a:fld>
             <a:endParaRPr lang="es-AR"/>
           </a:p>
@@ -2523,7 +2527,7 @@
           <a:p>
             <a:fld id="{187174D4-BBC9-49E1-BF8F-684BE480328B}" type="datetimeFigureOut">
               <a:rPr lang="es-AR" smtClean="0"/>
-              <a:t>18/4/2018</a:t>
+              <a:t>26/4/2018</a:t>
             </a:fld>
             <a:endParaRPr lang="es-AR"/>
           </a:p>
@@ -2736,7 +2740,7 @@
           <a:p>
             <a:fld id="{187174D4-BBC9-49E1-BF8F-684BE480328B}" type="datetimeFigureOut">
               <a:rPr lang="es-AR" smtClean="0"/>
-              <a:t>18/4/2018</a:t>
+              <a:t>26/4/2018</a:t>
             </a:fld>
             <a:endParaRPr lang="es-AR"/>
           </a:p>
@@ -3548,11 +3552,7 @@
             </a:r>
             <a:r>
               <a:rPr lang="en-US" sz="2800" dirty="0" smtClean="0"/>
-              <a:t> </a:t>
-            </a:r>
-            <a:r>
-              <a:rPr lang="en-US" sz="2800" dirty="0" smtClean="0"/>
-              <a:t>de la </a:t>
+              <a:t> de la </a:t>
             </a:r>
             <a:r>
               <a:rPr lang="en-US" sz="2800" dirty="0" err="1" smtClean="0"/>
@@ -3639,11 +3639,7 @@
             </a:r>
             <a:r>
               <a:rPr lang="en-US" sz="2000" dirty="0" smtClean="0"/>
-              <a:t> vector </a:t>
-            </a:r>
-            <a:r>
-              <a:rPr lang="en-US" sz="2000" dirty="0" smtClean="0"/>
-              <a:t>de </a:t>
+              <a:t> vector de </a:t>
             </a:r>
             <a:r>
               <a:rPr lang="en-US" sz="2000" dirty="0" err="1" smtClean="0"/>
@@ -3651,11 +3647,7 @@
             </a:r>
             <a:r>
               <a:rPr lang="en-US" sz="2000" dirty="0" smtClean="0"/>
-              <a:t> </a:t>
-            </a:r>
-            <a:r>
-              <a:rPr lang="en-US" sz="2000" dirty="0" smtClean="0"/>
-              <a:t>se </a:t>
+              <a:t> se </a:t>
             </a:r>
             <a:r>
               <a:rPr lang="en-US" sz="2000" dirty="0" err="1" smtClean="0"/>
@@ -3663,11 +3655,7 @@
             </a:r>
             <a:r>
               <a:rPr lang="en-US" sz="2000" dirty="0" smtClean="0"/>
-              <a:t> </a:t>
-            </a:r>
-            <a:r>
-              <a:rPr lang="en-US" sz="2000" dirty="0" smtClean="0"/>
-              <a:t>en </a:t>
+              <a:t> en </a:t>
             </a:r>
             <a:r>
               <a:rPr lang="en-US" sz="2000" dirty="0" err="1" smtClean="0"/>
@@ -3691,11 +3679,7 @@
             </a:r>
             <a:r>
               <a:rPr lang="en-US" sz="2000" dirty="0" smtClean="0"/>
-              <a:t> </a:t>
-            </a:r>
-            <a:r>
-              <a:rPr lang="en-US" sz="2000" dirty="0" smtClean="0"/>
-              <a:t>del </a:t>
+              <a:t> del </a:t>
             </a:r>
             <a:r>
               <a:rPr lang="en-US" sz="2000" dirty="0" err="1" smtClean="0"/>
@@ -4170,15 +4154,7 @@
             </a:r>
             <a:r>
               <a:rPr lang="en-US" sz="2800" dirty="0" smtClean="0"/>
-              <a:t> </a:t>
-            </a:r>
-            <a:r>
-              <a:rPr lang="en-US" sz="2800" dirty="0" smtClean="0"/>
-              <a:t>locales </a:t>
-            </a:r>
-            <a:r>
-              <a:rPr lang="en-US" sz="2800" dirty="0" smtClean="0"/>
-              <a:t>a </a:t>
+              <a:t> locales a </a:t>
             </a:r>
             <a:r>
               <a:rPr lang="en-US" sz="2800" dirty="0" err="1" smtClean="0"/>
@@ -4752,358 +4728,54 @@
             </a:pPr>
             <a:r>
               <a:rPr lang="en-US" sz="2000" dirty="0" err="1" smtClean="0"/>
-              <a:t>Todo</a:t>
-            </a:r>
-            <a:r>
-              <a:rPr lang="en-US" sz="2000" dirty="0" smtClean="0"/>
-              <a:t>: </a:t>
-            </a:r>
-            <a:r>
-              <a:rPr lang="en-US" sz="2000" dirty="0" err="1" smtClean="0"/>
-              <a:t>Imagen</a:t>
-            </a:r>
-            <a:r>
-              <a:rPr lang="en-US" sz="2000" dirty="0" smtClean="0"/>
-              <a:t> de </a:t>
-            </a:r>
-            <a:r>
-              <a:rPr lang="en-US" sz="2000" dirty="0" err="1" smtClean="0"/>
-              <a:t>ejemplo</a:t>
-            </a:r>
-            <a:endParaRPr lang="en-US" sz="2000" dirty="0" smtClean="0"/>
-          </a:p>
-          <a:p>
-            <a:r>
-              <a:rPr lang="en-US" sz="2800" dirty="0" err="1" smtClean="0"/>
-              <a:t>Codificación</a:t>
-            </a:r>
-            <a:r>
-              <a:rPr lang="en-US" sz="2800" dirty="0" smtClean="0"/>
-              <a:t> de </a:t>
-            </a:r>
-            <a:r>
-              <a:rPr lang="en-US" sz="2800" dirty="0" err="1" smtClean="0"/>
-              <a:t>las</a:t>
-            </a:r>
-            <a:r>
-              <a:rPr lang="en-US" sz="2800" dirty="0" smtClean="0"/>
-              <a:t> </a:t>
-            </a:r>
-            <a:r>
-              <a:rPr lang="en-US" sz="2800" dirty="0" err="1" smtClean="0"/>
-              <a:t>soluciones</a:t>
-            </a:r>
-            <a:r>
-              <a:rPr lang="en-US" sz="2800" dirty="0" smtClean="0"/>
-              <a:t> </a:t>
-            </a:r>
-            <a:r>
-              <a:rPr lang="en-US" sz="2800" dirty="0" err="1" smtClean="0"/>
-              <a:t>mejoradas</a:t>
-            </a:r>
-            <a:endParaRPr lang="en-US" sz="2800" dirty="0" smtClean="0"/>
-          </a:p>
-          <a:p>
-            <a:pPr lvl="1">
-              <a:buFont typeface="Wingdings" pitchFamily="2" charset="2"/>
-              <a:buChar char="§"/>
-            </a:pPr>
-            <a:r>
-              <a:rPr lang="en-US" sz="2000" dirty="0" err="1" smtClean="0"/>
-              <a:t>Actualización</a:t>
-            </a:r>
-            <a:r>
-              <a:rPr lang="en-US" sz="2000" dirty="0" smtClean="0"/>
-              <a:t> </a:t>
-            </a:r>
-            <a:r>
-              <a:rPr lang="en-US" sz="2000" dirty="0"/>
-              <a:t>del </a:t>
-            </a:r>
-            <a:r>
-              <a:rPr lang="en-US" sz="2000" dirty="0" err="1" smtClean="0"/>
-              <a:t>código</a:t>
-            </a:r>
-            <a:r>
-              <a:rPr lang="en-US" sz="2000" dirty="0" smtClean="0"/>
-              <a:t> </a:t>
-            </a:r>
-            <a:r>
-              <a:rPr lang="en-US" sz="2000" dirty="0" err="1" smtClean="0"/>
-              <a:t>genético</a:t>
-            </a:r>
-            <a:r>
-              <a:rPr lang="en-US" sz="2000" dirty="0" smtClean="0"/>
-              <a:t> </a:t>
-            </a:r>
-            <a:r>
-              <a:rPr lang="en-US" sz="2000" dirty="0"/>
-              <a:t>post </a:t>
-            </a:r>
-            <a:r>
-              <a:rPr lang="en-US" sz="2000" dirty="0" err="1" smtClean="0"/>
-              <a:t>búsqueda</a:t>
-            </a:r>
-            <a:r>
-              <a:rPr lang="en-US" sz="2000" dirty="0" smtClean="0"/>
-              <a:t> local</a:t>
-            </a:r>
-          </a:p>
-          <a:p>
-            <a:pPr lvl="1">
-              <a:buFont typeface="Wingdings" pitchFamily="2" charset="2"/>
-              <a:buChar char="§"/>
-            </a:pPr>
-            <a:r>
-              <a:rPr lang="en-US" sz="2000" dirty="0" err="1" smtClean="0"/>
-              <a:t>Todo</a:t>
-            </a:r>
-            <a:r>
-              <a:rPr lang="en-US" sz="2000" dirty="0" smtClean="0"/>
-              <a:t>: </a:t>
-            </a:r>
-            <a:r>
-              <a:rPr lang="en-US" sz="2000" dirty="0" err="1" smtClean="0"/>
-              <a:t>Imagen</a:t>
-            </a:r>
-            <a:r>
-              <a:rPr lang="en-US" sz="2000" dirty="0" smtClean="0"/>
-              <a:t> del </a:t>
-            </a:r>
-            <a:r>
-              <a:rPr lang="en-US" sz="2000" dirty="0" err="1" smtClean="0"/>
-              <a:t>codificador</a:t>
-            </a:r>
-            <a:r>
-              <a:rPr lang="en-US" sz="2000" dirty="0" smtClean="0"/>
-              <a:t> (</a:t>
-            </a:r>
-            <a:r>
-              <a:rPr lang="en-US" sz="2000" dirty="0" err="1" smtClean="0"/>
-              <a:t>reconstruccion</a:t>
-            </a:r>
-            <a:r>
-              <a:rPr lang="en-US" sz="2000" dirty="0" smtClean="0"/>
-              <a:t>) ?</a:t>
-            </a:r>
-          </a:p>
-          <a:p>
-            <a:r>
-              <a:rPr lang="en-US" sz="2800" dirty="0" err="1" smtClean="0"/>
-              <a:t>Evaluacion</a:t>
-            </a:r>
-            <a:r>
-              <a:rPr lang="en-US" sz="2800" dirty="0" smtClean="0"/>
-              <a:t> </a:t>
-            </a:r>
-            <a:r>
-              <a:rPr lang="en-US" sz="2800" dirty="0" smtClean="0"/>
-              <a:t>de </a:t>
-            </a:r>
-            <a:r>
-              <a:rPr lang="en-US" sz="2800" dirty="0" err="1" smtClean="0"/>
-              <a:t>condicion</a:t>
-            </a:r>
-            <a:r>
-              <a:rPr lang="en-US" sz="2800" dirty="0" smtClean="0"/>
-              <a:t> de </a:t>
-            </a:r>
-            <a:r>
-              <a:rPr lang="en-US" sz="2800" dirty="0" err="1" smtClean="0"/>
-              <a:t>corte</a:t>
-            </a:r>
-            <a:endParaRPr lang="en-US" sz="2800" dirty="0" smtClean="0"/>
-          </a:p>
-          <a:p>
-            <a:pPr lvl="1">
-              <a:buFont typeface="Wingdings" pitchFamily="2" charset="2"/>
-              <a:buChar char="§"/>
-            </a:pPr>
-            <a:r>
-              <a:rPr lang="en-US" sz="2000" dirty="0" err="1" smtClean="0"/>
-              <a:t>Mínima</a:t>
-            </a:r>
-            <a:r>
-              <a:rPr lang="en-US" sz="2000" dirty="0" smtClean="0"/>
-              <a:t> </a:t>
-            </a:r>
-            <a:r>
-              <a:rPr lang="en-US" sz="2000" dirty="0" err="1" smtClean="0"/>
-              <a:t>cantidad</a:t>
-            </a:r>
-            <a:r>
-              <a:rPr lang="en-US" sz="2000" dirty="0" smtClean="0"/>
-              <a:t> de </a:t>
-            </a:r>
-            <a:r>
-              <a:rPr lang="en-US" sz="2000" dirty="0" err="1" smtClean="0"/>
-              <a:t>generaciones</a:t>
-            </a:r>
-            <a:endParaRPr lang="en-US" sz="2000" dirty="0" smtClean="0"/>
-          </a:p>
-          <a:p>
-            <a:pPr lvl="1">
-              <a:buFont typeface="Wingdings" pitchFamily="2" charset="2"/>
-              <a:buChar char="§"/>
-            </a:pPr>
-            <a:r>
-              <a:rPr lang="en-US" sz="2000" dirty="0" err="1" smtClean="0"/>
-              <a:t>Ultimas</a:t>
-            </a:r>
-            <a:r>
-              <a:rPr lang="en-US" sz="2000" dirty="0" smtClean="0"/>
-              <a:t> X </a:t>
-            </a:r>
-            <a:r>
-              <a:rPr lang="en-US" sz="2000" dirty="0" err="1" smtClean="0"/>
-              <a:t>generaci</a:t>
-            </a:r>
-            <a:r>
-              <a:rPr lang="en-US" sz="2000" dirty="0" err="1" smtClean="0"/>
-              <a:t>ónes</a:t>
-            </a:r>
-            <a:r>
-              <a:rPr lang="en-US" sz="2000" dirty="0" smtClean="0"/>
-              <a:t> sin  </a:t>
-            </a:r>
-            <a:r>
-              <a:rPr lang="en-US" sz="2000" dirty="0" err="1" smtClean="0"/>
-              <a:t>que</a:t>
-            </a:r>
-            <a:r>
-              <a:rPr lang="en-US" sz="2000" dirty="0" smtClean="0"/>
-              <a:t> se </a:t>
-            </a:r>
-            <a:r>
-              <a:rPr lang="en-US" sz="2000" dirty="0" err="1" smtClean="0"/>
-              <a:t>haya</a:t>
-            </a:r>
-            <a:r>
-              <a:rPr lang="en-US" sz="2000" dirty="0" smtClean="0"/>
-              <a:t> </a:t>
-            </a:r>
-            <a:r>
-              <a:rPr lang="en-US" sz="2000" dirty="0" err="1" smtClean="0"/>
-              <a:t>modificado</a:t>
-            </a:r>
-            <a:r>
-              <a:rPr lang="en-US" sz="2000" dirty="0" smtClean="0"/>
-              <a:t> el </a:t>
-            </a:r>
-            <a:r>
-              <a:rPr lang="en-US" sz="2000" dirty="0" err="1" smtClean="0"/>
-              <a:t>mejor</a:t>
-            </a:r>
-            <a:r>
-              <a:rPr lang="en-US" sz="2000" dirty="0" smtClean="0"/>
-              <a:t> </a:t>
-            </a:r>
-            <a:r>
-              <a:rPr lang="en-US" sz="2000" dirty="0" err="1" smtClean="0"/>
-              <a:t>beneficio</a:t>
-            </a:r>
-            <a:r>
-              <a:rPr lang="en-US" sz="2000" dirty="0" smtClean="0"/>
-              <a:t> </a:t>
-            </a:r>
-            <a:r>
-              <a:rPr lang="en-US" sz="2000" dirty="0" err="1" smtClean="0"/>
-              <a:t>obtenido</a:t>
-            </a:r>
-            <a:endParaRPr lang="en-US" sz="2000" dirty="0" smtClean="0"/>
-          </a:p>
-          <a:p>
-            <a:pPr lvl="1">
-              <a:buFont typeface="Wingdings" pitchFamily="2" charset="2"/>
-              <a:buChar char="§"/>
-            </a:pPr>
-            <a:r>
-              <a:rPr lang="en-US" sz="2000" dirty="0" smtClean="0"/>
-              <a:t>Si no se </a:t>
-            </a:r>
-            <a:r>
-              <a:rPr lang="en-US" sz="2000" dirty="0" err="1" smtClean="0"/>
-              <a:t>cumple</a:t>
-            </a:r>
-            <a:r>
-              <a:rPr lang="en-US" sz="2000" dirty="0" err="1" smtClean="0"/>
-              <a:t>n</a:t>
-            </a:r>
-            <a:r>
-              <a:rPr lang="en-US" sz="2000" dirty="0" smtClean="0"/>
-              <a:t> </a:t>
-            </a:r>
-            <a:r>
-              <a:rPr lang="en-US" sz="2000" dirty="0" err="1" smtClean="0"/>
-              <a:t>las</a:t>
-            </a:r>
-            <a:r>
-              <a:rPr lang="en-US" sz="2000" dirty="0" smtClean="0"/>
-              <a:t> </a:t>
-            </a:r>
-            <a:r>
-              <a:rPr lang="en-US" sz="2000" dirty="0" err="1" smtClean="0"/>
-              <a:t>condiciones</a:t>
-            </a:r>
-            <a:r>
-              <a:rPr lang="en-US" sz="2000" dirty="0" smtClean="0"/>
-              <a:t>, </a:t>
-            </a:r>
-            <a:r>
-              <a:rPr lang="en-US" sz="2000" dirty="0" err="1" smtClean="0"/>
-              <a:t>vuelve</a:t>
-            </a:r>
-            <a:r>
-              <a:rPr lang="en-US" sz="2000" dirty="0" smtClean="0"/>
-              <a:t> a </a:t>
-            </a:r>
-            <a:r>
-              <a:rPr lang="en-US" sz="2000" dirty="0" err="1" smtClean="0"/>
-              <a:t>evolucionar</a:t>
-            </a:r>
-            <a:r>
-              <a:rPr lang="en-US" sz="2000" dirty="0" smtClean="0"/>
-              <a:t> la </a:t>
-            </a:r>
-            <a:r>
-              <a:rPr lang="en-US" sz="2000" dirty="0" err="1" smtClean="0"/>
-              <a:t>población</a:t>
-            </a:r>
-            <a:r>
-              <a:rPr lang="en-US" sz="2000" dirty="0" smtClean="0"/>
-              <a:t>  </a:t>
-            </a:r>
-            <a:endParaRPr lang="en-US" sz="2000" dirty="0" smtClean="0"/>
-          </a:p>
-          <a:p>
-            <a:r>
-              <a:rPr lang="en-US" sz="2800" dirty="0" err="1" smtClean="0"/>
-              <a:t>Retorno</a:t>
-            </a:r>
-            <a:r>
-              <a:rPr lang="en-US" sz="2800" dirty="0" smtClean="0"/>
-              <a:t> de la </a:t>
-            </a:r>
-            <a:r>
-              <a:rPr lang="en-US" sz="2800" dirty="0" err="1" smtClean="0"/>
-              <a:t>mejor</a:t>
-            </a:r>
-            <a:r>
-              <a:rPr lang="en-US" sz="2800" dirty="0" smtClean="0"/>
-              <a:t> </a:t>
-            </a:r>
-            <a:r>
-              <a:rPr lang="en-US" sz="2800" dirty="0" err="1" smtClean="0"/>
-              <a:t>solucion</a:t>
-            </a:r>
-            <a:endParaRPr lang="en-US" sz="2800" dirty="0" smtClean="0"/>
-          </a:p>
-          <a:p>
-            <a:pPr lvl="1"/>
-            <a:endParaRPr lang="es-AR" sz="1600" dirty="0"/>
-          </a:p>
-        </p:txBody>
-      </p:sp>
+              <a:t>Orden</a:t>
+            </a:r>
+            <a:r>
+              <a:rPr lang="en-US" sz="2000" dirty="0" smtClean="0"/>
+              <a:t> </a:t>
+            </a:r>
+            <a:r>
+              <a:rPr lang="en-US" sz="2000" dirty="0" err="1" smtClean="0"/>
+              <a:t>respecto</a:t>
+            </a:r>
+            <a:r>
+              <a:rPr lang="en-US" sz="2000" dirty="0" smtClean="0"/>
+              <a:t> del COG: C7, C5, C8 y C6</a:t>
+            </a:r>
+            <a:endParaRPr lang="es-AR" sz="2000" dirty="0"/>
+          </a:p>
+        </p:txBody>
+      </p:sp>
+      <p:pic>
+        <p:nvPicPr>
+          <p:cNvPr id="4" name="Picture 3"/>
+          <p:cNvPicPr>
+            <a:picLocks noChangeAspect="1"/>
+          </p:cNvPicPr>
+          <p:nvPr/>
+        </p:nvPicPr>
+        <p:blipFill>
+          <a:blip r:embed="rId2">
+            <a:extLst>
+              <a:ext uri="{28A0092B-C50C-407E-A947-70E740481C1C}">
+                <a14:useLocalDpi xmlns:a14="http://schemas.microsoft.com/office/drawing/2010/main" val="0"/>
+              </a:ext>
+            </a:extLst>
+          </a:blip>
+          <a:stretch>
+            <a:fillRect/>
+          </a:stretch>
+        </p:blipFill>
+        <p:spPr>
+          <a:xfrm>
+            <a:off x="954297" y="1844824"/>
+            <a:ext cx="6984776" cy="4742431"/>
+          </a:xfrm>
+          <a:prstGeom prst="rect">
+            <a:avLst/>
+          </a:prstGeom>
+        </p:spPr>
+      </p:pic>
     </p:spTree>
     <p:extLst>
       <p:ext uri="{BB962C8B-B14F-4D97-AF65-F5344CB8AC3E}">
@@ -5159,7 +4831,15 @@
             <a:pPr algn="r"/>
             <a:r>
               <a:rPr lang="en-US" sz="2400" dirty="0" err="1" smtClean="0"/>
-              <a:t>Resultados</a:t>
+              <a:t>Algoritmo</a:t>
+            </a:r>
+            <a:r>
+              <a:rPr lang="en-US" sz="2400" dirty="0" smtClean="0"/>
+              <a:t> </a:t>
+            </a:r>
+            <a:r>
+              <a:rPr lang="en-US" sz="2400" dirty="0" err="1" smtClean="0"/>
+              <a:t>Propuesto</a:t>
             </a:r>
             <a:endParaRPr lang="en-US" sz="2400" dirty="0" smtClean="0"/>
           </a:p>
@@ -5188,6 +4868,635 @@
           <a:lstStyle/>
           <a:p>
             <a:r>
+              <a:rPr lang="en-US" sz="2800" dirty="0" err="1" smtClean="0"/>
+              <a:t>Codificación</a:t>
+            </a:r>
+            <a:r>
+              <a:rPr lang="en-US" sz="2800" dirty="0" smtClean="0"/>
+              <a:t> </a:t>
+            </a:r>
+            <a:r>
+              <a:rPr lang="en-US" sz="2800" dirty="0" smtClean="0"/>
+              <a:t>de </a:t>
+            </a:r>
+            <a:r>
+              <a:rPr lang="en-US" sz="2800" dirty="0" err="1" smtClean="0"/>
+              <a:t>las</a:t>
+            </a:r>
+            <a:r>
+              <a:rPr lang="en-US" sz="2800" dirty="0" smtClean="0"/>
+              <a:t> </a:t>
+            </a:r>
+            <a:r>
+              <a:rPr lang="en-US" sz="2800" dirty="0" err="1" smtClean="0"/>
+              <a:t>soluciones</a:t>
+            </a:r>
+            <a:r>
+              <a:rPr lang="en-US" sz="2800" dirty="0" smtClean="0"/>
+              <a:t> </a:t>
+            </a:r>
+            <a:r>
+              <a:rPr lang="en-US" sz="2800" dirty="0" err="1" smtClean="0"/>
+              <a:t>mejoradas</a:t>
+            </a:r>
+            <a:endParaRPr lang="en-US" sz="2800" dirty="0" smtClean="0"/>
+          </a:p>
+          <a:p>
+            <a:pPr lvl="1">
+              <a:buFont typeface="Wingdings" pitchFamily="2" charset="2"/>
+              <a:buChar char="§"/>
+            </a:pPr>
+            <a:r>
+              <a:rPr lang="en-US" sz="2000" dirty="0" err="1" smtClean="0"/>
+              <a:t>Actualización</a:t>
+            </a:r>
+            <a:r>
+              <a:rPr lang="en-US" sz="2000" dirty="0" smtClean="0"/>
+              <a:t> </a:t>
+            </a:r>
+            <a:r>
+              <a:rPr lang="en-US" sz="2000" dirty="0"/>
+              <a:t>del </a:t>
+            </a:r>
+            <a:r>
+              <a:rPr lang="en-US" sz="2000" dirty="0" err="1" smtClean="0"/>
+              <a:t>código</a:t>
+            </a:r>
+            <a:r>
+              <a:rPr lang="en-US" sz="2000" dirty="0" smtClean="0"/>
+              <a:t> </a:t>
+            </a:r>
+            <a:r>
+              <a:rPr lang="en-US" sz="2000" dirty="0" err="1" smtClean="0"/>
+              <a:t>genético</a:t>
+            </a:r>
+            <a:r>
+              <a:rPr lang="en-US" sz="2000" dirty="0" smtClean="0"/>
+              <a:t> </a:t>
+            </a:r>
+            <a:r>
+              <a:rPr lang="en-US" sz="2000" dirty="0"/>
+              <a:t>post </a:t>
+            </a:r>
+            <a:r>
+              <a:rPr lang="en-US" sz="2000" dirty="0" err="1" smtClean="0"/>
+              <a:t>búsqueda</a:t>
+            </a:r>
+            <a:r>
+              <a:rPr lang="en-US" sz="2000" dirty="0" smtClean="0"/>
+              <a:t> </a:t>
+            </a:r>
+            <a:r>
+              <a:rPr lang="en-US" sz="2000" dirty="0" smtClean="0"/>
+              <a:t>local</a:t>
+            </a:r>
+            <a:endParaRPr lang="es-AR" sz="1600" dirty="0"/>
+          </a:p>
+        </p:txBody>
+      </p:sp>
+      <p:pic>
+        <p:nvPicPr>
+          <p:cNvPr id="4" name="Picture 3"/>
+          <p:cNvPicPr>
+            <a:picLocks noChangeAspect="1"/>
+          </p:cNvPicPr>
+          <p:nvPr/>
+        </p:nvPicPr>
+        <p:blipFill>
+          <a:blip r:embed="rId2">
+            <a:extLst>
+              <a:ext uri="{28A0092B-C50C-407E-A947-70E740481C1C}">
+                <a14:useLocalDpi xmlns:a14="http://schemas.microsoft.com/office/drawing/2010/main" val="0"/>
+              </a:ext>
+            </a:extLst>
+          </a:blip>
+          <a:stretch>
+            <a:fillRect/>
+          </a:stretch>
+        </p:blipFill>
+        <p:spPr>
+          <a:xfrm>
+            <a:off x="395535" y="1844824"/>
+            <a:ext cx="8385571" cy="4752528"/>
+          </a:xfrm>
+          <a:prstGeom prst="rect">
+            <a:avLst/>
+          </a:prstGeom>
+        </p:spPr>
+      </p:pic>
+    </p:spTree>
+    <p:extLst>
+      <p:ext uri="{BB962C8B-B14F-4D97-AF65-F5344CB8AC3E}">
+        <p14:creationId xmlns:p14="http://schemas.microsoft.com/office/powerpoint/2010/main" val="3984026809"/>
+      </p:ext>
+    </p:extLst>
+  </p:cSld>
+  <p:clrMapOvr>
+    <a:masterClrMapping/>
+  </p:clrMapOvr>
+</p:sld>
+</file>
+
+<file path=ppt/slides/slide16.xml><?xml version="1.0" encoding="utf-8"?>
+<p:sld xmlns:a="http://schemas.openxmlformats.org/drawingml/2006/main" xmlns:r="http://schemas.openxmlformats.org/officeDocument/2006/relationships" xmlns:p="http://schemas.openxmlformats.org/presentationml/2006/main">
+  <p:cSld>
+    <p:spTree>
+      <p:nvGrpSpPr>
+        <p:cNvPr id="1" name=""/>
+        <p:cNvGrpSpPr/>
+        <p:nvPr/>
+      </p:nvGrpSpPr>
+      <p:grpSpPr>
+        <a:xfrm>
+          <a:off x="0" y="0"/>
+          <a:ext cx="0" cy="0"/>
+          <a:chOff x="0" y="0"/>
+          <a:chExt cx="0" cy="0"/>
+        </a:xfrm>
+      </p:grpSpPr>
+      <p:sp>
+        <p:nvSpPr>
+          <p:cNvPr id="2" name="Title 1"/>
+          <p:cNvSpPr>
+            <a:spLocks noGrp="1"/>
+          </p:cNvSpPr>
+          <p:nvPr>
+            <p:ph type="title"/>
+          </p:nvPr>
+        </p:nvSpPr>
+        <p:spPr>
+          <a:xfrm>
+            <a:off x="457200" y="274638"/>
+            <a:ext cx="8229600" cy="418058"/>
+          </a:xfrm>
+        </p:spPr>
+        <p:txBody>
+          <a:bodyPr>
+            <a:normAutofit fontScale="90000"/>
+          </a:bodyPr>
+          <a:lstStyle/>
+          <a:p>
+            <a:pPr algn="r"/>
+            <a:r>
+              <a:rPr lang="en-US" sz="2400" dirty="0" err="1" smtClean="0"/>
+              <a:t>Algoritmo</a:t>
+            </a:r>
+            <a:r>
+              <a:rPr lang="en-US" sz="2400" dirty="0" smtClean="0"/>
+              <a:t> </a:t>
+            </a:r>
+            <a:r>
+              <a:rPr lang="en-US" sz="2400" dirty="0" err="1" smtClean="0"/>
+              <a:t>Propuesto</a:t>
+            </a:r>
+            <a:endParaRPr lang="en-US" sz="2400" dirty="0" smtClean="0"/>
+          </a:p>
+        </p:txBody>
+      </p:sp>
+      <p:pic>
+        <p:nvPicPr>
+          <p:cNvPr id="4" name="Content Placeholder 3"/>
+          <p:cNvPicPr>
+            <a:picLocks noGrp="1" noChangeAspect="1"/>
+          </p:cNvPicPr>
+          <p:nvPr>
+            <p:ph idx="1"/>
+          </p:nvPr>
+        </p:nvPicPr>
+        <p:blipFill>
+          <a:blip r:embed="rId2">
+            <a:extLst>
+              <a:ext uri="{28A0092B-C50C-407E-A947-70E740481C1C}">
+                <a14:useLocalDpi xmlns:a14="http://schemas.microsoft.com/office/drawing/2010/main" val="0"/>
+              </a:ext>
+            </a:extLst>
+          </a:blip>
+          <a:stretch>
+            <a:fillRect/>
+          </a:stretch>
+        </p:blipFill>
+        <p:spPr>
+          <a:xfrm>
+            <a:off x="457200" y="1032161"/>
+            <a:ext cx="8229600" cy="4969890"/>
+          </a:xfrm>
+        </p:spPr>
+      </p:pic>
+    </p:spTree>
+    <p:extLst>
+      <p:ext uri="{BB962C8B-B14F-4D97-AF65-F5344CB8AC3E}">
+        <p14:creationId xmlns:p14="http://schemas.microsoft.com/office/powerpoint/2010/main" val="2559275626"/>
+      </p:ext>
+    </p:extLst>
+  </p:cSld>
+  <p:clrMapOvr>
+    <a:masterClrMapping/>
+  </p:clrMapOvr>
+</p:sld>
+</file>
+
+<file path=ppt/slides/slide17.xml><?xml version="1.0" encoding="utf-8"?>
+<p:sld xmlns:a="http://schemas.openxmlformats.org/drawingml/2006/main" xmlns:r="http://schemas.openxmlformats.org/officeDocument/2006/relationships" xmlns:p="http://schemas.openxmlformats.org/presentationml/2006/main">
+  <p:cSld>
+    <p:spTree>
+      <p:nvGrpSpPr>
+        <p:cNvPr id="1" name=""/>
+        <p:cNvGrpSpPr/>
+        <p:nvPr/>
+      </p:nvGrpSpPr>
+      <p:grpSpPr>
+        <a:xfrm>
+          <a:off x="0" y="0"/>
+          <a:ext cx="0" cy="0"/>
+          <a:chOff x="0" y="0"/>
+          <a:chExt cx="0" cy="0"/>
+        </a:xfrm>
+      </p:grpSpPr>
+      <p:sp>
+        <p:nvSpPr>
+          <p:cNvPr id="2" name="Title 1"/>
+          <p:cNvSpPr>
+            <a:spLocks noGrp="1"/>
+          </p:cNvSpPr>
+          <p:nvPr>
+            <p:ph type="title"/>
+          </p:nvPr>
+        </p:nvSpPr>
+        <p:spPr>
+          <a:xfrm>
+            <a:off x="457200" y="274638"/>
+            <a:ext cx="8229600" cy="418058"/>
+          </a:xfrm>
+        </p:spPr>
+        <p:txBody>
+          <a:bodyPr>
+            <a:normAutofit fontScale="90000"/>
+          </a:bodyPr>
+          <a:lstStyle/>
+          <a:p>
+            <a:pPr algn="r"/>
+            <a:r>
+              <a:rPr lang="en-US" sz="2400" dirty="0" err="1" smtClean="0"/>
+              <a:t>Algoritmo</a:t>
+            </a:r>
+            <a:r>
+              <a:rPr lang="en-US" sz="2400" dirty="0" smtClean="0"/>
+              <a:t> </a:t>
+            </a:r>
+            <a:r>
+              <a:rPr lang="en-US" sz="2400" dirty="0" err="1" smtClean="0"/>
+              <a:t>Propuesto</a:t>
+            </a:r>
+            <a:endParaRPr lang="en-US" sz="2400" dirty="0" smtClean="0"/>
+          </a:p>
+        </p:txBody>
+      </p:sp>
+      <p:sp>
+        <p:nvSpPr>
+          <p:cNvPr id="3" name="Content Placeholder 2"/>
+          <p:cNvSpPr>
+            <a:spLocks noGrp="1"/>
+          </p:cNvSpPr>
+          <p:nvPr>
+            <p:ph idx="1"/>
+          </p:nvPr>
+        </p:nvSpPr>
+        <p:spPr>
+          <a:xfrm>
+            <a:off x="457200" y="908720"/>
+            <a:ext cx="8229600" cy="5217443"/>
+          </a:xfrm>
+        </p:spPr>
+        <p:txBody>
+          <a:bodyPr>
+            <a:normAutofit/>
+          </a:bodyPr>
+          <a:lstStyle/>
+          <a:p>
+            <a:r>
+              <a:rPr lang="en-US" sz="2800" dirty="0" err="1" smtClean="0"/>
+              <a:t>Evaluación</a:t>
+            </a:r>
+            <a:r>
+              <a:rPr lang="en-US" sz="2800" dirty="0" smtClean="0"/>
+              <a:t> de la </a:t>
+            </a:r>
+            <a:r>
+              <a:rPr lang="en-US" sz="2800" dirty="0" err="1" smtClean="0"/>
+              <a:t>condición</a:t>
+            </a:r>
+            <a:r>
+              <a:rPr lang="en-US" sz="2800" dirty="0" smtClean="0"/>
+              <a:t> </a:t>
+            </a:r>
+            <a:r>
+              <a:rPr lang="en-US" sz="2800" dirty="0" smtClean="0"/>
+              <a:t>de </a:t>
+            </a:r>
+            <a:r>
+              <a:rPr lang="en-US" sz="2800" dirty="0" err="1" smtClean="0"/>
+              <a:t>parada</a:t>
+            </a:r>
+            <a:endParaRPr lang="en-US" sz="2800" dirty="0" smtClean="0"/>
+          </a:p>
+          <a:p>
+            <a:pPr lvl="1">
+              <a:buFont typeface="Wingdings" pitchFamily="2" charset="2"/>
+              <a:buChar char="§"/>
+            </a:pPr>
+            <a:r>
+              <a:rPr lang="en-US" sz="2000" dirty="0" err="1" smtClean="0"/>
+              <a:t>Mínima</a:t>
+            </a:r>
+            <a:r>
+              <a:rPr lang="en-US" sz="2000" dirty="0" smtClean="0"/>
+              <a:t> </a:t>
+            </a:r>
+            <a:r>
+              <a:rPr lang="en-US" sz="2000" dirty="0" err="1" smtClean="0"/>
+              <a:t>cantidad</a:t>
+            </a:r>
+            <a:r>
+              <a:rPr lang="en-US" sz="2000" dirty="0" smtClean="0"/>
+              <a:t> de </a:t>
+            </a:r>
+            <a:r>
+              <a:rPr lang="en-US" sz="2000" dirty="0" err="1" smtClean="0"/>
+              <a:t>generaciones</a:t>
+            </a:r>
+            <a:endParaRPr lang="en-US" sz="2000" dirty="0" smtClean="0"/>
+          </a:p>
+          <a:p>
+            <a:pPr lvl="1">
+              <a:buFont typeface="Wingdings" pitchFamily="2" charset="2"/>
+              <a:buChar char="§"/>
+            </a:pPr>
+            <a:r>
+              <a:rPr lang="en-US" sz="2000" dirty="0" err="1" smtClean="0"/>
+              <a:t>Ultimas</a:t>
+            </a:r>
+            <a:r>
+              <a:rPr lang="en-US" sz="2000" dirty="0" smtClean="0"/>
+              <a:t> X </a:t>
+            </a:r>
+            <a:r>
+              <a:rPr lang="en-US" sz="2000" dirty="0" err="1" smtClean="0"/>
+              <a:t>generaciónes</a:t>
+            </a:r>
+            <a:r>
+              <a:rPr lang="en-US" sz="2000" dirty="0" smtClean="0"/>
+              <a:t> </a:t>
+            </a:r>
+            <a:r>
+              <a:rPr lang="en-US" sz="2000" dirty="0" smtClean="0"/>
+              <a:t>sin </a:t>
+            </a:r>
+            <a:r>
+              <a:rPr lang="en-US" sz="2000" dirty="0" err="1" smtClean="0"/>
+              <a:t>que</a:t>
+            </a:r>
+            <a:r>
+              <a:rPr lang="en-US" sz="2000" dirty="0" smtClean="0"/>
+              <a:t> </a:t>
+            </a:r>
+            <a:r>
+              <a:rPr lang="en-US" sz="2000" dirty="0" err="1" smtClean="0"/>
+              <a:t>haya</a:t>
+            </a:r>
+            <a:r>
+              <a:rPr lang="en-US" sz="2000" dirty="0" smtClean="0"/>
+              <a:t> </a:t>
+            </a:r>
+            <a:r>
+              <a:rPr lang="en-US" sz="2000" dirty="0" err="1" smtClean="0"/>
+              <a:t>mejorado</a:t>
+            </a:r>
+            <a:r>
+              <a:rPr lang="en-US" sz="2000" dirty="0" smtClean="0"/>
+              <a:t> el </a:t>
+            </a:r>
+            <a:r>
+              <a:rPr lang="en-US" sz="2000" dirty="0" err="1" smtClean="0"/>
+              <a:t>beneficio</a:t>
+            </a:r>
+            <a:r>
+              <a:rPr lang="en-US" sz="2000" dirty="0" smtClean="0"/>
+              <a:t> de la </a:t>
+            </a:r>
+            <a:r>
+              <a:rPr lang="en-US" sz="2000" dirty="0" err="1" smtClean="0"/>
+              <a:t>mejor</a:t>
+            </a:r>
+            <a:r>
+              <a:rPr lang="en-US" sz="2000" dirty="0" smtClean="0"/>
+              <a:t> </a:t>
+            </a:r>
+            <a:r>
+              <a:rPr lang="en-US" sz="2000" dirty="0" err="1" smtClean="0"/>
+              <a:t>solución</a:t>
+            </a:r>
+            <a:endParaRPr lang="en-US" sz="2000" dirty="0" smtClean="0"/>
+          </a:p>
+          <a:p>
+            <a:pPr lvl="1">
+              <a:buFont typeface="Wingdings" pitchFamily="2" charset="2"/>
+              <a:buChar char="§"/>
+            </a:pPr>
+            <a:r>
+              <a:rPr lang="en-US" sz="2000" dirty="0" smtClean="0"/>
+              <a:t>Si no se </a:t>
+            </a:r>
+            <a:r>
+              <a:rPr lang="en-US" sz="2000" dirty="0" err="1" smtClean="0"/>
+              <a:t>cumplen</a:t>
+            </a:r>
+            <a:r>
+              <a:rPr lang="en-US" sz="2000" dirty="0" smtClean="0"/>
+              <a:t> </a:t>
+            </a:r>
+            <a:r>
+              <a:rPr lang="en-US" sz="2000" dirty="0" err="1" smtClean="0"/>
+              <a:t>las</a:t>
+            </a:r>
+            <a:r>
+              <a:rPr lang="en-US" sz="2000" dirty="0" smtClean="0"/>
+              <a:t> </a:t>
+            </a:r>
+            <a:r>
+              <a:rPr lang="en-US" sz="2000" dirty="0" err="1" smtClean="0"/>
+              <a:t>condiciones</a:t>
+            </a:r>
+            <a:r>
+              <a:rPr lang="en-US" sz="2000" dirty="0" smtClean="0"/>
+              <a:t>, </a:t>
+            </a:r>
+            <a:r>
+              <a:rPr lang="en-US" sz="2000" dirty="0" err="1" smtClean="0"/>
+              <a:t>comienza</a:t>
+            </a:r>
+            <a:r>
+              <a:rPr lang="en-US" sz="2000" dirty="0" smtClean="0"/>
+              <a:t> un </a:t>
+            </a:r>
+            <a:r>
+              <a:rPr lang="en-US" sz="2000" dirty="0" err="1" smtClean="0"/>
+              <a:t>nuevo</a:t>
+            </a:r>
+            <a:r>
+              <a:rPr lang="en-US" sz="2000" dirty="0" smtClean="0"/>
+              <a:t> </a:t>
+            </a:r>
+            <a:r>
+              <a:rPr lang="en-US" sz="2000" dirty="0" err="1" smtClean="0"/>
+              <a:t>ciclo</a:t>
+            </a:r>
+            <a:r>
+              <a:rPr lang="en-US" sz="2000" dirty="0" smtClean="0"/>
+              <a:t> </a:t>
+            </a:r>
+            <a:r>
+              <a:rPr lang="en-US" sz="2000" dirty="0" err="1" smtClean="0"/>
+              <a:t>evolucionando</a:t>
+            </a:r>
+            <a:r>
+              <a:rPr lang="en-US" sz="2000" dirty="0" smtClean="0"/>
+              <a:t> la </a:t>
+            </a:r>
+            <a:r>
+              <a:rPr lang="en-US" sz="2000" dirty="0" err="1" smtClean="0"/>
+              <a:t>población</a:t>
+            </a:r>
+            <a:endParaRPr lang="en-US" sz="2000" dirty="0" smtClean="0"/>
+          </a:p>
+          <a:p>
+            <a:pPr lvl="1">
+              <a:buFont typeface="Wingdings" pitchFamily="2" charset="2"/>
+              <a:buChar char="§"/>
+            </a:pPr>
+            <a:r>
+              <a:rPr lang="en-US" sz="2000" dirty="0" smtClean="0"/>
+              <a:t>Si se </a:t>
+            </a:r>
+            <a:r>
+              <a:rPr lang="en-US" sz="2000" dirty="0" err="1" smtClean="0"/>
+              <a:t>cumplen</a:t>
+            </a:r>
+            <a:r>
+              <a:rPr lang="en-US" sz="2000" dirty="0" smtClean="0"/>
+              <a:t>, </a:t>
+            </a:r>
+            <a:r>
+              <a:rPr lang="en-US" sz="2000" dirty="0" err="1" smtClean="0"/>
+              <a:t>r</a:t>
+            </a:r>
+            <a:r>
+              <a:rPr lang="en-US" sz="2000" dirty="0" err="1" smtClean="0"/>
+              <a:t>etorna</a:t>
+            </a:r>
+            <a:r>
+              <a:rPr lang="en-US" sz="2000" dirty="0" smtClean="0"/>
+              <a:t> la </a:t>
+            </a:r>
+            <a:r>
+              <a:rPr lang="en-US" sz="2000" dirty="0" err="1" smtClean="0"/>
+              <a:t>mejor</a:t>
+            </a:r>
+            <a:r>
+              <a:rPr lang="en-US" sz="2000" dirty="0" smtClean="0"/>
+              <a:t> </a:t>
+            </a:r>
+            <a:r>
+              <a:rPr lang="en-US" sz="2000" dirty="0" err="1" smtClean="0"/>
+              <a:t>solución</a:t>
+            </a:r>
+            <a:endParaRPr lang="es-AR" sz="2000" dirty="0"/>
+          </a:p>
+        </p:txBody>
+      </p:sp>
+    </p:spTree>
+    <p:extLst>
+      <p:ext uri="{BB962C8B-B14F-4D97-AF65-F5344CB8AC3E}">
+        <p14:creationId xmlns:p14="http://schemas.microsoft.com/office/powerpoint/2010/main" val="2559275626"/>
+      </p:ext>
+    </p:extLst>
+  </p:cSld>
+  <p:clrMapOvr>
+    <a:masterClrMapping/>
+  </p:clrMapOvr>
+</p:sld>
+</file>
+
+<file path=ppt/slides/slide18.xml><?xml version="1.0" encoding="utf-8"?>
+<p:sld xmlns:a="http://schemas.openxmlformats.org/drawingml/2006/main" xmlns:r="http://schemas.openxmlformats.org/officeDocument/2006/relationships" xmlns:p="http://schemas.openxmlformats.org/presentationml/2006/main">
+  <p:cSld>
+    <p:spTree>
+      <p:nvGrpSpPr>
+        <p:cNvPr id="1" name=""/>
+        <p:cNvGrpSpPr/>
+        <p:nvPr/>
+      </p:nvGrpSpPr>
+      <p:grpSpPr>
+        <a:xfrm>
+          <a:off x="0" y="0"/>
+          <a:ext cx="0" cy="0"/>
+          <a:chOff x="0" y="0"/>
+          <a:chExt cx="0" cy="0"/>
+        </a:xfrm>
+      </p:grpSpPr>
+      <p:sp>
+        <p:nvSpPr>
+          <p:cNvPr id="2" name="Title 1"/>
+          <p:cNvSpPr>
+            <a:spLocks noGrp="1"/>
+          </p:cNvSpPr>
+          <p:nvPr>
+            <p:ph type="title"/>
+          </p:nvPr>
+        </p:nvSpPr>
+        <p:spPr>
+          <a:xfrm>
+            <a:off x="457200" y="274638"/>
+            <a:ext cx="8229600" cy="418058"/>
+          </a:xfrm>
+        </p:spPr>
+        <p:txBody>
+          <a:bodyPr>
+            <a:normAutofit fontScale="90000"/>
+          </a:bodyPr>
+          <a:lstStyle/>
+          <a:p>
+            <a:pPr algn="r"/>
+            <a:r>
+              <a:rPr lang="en-US" sz="2400" dirty="0" err="1" smtClean="0"/>
+              <a:t>Resultados</a:t>
+            </a:r>
+            <a:endParaRPr lang="en-US" sz="2400" dirty="0" smtClean="0"/>
+          </a:p>
+        </p:txBody>
+      </p:sp>
+      <p:sp>
+        <p:nvSpPr>
+          <p:cNvPr id="3" name="Content Placeholder 2"/>
+          <p:cNvSpPr>
+            <a:spLocks noGrp="1"/>
+          </p:cNvSpPr>
+          <p:nvPr>
+            <p:ph idx="1"/>
+          </p:nvPr>
+        </p:nvSpPr>
+        <p:spPr>
+          <a:xfrm>
+            <a:off x="457200" y="908720"/>
+            <a:ext cx="8229600" cy="5217443"/>
+          </a:xfrm>
+        </p:spPr>
+        <p:txBody>
+          <a:bodyPr>
+            <a:normAutofit/>
+          </a:bodyPr>
+          <a:lstStyle/>
+          <a:p>
+            <a:r>
               <a:rPr lang="es-ES" sz="2000" dirty="0" smtClean="0"/>
               <a:t>Trabajos previos</a:t>
             </a:r>
@@ -5206,7 +5515,6 @@
               <a:rPr lang="es-ES" sz="1600" dirty="0" smtClean="0"/>
               <a:t>.  (CGW)</a:t>
             </a:r>
-            <a:endParaRPr lang="es-ES" sz="1600" dirty="0" smtClean="0"/>
           </a:p>
           <a:p>
             <a:pPr lvl="1"/>
@@ -5366,7 +5674,6 @@
               <a:rPr lang="es-ES" sz="1600" dirty="0" smtClean="0"/>
               <a:t>TODO imagen de los resultados para 6 instancias en sol final</a:t>
             </a:r>
-            <a:endParaRPr lang="es-ES" sz="1600" dirty="0" smtClean="0"/>
           </a:p>
           <a:p>
             <a:r>
@@ -5419,7 +5726,7 @@
           <a:graphicData uri="http://schemas.openxmlformats.org/presentationml/2006/ole">
             <mc:AlternateContent xmlns:mc="http://schemas.openxmlformats.org/markup-compatibility/2006">
               <mc:Choice xmlns:v="urn:schemas-microsoft-com:vml" Requires="v">
-                <p:oleObj spid="_x0000_s1047" name="Equation" r:id="rId3" imgW="1409400" imgH="342720" progId="Equation.3">
+                <p:oleObj spid="_x0000_s1053" name="Equation" r:id="rId3" imgW="1409400" imgH="342720" progId="Equation.3">
                   <p:embed/>
                 </p:oleObj>
               </mc:Choice>
@@ -5467,7 +5774,7 @@
 </p:sld>
 </file>
 
-<file path=ppt/slides/slide16.xml><?xml version="1.0" encoding="utf-8"?>
+<file path=ppt/slides/slide19.xml><?xml version="1.0" encoding="utf-8"?>
 <p:sld xmlns:a="http://schemas.openxmlformats.org/drawingml/2006/main" xmlns:r="http://schemas.openxmlformats.org/officeDocument/2006/relationships" xmlns:p="http://schemas.openxmlformats.org/presentationml/2006/main">
   <p:cSld>
     <p:spTree>
@@ -5538,190 +5845,146 @@
           <a:lstStyle/>
           <a:p>
             <a:r>
-              <a:rPr lang="es-ES" sz="2000" dirty="0" smtClean="0"/>
+              <a:rPr lang="es-ES" sz="2800" dirty="0" smtClean="0"/>
               <a:t>Los resultados fueron muy buenos, </a:t>
             </a:r>
             <a:r>
-              <a:rPr lang="es-AR" sz="2000" dirty="0" smtClean="0"/>
-              <a:t>u</a:t>
-            </a:r>
-            <a:r>
-              <a:rPr lang="es-AR" sz="2000" dirty="0" smtClean="0"/>
-              <a:t>n </a:t>
-            </a:r>
-            <a:r>
-              <a:rPr lang="es-AR" sz="2000" dirty="0"/>
+              <a:rPr lang="es-AR" sz="2800" dirty="0" smtClean="0"/>
+              <a:t>un </a:t>
+            </a:r>
+            <a:r>
+              <a:rPr lang="es-AR" sz="2800" dirty="0"/>
               <a:t>70% de los resultados llegaron a la mejor solución conocida de la instancia </a:t>
             </a:r>
             <a:r>
-              <a:rPr lang="es-AR" sz="2000" dirty="0" smtClean="0"/>
+              <a:rPr lang="es-AR" sz="2800" dirty="0" smtClean="0"/>
               <a:t>testeada.</a:t>
             </a:r>
           </a:p>
           <a:p>
             <a:r>
-              <a:rPr lang="en-US" sz="2000" dirty="0" smtClean="0"/>
+              <a:rPr lang="en-US" sz="2800" dirty="0" smtClean="0"/>
               <a:t>El restante 30% </a:t>
             </a:r>
             <a:r>
-              <a:rPr lang="en-US" sz="2000" dirty="0" err="1" smtClean="0"/>
+              <a:rPr lang="en-US" sz="2800" dirty="0" err="1" smtClean="0"/>
               <a:t>obtuvo</a:t>
             </a:r>
             <a:r>
-              <a:rPr lang="en-US" sz="2000" dirty="0" smtClean="0"/>
-              <a:t> </a:t>
-            </a:r>
-            <a:r>
-              <a:rPr lang="en-US" sz="2000" dirty="0" err="1" smtClean="0"/>
+              <a:rPr lang="en-US" sz="2800" dirty="0" smtClean="0"/>
+              <a:t> </a:t>
+            </a:r>
+            <a:r>
+              <a:rPr lang="en-US" sz="2800" dirty="0" err="1" smtClean="0"/>
               <a:t>valores</a:t>
             </a:r>
             <a:r>
-              <a:rPr lang="en-US" sz="2000" dirty="0" smtClean="0"/>
-              <a:t> </a:t>
-            </a:r>
-            <a:r>
-              <a:rPr lang="en-US" sz="2000" dirty="0" err="1" smtClean="0"/>
+              <a:rPr lang="en-US" sz="2800" dirty="0" smtClean="0"/>
+              <a:t> </a:t>
+            </a:r>
+            <a:r>
+              <a:rPr lang="en-US" sz="2800" dirty="0" err="1" smtClean="0"/>
               <a:t>muy</a:t>
             </a:r>
             <a:r>
-              <a:rPr lang="en-US" sz="2000" dirty="0" smtClean="0"/>
-              <a:t> </a:t>
-            </a:r>
-            <a:r>
-              <a:rPr lang="en-US" sz="2000" dirty="0" err="1" smtClean="0"/>
+              <a:rPr lang="en-US" sz="2800" dirty="0" smtClean="0"/>
+              <a:t> </a:t>
+            </a:r>
+            <a:r>
+              <a:rPr lang="en-US" sz="2800" dirty="0" err="1" smtClean="0"/>
               <a:t>competitivos</a:t>
             </a:r>
             <a:r>
-              <a:rPr lang="en-US" sz="2000" dirty="0" smtClean="0"/>
+              <a:rPr lang="en-US" sz="2800" dirty="0" smtClean="0"/>
               <a:t> con los </a:t>
             </a:r>
             <a:r>
-              <a:rPr lang="en-US" sz="2000" dirty="0" err="1" smtClean="0"/>
+              <a:rPr lang="en-US" sz="2800" dirty="0" err="1" smtClean="0"/>
               <a:t>mejores</a:t>
             </a:r>
             <a:r>
-              <a:rPr lang="en-US" sz="2000" dirty="0" smtClean="0"/>
-              <a:t> </a:t>
-            </a:r>
-            <a:r>
-              <a:rPr lang="en-US" sz="2000" dirty="0" err="1" smtClean="0"/>
+              <a:rPr lang="en-US" sz="2800" dirty="0" smtClean="0"/>
+              <a:t> </a:t>
+            </a:r>
+            <a:r>
+              <a:rPr lang="en-US" sz="2800" dirty="0" err="1" smtClean="0"/>
               <a:t>trabajos</a:t>
             </a:r>
             <a:r>
-              <a:rPr lang="en-US" sz="2000" dirty="0" smtClean="0"/>
-              <a:t> </a:t>
-            </a:r>
-            <a:r>
-              <a:rPr lang="en-US" sz="2000" dirty="0" err="1" smtClean="0"/>
+              <a:rPr lang="en-US" sz="2800" dirty="0" smtClean="0"/>
+              <a:t> </a:t>
+            </a:r>
+            <a:r>
+              <a:rPr lang="en-US" sz="2800" dirty="0" err="1" smtClean="0"/>
               <a:t>previos</a:t>
             </a:r>
             <a:r>
-              <a:rPr lang="en-US" sz="2000" dirty="0" smtClean="0"/>
+              <a:rPr lang="en-US" sz="2800" dirty="0" smtClean="0"/>
               <a:t>.</a:t>
             </a:r>
           </a:p>
           <a:p>
             <a:r>
-              <a:rPr lang="en-US" sz="2000" dirty="0" smtClean="0"/>
+              <a:rPr lang="en-US" sz="2800" dirty="0" smtClean="0"/>
               <a:t>El BRKGA </a:t>
             </a:r>
             <a:r>
-              <a:rPr lang="en-US" sz="2000" dirty="0" err="1" smtClean="0"/>
+              <a:rPr lang="en-US" sz="2800" dirty="0" err="1" smtClean="0"/>
               <a:t>puro</a:t>
             </a:r>
             <a:r>
-              <a:rPr lang="en-US" sz="2000" dirty="0" smtClean="0"/>
+              <a:rPr lang="en-US" sz="2800" dirty="0" smtClean="0"/>
               <a:t> no </a:t>
             </a:r>
             <a:r>
-              <a:rPr lang="en-US" sz="2000" dirty="0" err="1" smtClean="0"/>
+              <a:rPr lang="en-US" sz="2800" dirty="0" err="1" smtClean="0"/>
               <a:t>es</a:t>
             </a:r>
             <a:r>
-              <a:rPr lang="en-US" sz="2000" dirty="0" smtClean="0"/>
-              <a:t> </a:t>
-            </a:r>
-            <a:r>
-              <a:rPr lang="en-US" sz="2000" dirty="0" err="1" smtClean="0"/>
+              <a:rPr lang="en-US" sz="2800" dirty="0" smtClean="0"/>
+              <a:t> </a:t>
+            </a:r>
+            <a:r>
+              <a:rPr lang="en-US" sz="2800" dirty="0" err="1" smtClean="0"/>
               <a:t>bueno</a:t>
             </a:r>
             <a:r>
-              <a:rPr lang="en-US" sz="2000" dirty="0" smtClean="0"/>
-              <a:t> </a:t>
-            </a:r>
-            <a:r>
-              <a:rPr lang="en-US" sz="2000" dirty="0" err="1" smtClean="0"/>
+              <a:rPr lang="en-US" sz="2800" dirty="0" smtClean="0"/>
+              <a:t> </a:t>
+            </a:r>
+            <a:r>
+              <a:rPr lang="en-US" sz="2800" dirty="0" err="1" smtClean="0"/>
               <a:t>para</a:t>
             </a:r>
             <a:r>
-              <a:rPr lang="en-US" sz="2000" dirty="0" smtClean="0"/>
-              <a:t> </a:t>
-            </a:r>
-            <a:r>
-              <a:rPr lang="en-US" sz="2000" dirty="0" err="1" smtClean="0"/>
+              <a:rPr lang="en-US" sz="2800" dirty="0" smtClean="0"/>
+              <a:t> </a:t>
+            </a:r>
+            <a:r>
+              <a:rPr lang="en-US" sz="2800" dirty="0" err="1" smtClean="0"/>
               <a:t>instancias</a:t>
             </a:r>
             <a:r>
-              <a:rPr lang="en-US" sz="2000" dirty="0" smtClean="0"/>
-              <a:t> </a:t>
-            </a:r>
-            <a:r>
-              <a:rPr lang="en-US" sz="2000" dirty="0" err="1" smtClean="0"/>
+              <a:rPr lang="en-US" sz="2800" dirty="0" smtClean="0"/>
+              <a:t> </a:t>
+            </a:r>
+            <a:r>
+              <a:rPr lang="en-US" sz="2800" dirty="0" err="1" smtClean="0"/>
               <a:t>grandes</a:t>
             </a:r>
             <a:r>
-              <a:rPr lang="en-US" sz="2000" dirty="0" smtClean="0"/>
+              <a:rPr lang="en-US" sz="2800" dirty="0" smtClean="0"/>
               <a:t> del </a:t>
             </a:r>
             <a:r>
-              <a:rPr lang="en-US" sz="2000" dirty="0" err="1" smtClean="0"/>
+              <a:rPr lang="en-US" sz="2800" dirty="0" err="1" smtClean="0"/>
               <a:t>problema</a:t>
             </a:r>
             <a:r>
-              <a:rPr lang="en-US" sz="2000" dirty="0" smtClean="0"/>
+              <a:rPr lang="en-US" sz="2800" dirty="0" smtClean="0"/>
               <a:t>.</a:t>
             </a:r>
-          </a:p>
-          <a:p>
-            <a:r>
-              <a:rPr lang="es-ES" sz="2000" dirty="0" smtClean="0"/>
-              <a:t>Seria útil una herramienta para visualizar los caminos generados.</a:t>
-            </a:r>
-          </a:p>
-          <a:p>
-            <a:r>
-              <a:rPr lang="es-ES" sz="2000" dirty="0" smtClean="0"/>
-              <a:t>Investigar otras variantes de decodificadores</a:t>
-            </a:r>
-          </a:p>
-          <a:p>
-            <a:pPr lvl="1"/>
-            <a:r>
-              <a:rPr lang="es-ES" sz="1600" dirty="0" err="1" smtClean="0"/>
-              <a:t>Particionar</a:t>
-            </a:r>
-            <a:r>
-              <a:rPr lang="es-ES" sz="1600" dirty="0" smtClean="0"/>
-              <a:t> los clientes según su centro de gravedad, asigna vehículo a cada centro y asignar desde ahí</a:t>
-            </a:r>
-            <a:endParaRPr lang="es-ES" sz="1600" dirty="0" smtClean="0"/>
-          </a:p>
-          <a:p>
-            <a:r>
-              <a:rPr lang="es-ES" sz="2000" dirty="0" smtClean="0"/>
-              <a:t>Investigar otros métodos de crossover</a:t>
-            </a:r>
-          </a:p>
-          <a:p>
-            <a:pPr lvl="1"/>
-            <a:r>
-              <a:rPr lang="es-ES" sz="1600" dirty="0" smtClean="0"/>
-              <a:t>Que cada alelo represente un vehículo con su ruta en vez de un cliente</a:t>
-            </a:r>
-          </a:p>
-          <a:p>
-            <a:pPr lvl="1"/>
-            <a:endParaRPr lang="es-ES" sz="1600" dirty="0" smtClean="0"/>
+            <a:endParaRPr lang="es-ES" sz="2800" dirty="0" smtClean="0"/>
           </a:p>
         </p:txBody>
       </p:sp>
@@ -5729,144 +5992,6 @@
     <p:extLst>
       <p:ext uri="{BB962C8B-B14F-4D97-AF65-F5344CB8AC3E}">
         <p14:creationId xmlns:p14="http://schemas.microsoft.com/office/powerpoint/2010/main" val="962634165"/>
-      </p:ext>
-    </p:extLst>
-  </p:cSld>
-  <p:clrMapOvr>
-    <a:masterClrMapping/>
-  </p:clrMapOvr>
-</p:sld>
-</file>
-
-<file path=ppt/slides/slide17.xml><?xml version="1.0" encoding="utf-8"?>
-<p:sld xmlns:a="http://schemas.openxmlformats.org/drawingml/2006/main" xmlns:r="http://schemas.openxmlformats.org/officeDocument/2006/relationships" xmlns:p="http://schemas.openxmlformats.org/presentationml/2006/main">
-  <p:cSld>
-    <p:spTree>
-      <p:nvGrpSpPr>
-        <p:cNvPr id="1" name=""/>
-        <p:cNvGrpSpPr/>
-        <p:nvPr/>
-      </p:nvGrpSpPr>
-      <p:grpSpPr>
-        <a:xfrm>
-          <a:off x="0" y="0"/>
-          <a:ext cx="0" cy="0"/>
-          <a:chOff x="0" y="0"/>
-          <a:chExt cx="0" cy="0"/>
-        </a:xfrm>
-      </p:grpSpPr>
-      <p:sp>
-        <p:nvSpPr>
-          <p:cNvPr id="2" name="Title 1"/>
-          <p:cNvSpPr>
-            <a:spLocks noGrp="1"/>
-          </p:cNvSpPr>
-          <p:nvPr>
-            <p:ph type="title"/>
-          </p:nvPr>
-        </p:nvSpPr>
-        <p:spPr>
-          <a:xfrm>
-            <a:off x="457200" y="274638"/>
-            <a:ext cx="8229600" cy="418058"/>
-          </a:xfrm>
-        </p:spPr>
-        <p:txBody>
-          <a:bodyPr>
-            <a:normAutofit fontScale="90000"/>
-          </a:bodyPr>
-          <a:lstStyle/>
-          <a:p>
-            <a:pPr algn="r"/>
-            <a:endParaRPr lang="en-US" sz="2400" dirty="0" smtClean="0"/>
-          </a:p>
-        </p:txBody>
-      </p:sp>
-      <p:sp>
-        <p:nvSpPr>
-          <p:cNvPr id="3" name="Content Placeholder 2"/>
-          <p:cNvSpPr>
-            <a:spLocks noGrp="1"/>
-          </p:cNvSpPr>
-          <p:nvPr>
-            <p:ph idx="1"/>
-          </p:nvPr>
-        </p:nvSpPr>
-        <p:spPr>
-          <a:xfrm>
-            <a:off x="457200" y="908720"/>
-            <a:ext cx="8229600" cy="5217443"/>
-          </a:xfrm>
-        </p:spPr>
-        <p:txBody>
-          <a:bodyPr>
-            <a:normAutofit/>
-          </a:bodyPr>
-          <a:lstStyle/>
-          <a:p>
-            <a:pPr marL="0" indent="0" algn="ctr">
-              <a:buNone/>
-            </a:pPr>
-            <a:endParaRPr lang="es-ES" sz="1600" dirty="0" smtClean="0"/>
-          </a:p>
-          <a:p>
-            <a:pPr marL="0" indent="0" algn="ctr">
-              <a:buNone/>
-            </a:pPr>
-            <a:endParaRPr lang="es-ES" sz="1600" dirty="0"/>
-          </a:p>
-          <a:p>
-            <a:pPr marL="0" indent="0" algn="ctr">
-              <a:buNone/>
-            </a:pPr>
-            <a:endParaRPr lang="es-ES" sz="1600" dirty="0" smtClean="0"/>
-          </a:p>
-          <a:p>
-            <a:pPr marL="0" indent="0" algn="ctr">
-              <a:buNone/>
-            </a:pPr>
-            <a:endParaRPr lang="es-ES" sz="1600" dirty="0"/>
-          </a:p>
-          <a:p>
-            <a:pPr marL="0" indent="0" algn="ctr">
-              <a:buNone/>
-            </a:pPr>
-            <a:endParaRPr lang="es-ES" sz="1600" dirty="0" smtClean="0"/>
-          </a:p>
-          <a:p>
-            <a:pPr marL="0" indent="0" algn="ctr">
-              <a:buNone/>
-            </a:pPr>
-            <a:endParaRPr lang="es-ES" sz="1600" dirty="0"/>
-          </a:p>
-          <a:p>
-            <a:pPr marL="0" indent="0" algn="ctr">
-              <a:buNone/>
-            </a:pPr>
-            <a:endParaRPr lang="es-ES" sz="1600" dirty="0" smtClean="0"/>
-          </a:p>
-          <a:p>
-            <a:pPr marL="0" indent="0" algn="ctr">
-              <a:buNone/>
-            </a:pPr>
-            <a:endParaRPr lang="es-ES" sz="1600" dirty="0"/>
-          </a:p>
-          <a:p>
-            <a:pPr marL="0" indent="0" algn="ctr">
-              <a:buNone/>
-            </a:pPr>
-            <a:r>
-              <a:rPr lang="es-ES" sz="4000" dirty="0" smtClean="0"/>
-              <a:t>Gracias!</a:t>
-            </a:r>
-            <a:endParaRPr lang="en-US" sz="4000" dirty="0" smtClean="0"/>
-          </a:p>
-        </p:txBody>
-      </p:sp>
-    </p:spTree>
-    <p:extLst>
-      <p:ext uri="{BB962C8B-B14F-4D97-AF65-F5344CB8AC3E}">
-        <p14:creationId xmlns:p14="http://schemas.microsoft.com/office/powerpoint/2010/main" val="1529632411"/>
       </p:ext>
     </p:extLst>
   </p:cSld>
@@ -6060,7 +6185,7 @@
             <a:pPr marL="0" indent="0">
               <a:buNone/>
             </a:pPr>
-            <a:endParaRPr lang="en-US" sz="2400" dirty="0"/>
+            <a:endParaRPr lang="en-US" sz="2400" dirty="0" smtClean="0"/>
           </a:p>
           <a:p>
             <a:pPr marL="0" indent="0">
@@ -6220,6 +6345,21 @@
               <a:rPr lang="en-US" sz="2400" dirty="0" err="1" smtClean="0"/>
               <a:t>Concluciones</a:t>
             </a:r>
+            <a:endParaRPr lang="en-US" sz="2400" dirty="0" smtClean="0"/>
+          </a:p>
+          <a:p>
+            <a:r>
+              <a:rPr lang="en-US" sz="2400" dirty="0" err="1" smtClean="0"/>
+              <a:t>Trabajos</a:t>
+            </a:r>
+            <a:r>
+              <a:rPr lang="en-US" sz="2400" dirty="0" smtClean="0"/>
+              <a:t> </a:t>
+            </a:r>
+            <a:r>
+              <a:rPr lang="en-US" sz="2400" dirty="0" err="1" smtClean="0"/>
+              <a:t>Futuros</a:t>
+            </a:r>
             <a:endParaRPr lang="es-AR" sz="2400" dirty="0"/>
           </a:p>
         </p:txBody>
@@ -6228,6 +6368,259 @@
     <p:extLst>
       <p:ext uri="{BB962C8B-B14F-4D97-AF65-F5344CB8AC3E}">
         <p14:creationId xmlns:p14="http://schemas.microsoft.com/office/powerpoint/2010/main" val="2182434005"/>
+      </p:ext>
+    </p:extLst>
+  </p:cSld>
+  <p:clrMapOvr>
+    <a:masterClrMapping/>
+  </p:clrMapOvr>
+</p:sld>
+</file>
+
+<file path=ppt/slides/slide20.xml><?xml version="1.0" encoding="utf-8"?>
+<p:sld xmlns:a="http://schemas.openxmlformats.org/drawingml/2006/main" xmlns:r="http://schemas.openxmlformats.org/officeDocument/2006/relationships" xmlns:p="http://schemas.openxmlformats.org/presentationml/2006/main">
+  <p:cSld>
+    <p:spTree>
+      <p:nvGrpSpPr>
+        <p:cNvPr id="1" name=""/>
+        <p:cNvGrpSpPr/>
+        <p:nvPr/>
+      </p:nvGrpSpPr>
+      <p:grpSpPr>
+        <a:xfrm>
+          <a:off x="0" y="0"/>
+          <a:ext cx="0" cy="0"/>
+          <a:chOff x="0" y="0"/>
+          <a:chExt cx="0" cy="0"/>
+        </a:xfrm>
+      </p:grpSpPr>
+      <p:sp>
+        <p:nvSpPr>
+          <p:cNvPr id="2" name="Title 1"/>
+          <p:cNvSpPr>
+            <a:spLocks noGrp="1"/>
+          </p:cNvSpPr>
+          <p:nvPr>
+            <p:ph type="title"/>
+          </p:nvPr>
+        </p:nvSpPr>
+        <p:spPr>
+          <a:xfrm>
+            <a:off x="457200" y="274638"/>
+            <a:ext cx="8229600" cy="418058"/>
+          </a:xfrm>
+        </p:spPr>
+        <p:txBody>
+          <a:bodyPr>
+            <a:normAutofit fontScale="90000"/>
+          </a:bodyPr>
+          <a:lstStyle/>
+          <a:p>
+            <a:pPr algn="r"/>
+            <a:r>
+              <a:rPr lang="en-US" sz="2400" dirty="0" err="1" smtClean="0"/>
+              <a:t>Trabajos</a:t>
+            </a:r>
+            <a:r>
+              <a:rPr lang="en-US" sz="2400" dirty="0" smtClean="0"/>
+              <a:t> </a:t>
+            </a:r>
+            <a:r>
+              <a:rPr lang="en-US" sz="2400" dirty="0" err="1" smtClean="0"/>
+              <a:t>futuros</a:t>
+            </a:r>
+            <a:endParaRPr lang="en-US" sz="2400" dirty="0" smtClean="0"/>
+          </a:p>
+        </p:txBody>
+      </p:sp>
+      <p:sp>
+        <p:nvSpPr>
+          <p:cNvPr id="3" name="Content Placeholder 2"/>
+          <p:cNvSpPr>
+            <a:spLocks noGrp="1"/>
+          </p:cNvSpPr>
+          <p:nvPr>
+            <p:ph idx="1"/>
+          </p:nvPr>
+        </p:nvSpPr>
+        <p:spPr>
+          <a:xfrm>
+            <a:off x="457200" y="908720"/>
+            <a:ext cx="8229600" cy="5217443"/>
+          </a:xfrm>
+        </p:spPr>
+        <p:txBody>
+          <a:bodyPr>
+            <a:normAutofit/>
+          </a:bodyPr>
+          <a:lstStyle/>
+          <a:p>
+            <a:r>
+              <a:rPr lang="es-ES" sz="2800" dirty="0" smtClean="0"/>
+              <a:t>Seria </a:t>
+            </a:r>
+            <a:r>
+              <a:rPr lang="es-ES" sz="2800" dirty="0" smtClean="0"/>
+              <a:t>útil una herramienta para visualizar los caminos generados.</a:t>
+            </a:r>
+          </a:p>
+          <a:p>
+            <a:r>
+              <a:rPr lang="es-ES" sz="2800" dirty="0" smtClean="0"/>
+              <a:t>Investigar otras variantes de decodificadores</a:t>
+            </a:r>
+          </a:p>
+          <a:p>
+            <a:pPr lvl="1">
+              <a:buFont typeface="Wingdings" pitchFamily="2" charset="2"/>
+              <a:buChar char="§"/>
+            </a:pPr>
+            <a:r>
+              <a:rPr lang="es-ES" sz="2000" dirty="0" err="1" smtClean="0"/>
+              <a:t>Particionar</a:t>
+            </a:r>
+            <a:r>
+              <a:rPr lang="es-ES" sz="2000" dirty="0" smtClean="0"/>
+              <a:t> los clientes según su centro de gravedad, asigna vehículo a cada centro y asignar desde ahí</a:t>
+            </a:r>
+          </a:p>
+          <a:p>
+            <a:r>
+              <a:rPr lang="es-ES" sz="2800" dirty="0" smtClean="0"/>
+              <a:t>Investigar otros métodos de crossover</a:t>
+            </a:r>
+          </a:p>
+          <a:p>
+            <a:pPr lvl="1">
+              <a:buFont typeface="Wingdings" pitchFamily="2" charset="2"/>
+              <a:buChar char="§"/>
+            </a:pPr>
+            <a:r>
+              <a:rPr lang="es-ES" sz="2000" dirty="0" smtClean="0"/>
+              <a:t>Que cada alelo represente un vehículo con su ruta en vez de un cliente</a:t>
+            </a:r>
+          </a:p>
+          <a:p>
+            <a:pPr lvl="1"/>
+            <a:endParaRPr lang="es-ES" sz="1600" dirty="0" smtClean="0"/>
+          </a:p>
+        </p:txBody>
+      </p:sp>
+    </p:spTree>
+    <p:extLst>
+      <p:ext uri="{BB962C8B-B14F-4D97-AF65-F5344CB8AC3E}">
+        <p14:creationId xmlns:p14="http://schemas.microsoft.com/office/powerpoint/2010/main" val="635685772"/>
+      </p:ext>
+    </p:extLst>
+  </p:cSld>
+  <p:clrMapOvr>
+    <a:masterClrMapping/>
+  </p:clrMapOvr>
+</p:sld>
+</file>
+
+<file path=ppt/slides/slide21.xml><?xml version="1.0" encoding="utf-8"?>
+<p:sld xmlns:a="http://schemas.openxmlformats.org/drawingml/2006/main" xmlns:r="http://schemas.openxmlformats.org/officeDocument/2006/relationships" xmlns:p="http://schemas.openxmlformats.org/presentationml/2006/main">
+  <p:cSld>
+    <p:spTree>
+      <p:nvGrpSpPr>
+        <p:cNvPr id="1" name=""/>
+        <p:cNvGrpSpPr/>
+        <p:nvPr/>
+      </p:nvGrpSpPr>
+      <p:grpSpPr>
+        <a:xfrm>
+          <a:off x="0" y="0"/>
+          <a:ext cx="0" cy="0"/>
+          <a:chOff x="0" y="0"/>
+          <a:chExt cx="0" cy="0"/>
+        </a:xfrm>
+      </p:grpSpPr>
+      <p:sp>
+        <p:nvSpPr>
+          <p:cNvPr id="3" name="Content Placeholder 2"/>
+          <p:cNvSpPr>
+            <a:spLocks noGrp="1"/>
+          </p:cNvSpPr>
+          <p:nvPr>
+            <p:ph idx="1"/>
+          </p:nvPr>
+        </p:nvSpPr>
+        <p:spPr>
+          <a:xfrm>
+            <a:off x="457200" y="908720"/>
+            <a:ext cx="8229600" cy="5217443"/>
+          </a:xfrm>
+        </p:spPr>
+        <p:txBody>
+          <a:bodyPr>
+            <a:normAutofit/>
+          </a:bodyPr>
+          <a:lstStyle/>
+          <a:p>
+            <a:pPr marL="0" indent="0" algn="ctr">
+              <a:buNone/>
+            </a:pPr>
+            <a:endParaRPr lang="es-ES" sz="1600" dirty="0" smtClean="0"/>
+          </a:p>
+          <a:p>
+            <a:pPr marL="0" indent="0" algn="ctr">
+              <a:buNone/>
+            </a:pPr>
+            <a:endParaRPr lang="es-ES" sz="1600" dirty="0"/>
+          </a:p>
+          <a:p>
+            <a:pPr marL="0" indent="0" algn="ctr">
+              <a:buNone/>
+            </a:pPr>
+            <a:endParaRPr lang="es-ES" sz="1600" dirty="0" smtClean="0"/>
+          </a:p>
+          <a:p>
+            <a:pPr marL="0" indent="0" algn="ctr">
+              <a:buNone/>
+            </a:pPr>
+            <a:endParaRPr lang="es-ES" sz="1600" dirty="0"/>
+          </a:p>
+          <a:p>
+            <a:pPr marL="0" indent="0" algn="ctr">
+              <a:buNone/>
+            </a:pPr>
+            <a:endParaRPr lang="es-ES" sz="1600" dirty="0" smtClean="0"/>
+          </a:p>
+          <a:p>
+            <a:pPr marL="0" indent="0" algn="ctr">
+              <a:buNone/>
+            </a:pPr>
+            <a:endParaRPr lang="es-ES" sz="1600" dirty="0"/>
+          </a:p>
+          <a:p>
+            <a:pPr marL="0" indent="0" algn="ctr">
+              <a:buNone/>
+            </a:pPr>
+            <a:endParaRPr lang="es-ES" sz="1600" dirty="0" smtClean="0"/>
+          </a:p>
+          <a:p>
+            <a:pPr marL="0" indent="0" algn="ctr">
+              <a:buNone/>
+            </a:pPr>
+            <a:endParaRPr lang="es-ES" sz="1600" dirty="0"/>
+          </a:p>
+          <a:p>
+            <a:pPr marL="0" indent="0" algn="ctr">
+              <a:buNone/>
+            </a:pPr>
+            <a:r>
+              <a:rPr lang="es-ES" sz="4000" dirty="0" smtClean="0"/>
+              <a:t>Gracias!</a:t>
+            </a:r>
+            <a:endParaRPr lang="en-US" sz="4000" dirty="0" smtClean="0"/>
+          </a:p>
+        </p:txBody>
+      </p:sp>
+    </p:spTree>
+    <p:extLst>
+      <p:ext uri="{BB962C8B-B14F-4D97-AF65-F5344CB8AC3E}">
+        <p14:creationId xmlns:p14="http://schemas.microsoft.com/office/powerpoint/2010/main" val="1529632411"/>
       </p:ext>
     </p:extLst>
   </p:cSld>
@@ -6744,7 +7137,6 @@
               <a:rPr lang="en-US" sz="2000" dirty="0" smtClean="0"/>
               <a:t>.</a:t>
             </a:r>
-            <a:endParaRPr lang="en-US" sz="2000" dirty="0" smtClean="0"/>
           </a:p>
         </p:txBody>
       </p:sp>
@@ -7251,11 +7643,7 @@
             </a:r>
             <a:r>
               <a:rPr lang="en-US" sz="2000" dirty="0" smtClean="0"/>
-              <a:t> </a:t>
-            </a:r>
-            <a:r>
-              <a:rPr lang="en-US" sz="2000" dirty="0" smtClean="0"/>
-              <a:t>de los </a:t>
+              <a:t> de los </a:t>
             </a:r>
             <a:r>
               <a:rPr lang="en-US" sz="2000" dirty="0" err="1" smtClean="0"/>

</xml_diff>

<commit_message>
* Defensa de tesis (falta correccion y un poco de color)
</commit_message>
<xml_diff>
--- a/TesisPaper/Defensa/Biased Random Key Genetic Algorithm.pptx
+++ b/TesisPaper/Defensa/Biased Random Key Genetic Algorithm.pptx
@@ -17,15 +17,20 @@
     <p:sldId id="273" r:id="rId11"/>
     <p:sldId id="263" r:id="rId12"/>
     <p:sldId id="265" r:id="rId13"/>
-    <p:sldId id="274" r:id="rId14"/>
-    <p:sldId id="275" r:id="rId15"/>
-    <p:sldId id="276" r:id="rId16"/>
-    <p:sldId id="277" r:id="rId17"/>
-    <p:sldId id="278" r:id="rId18"/>
-    <p:sldId id="268" r:id="rId19"/>
-    <p:sldId id="269" r:id="rId20"/>
-    <p:sldId id="279" r:id="rId21"/>
-    <p:sldId id="270" r:id="rId22"/>
+    <p:sldId id="278" r:id="rId14"/>
+    <p:sldId id="283" r:id="rId15"/>
+    <p:sldId id="274" r:id="rId16"/>
+    <p:sldId id="275" r:id="rId17"/>
+    <p:sldId id="276" r:id="rId18"/>
+    <p:sldId id="277" r:id="rId19"/>
+    <p:sldId id="280" r:id="rId20"/>
+    <p:sldId id="268" r:id="rId21"/>
+    <p:sldId id="282" r:id="rId22"/>
+    <p:sldId id="281" r:id="rId23"/>
+    <p:sldId id="269" r:id="rId24"/>
+    <p:sldId id="284" r:id="rId25"/>
+    <p:sldId id="279" r:id="rId26"/>
+    <p:sldId id="270" r:id="rId27"/>
   </p:sldIdLst>
   <p:sldSz cx="9144000" cy="6858000" type="screen4x3"/>
   <p:notesSz cx="6858000" cy="9144000"/>
@@ -308,7 +313,7 @@
           <a:p>
             <a:fld id="{187174D4-BBC9-49E1-BF8F-684BE480328B}" type="datetimeFigureOut">
               <a:rPr lang="es-AR" smtClean="0"/>
-              <a:t>26/4/2018</a:t>
+              <a:t>24/5/2018</a:t>
             </a:fld>
             <a:endParaRPr lang="es-AR"/>
           </a:p>
@@ -478,7 +483,7 @@
           <a:p>
             <a:fld id="{187174D4-BBC9-49E1-BF8F-684BE480328B}" type="datetimeFigureOut">
               <a:rPr lang="es-AR" smtClean="0"/>
-              <a:t>26/4/2018</a:t>
+              <a:t>24/5/2018</a:t>
             </a:fld>
             <a:endParaRPr lang="es-AR"/>
           </a:p>
@@ -658,7 +663,7 @@
           <a:p>
             <a:fld id="{187174D4-BBC9-49E1-BF8F-684BE480328B}" type="datetimeFigureOut">
               <a:rPr lang="es-AR" smtClean="0"/>
-              <a:t>26/4/2018</a:t>
+              <a:t>24/5/2018</a:t>
             </a:fld>
             <a:endParaRPr lang="es-AR"/>
           </a:p>
@@ -828,7 +833,7 @@
           <a:p>
             <a:fld id="{187174D4-BBC9-49E1-BF8F-684BE480328B}" type="datetimeFigureOut">
               <a:rPr lang="es-AR" smtClean="0"/>
-              <a:t>26/4/2018</a:t>
+              <a:t>24/5/2018</a:t>
             </a:fld>
             <a:endParaRPr lang="es-AR"/>
           </a:p>
@@ -1074,7 +1079,7 @@
           <a:p>
             <a:fld id="{187174D4-BBC9-49E1-BF8F-684BE480328B}" type="datetimeFigureOut">
               <a:rPr lang="es-AR" smtClean="0"/>
-              <a:t>26/4/2018</a:t>
+              <a:t>24/5/2018</a:t>
             </a:fld>
             <a:endParaRPr lang="es-AR"/>
           </a:p>
@@ -1362,7 +1367,7 @@
           <a:p>
             <a:fld id="{187174D4-BBC9-49E1-BF8F-684BE480328B}" type="datetimeFigureOut">
               <a:rPr lang="es-AR" smtClean="0"/>
-              <a:t>26/4/2018</a:t>
+              <a:t>24/5/2018</a:t>
             </a:fld>
             <a:endParaRPr lang="es-AR"/>
           </a:p>
@@ -1784,7 +1789,7 @@
           <a:p>
             <a:fld id="{187174D4-BBC9-49E1-BF8F-684BE480328B}" type="datetimeFigureOut">
               <a:rPr lang="es-AR" smtClean="0"/>
-              <a:t>26/4/2018</a:t>
+              <a:t>24/5/2018</a:t>
             </a:fld>
             <a:endParaRPr lang="es-AR"/>
           </a:p>
@@ -1902,7 +1907,7 @@
           <a:p>
             <a:fld id="{187174D4-BBC9-49E1-BF8F-684BE480328B}" type="datetimeFigureOut">
               <a:rPr lang="es-AR" smtClean="0"/>
-              <a:t>26/4/2018</a:t>
+              <a:t>24/5/2018</a:t>
             </a:fld>
             <a:endParaRPr lang="es-AR"/>
           </a:p>
@@ -1997,7 +2002,7 @@
           <a:p>
             <a:fld id="{187174D4-BBC9-49E1-BF8F-684BE480328B}" type="datetimeFigureOut">
               <a:rPr lang="es-AR" smtClean="0"/>
-              <a:t>26/4/2018</a:t>
+              <a:t>24/5/2018</a:t>
             </a:fld>
             <a:endParaRPr lang="es-AR"/>
           </a:p>
@@ -2274,7 +2279,7 @@
           <a:p>
             <a:fld id="{187174D4-BBC9-49E1-BF8F-684BE480328B}" type="datetimeFigureOut">
               <a:rPr lang="es-AR" smtClean="0"/>
-              <a:t>26/4/2018</a:t>
+              <a:t>24/5/2018</a:t>
             </a:fld>
             <a:endParaRPr lang="es-AR"/>
           </a:p>
@@ -2527,7 +2532,7 @@
           <a:p>
             <a:fld id="{187174D4-BBC9-49E1-BF8F-684BE480328B}" type="datetimeFigureOut">
               <a:rPr lang="es-AR" smtClean="0"/>
-              <a:t>26/4/2018</a:t>
+              <a:t>24/5/2018</a:t>
             </a:fld>
             <a:endParaRPr lang="es-AR"/>
           </a:p>
@@ -2740,7 +2745,7 @@
           <a:p>
             <a:fld id="{187174D4-BBC9-49E1-BF8F-684BE480328B}" type="datetimeFigureOut">
               <a:rPr lang="es-AR" smtClean="0"/>
-              <a:t>26/4/2018</a:t>
+              <a:t>24/5/2018</a:t>
             </a:fld>
             <a:endParaRPr lang="es-AR"/>
           </a:p>
@@ -3691,7 +3696,7 @@
       </p:sp>
       <p:pic>
         <p:nvPicPr>
-          <p:cNvPr id="5" name="Picture 4"/>
+          <p:cNvPr id="4" name="Picture 3"/>
           <p:cNvPicPr>
             <a:picLocks noChangeAspect="1"/>
           </p:cNvPicPr>
@@ -3711,7 +3716,7 @@
         </p:blipFill>
         <p:spPr>
           <a:xfrm>
-            <a:off x="27353" y="4365104"/>
+            <a:off x="0" y="4293096"/>
             <a:ext cx="9144000" cy="2310938"/>
           </a:xfrm>
           <a:prstGeom prst="rect">
@@ -4029,7 +4034,7 @@
       </p:sp>
       <p:pic>
         <p:nvPicPr>
-          <p:cNvPr id="4" name="Picture 3"/>
+          <p:cNvPr id="5" name="Picture 4"/>
           <p:cNvPicPr>
             <a:picLocks noChangeAspect="1"/>
           </p:cNvPicPr>
@@ -4049,7 +4054,7 @@
         </p:blipFill>
         <p:spPr>
           <a:xfrm>
-            <a:off x="-2379" y="620688"/>
+            <a:off x="0" y="548680"/>
             <a:ext cx="9144000" cy="2310938"/>
           </a:xfrm>
           <a:prstGeom prst="rect">
@@ -4150,6 +4155,510 @@
           <a:p>
             <a:r>
               <a:rPr lang="en-US" sz="2800" dirty="0" err="1" smtClean="0"/>
+              <a:t>Evaluación</a:t>
+            </a:r>
+            <a:r>
+              <a:rPr lang="en-US" sz="2800" dirty="0" smtClean="0"/>
+              <a:t> de la </a:t>
+            </a:r>
+            <a:r>
+              <a:rPr lang="en-US" sz="2800" dirty="0" err="1" smtClean="0"/>
+              <a:t>condición</a:t>
+            </a:r>
+            <a:r>
+              <a:rPr lang="en-US" sz="2800" dirty="0" smtClean="0"/>
+              <a:t> de </a:t>
+            </a:r>
+            <a:r>
+              <a:rPr lang="en-US" sz="2800" dirty="0" err="1" smtClean="0"/>
+              <a:t>parada</a:t>
+            </a:r>
+            <a:endParaRPr lang="en-US" sz="2800" dirty="0" smtClean="0"/>
+          </a:p>
+          <a:p>
+            <a:pPr lvl="1">
+              <a:buFont typeface="Wingdings" pitchFamily="2" charset="2"/>
+              <a:buChar char="§"/>
+            </a:pPr>
+            <a:r>
+              <a:rPr lang="en-US" sz="2000" dirty="0" err="1" smtClean="0"/>
+              <a:t>Mínima</a:t>
+            </a:r>
+            <a:r>
+              <a:rPr lang="en-US" sz="2000" dirty="0" smtClean="0"/>
+              <a:t> </a:t>
+            </a:r>
+            <a:r>
+              <a:rPr lang="en-US" sz="2000" dirty="0" err="1" smtClean="0"/>
+              <a:t>cantidad</a:t>
+            </a:r>
+            <a:r>
+              <a:rPr lang="en-US" sz="2000" dirty="0" smtClean="0"/>
+              <a:t> de </a:t>
+            </a:r>
+            <a:r>
+              <a:rPr lang="en-US" sz="2000" dirty="0" err="1" smtClean="0"/>
+              <a:t>generaciones</a:t>
+            </a:r>
+            <a:endParaRPr lang="en-US" sz="2000" dirty="0" smtClean="0"/>
+          </a:p>
+          <a:p>
+            <a:pPr lvl="1">
+              <a:buFont typeface="Wingdings" pitchFamily="2" charset="2"/>
+              <a:buChar char="§"/>
+            </a:pPr>
+            <a:r>
+              <a:rPr lang="en-US" sz="2000" dirty="0" err="1" smtClean="0"/>
+              <a:t>Ultimas</a:t>
+            </a:r>
+            <a:r>
+              <a:rPr lang="en-US" sz="2000" dirty="0" smtClean="0"/>
+              <a:t> X </a:t>
+            </a:r>
+            <a:r>
+              <a:rPr lang="en-US" sz="2000" dirty="0" err="1" smtClean="0"/>
+              <a:t>generaciónes</a:t>
+            </a:r>
+            <a:r>
+              <a:rPr lang="en-US" sz="2000" dirty="0" smtClean="0"/>
+              <a:t> sin </a:t>
+            </a:r>
+            <a:r>
+              <a:rPr lang="en-US" sz="2000" dirty="0" err="1" smtClean="0"/>
+              <a:t>que</a:t>
+            </a:r>
+            <a:r>
+              <a:rPr lang="en-US" sz="2000" dirty="0" smtClean="0"/>
+              <a:t> </a:t>
+            </a:r>
+            <a:r>
+              <a:rPr lang="en-US" sz="2000" dirty="0" err="1" smtClean="0"/>
+              <a:t>haya</a:t>
+            </a:r>
+            <a:r>
+              <a:rPr lang="en-US" sz="2000" dirty="0" smtClean="0"/>
+              <a:t> </a:t>
+            </a:r>
+            <a:r>
+              <a:rPr lang="en-US" sz="2000" dirty="0" err="1" smtClean="0"/>
+              <a:t>mejorado</a:t>
+            </a:r>
+            <a:r>
+              <a:rPr lang="en-US" sz="2000" dirty="0" smtClean="0"/>
+              <a:t> el </a:t>
+            </a:r>
+            <a:r>
+              <a:rPr lang="en-US" sz="2000" dirty="0" err="1" smtClean="0"/>
+              <a:t>beneficio</a:t>
+            </a:r>
+            <a:r>
+              <a:rPr lang="en-US" sz="2000" dirty="0" smtClean="0"/>
+              <a:t> de la </a:t>
+            </a:r>
+            <a:r>
+              <a:rPr lang="en-US" sz="2000" dirty="0" err="1" smtClean="0"/>
+              <a:t>mejor</a:t>
+            </a:r>
+            <a:r>
+              <a:rPr lang="en-US" sz="2000" dirty="0" smtClean="0"/>
+              <a:t> </a:t>
+            </a:r>
+            <a:r>
+              <a:rPr lang="en-US" sz="2000" dirty="0" err="1" smtClean="0"/>
+              <a:t>solución</a:t>
+            </a:r>
+            <a:endParaRPr lang="en-US" sz="2000" dirty="0" smtClean="0"/>
+          </a:p>
+          <a:p>
+            <a:pPr lvl="1">
+              <a:buFont typeface="Wingdings" pitchFamily="2" charset="2"/>
+              <a:buChar char="§"/>
+            </a:pPr>
+            <a:r>
+              <a:rPr lang="en-US" sz="2000" dirty="0" smtClean="0"/>
+              <a:t>Si no se </a:t>
+            </a:r>
+            <a:r>
+              <a:rPr lang="en-US" sz="2000" dirty="0" err="1" smtClean="0"/>
+              <a:t>cumplen</a:t>
+            </a:r>
+            <a:r>
+              <a:rPr lang="en-US" sz="2000" dirty="0" smtClean="0"/>
+              <a:t> </a:t>
+            </a:r>
+            <a:r>
+              <a:rPr lang="en-US" sz="2000" dirty="0" err="1" smtClean="0"/>
+              <a:t>las</a:t>
+            </a:r>
+            <a:r>
+              <a:rPr lang="en-US" sz="2000" dirty="0" smtClean="0"/>
+              <a:t> </a:t>
+            </a:r>
+            <a:r>
+              <a:rPr lang="en-US" sz="2000" dirty="0" err="1" smtClean="0"/>
+              <a:t>condiciones</a:t>
+            </a:r>
+            <a:r>
+              <a:rPr lang="en-US" sz="2000" dirty="0" smtClean="0"/>
+              <a:t>, </a:t>
+            </a:r>
+            <a:r>
+              <a:rPr lang="en-US" sz="2000" dirty="0" err="1" smtClean="0"/>
+              <a:t>comienza</a:t>
+            </a:r>
+            <a:r>
+              <a:rPr lang="en-US" sz="2000" dirty="0" smtClean="0"/>
+              <a:t> un </a:t>
+            </a:r>
+            <a:r>
+              <a:rPr lang="en-US" sz="2000" dirty="0" err="1" smtClean="0"/>
+              <a:t>nuevo</a:t>
+            </a:r>
+            <a:r>
+              <a:rPr lang="en-US" sz="2000" dirty="0" smtClean="0"/>
+              <a:t> </a:t>
+            </a:r>
+            <a:r>
+              <a:rPr lang="en-US" sz="2000" dirty="0" err="1" smtClean="0"/>
+              <a:t>ciclo</a:t>
+            </a:r>
+            <a:r>
+              <a:rPr lang="en-US" sz="2000" dirty="0" smtClean="0"/>
+              <a:t> </a:t>
+            </a:r>
+            <a:r>
+              <a:rPr lang="en-US" sz="2000" dirty="0" err="1" smtClean="0"/>
+              <a:t>evolucionando</a:t>
+            </a:r>
+            <a:r>
+              <a:rPr lang="en-US" sz="2000" dirty="0" smtClean="0"/>
+              <a:t> la </a:t>
+            </a:r>
+            <a:r>
+              <a:rPr lang="en-US" sz="2000" dirty="0" err="1" smtClean="0"/>
+              <a:t>población</a:t>
+            </a:r>
+            <a:endParaRPr lang="en-US" sz="2000" dirty="0" smtClean="0"/>
+          </a:p>
+          <a:p>
+            <a:pPr lvl="1">
+              <a:buFont typeface="Wingdings" pitchFamily="2" charset="2"/>
+              <a:buChar char="§"/>
+            </a:pPr>
+            <a:r>
+              <a:rPr lang="en-US" sz="2000" dirty="0" smtClean="0"/>
+              <a:t>Si se </a:t>
+            </a:r>
+            <a:r>
+              <a:rPr lang="en-US" sz="2000" dirty="0" err="1" smtClean="0"/>
+              <a:t>cumplen</a:t>
+            </a:r>
+            <a:r>
+              <a:rPr lang="en-US" sz="2000" dirty="0" smtClean="0"/>
+              <a:t>, </a:t>
+            </a:r>
+            <a:r>
+              <a:rPr lang="en-US" sz="2000" dirty="0" err="1" smtClean="0"/>
+              <a:t>retorna</a:t>
+            </a:r>
+            <a:r>
+              <a:rPr lang="en-US" sz="2000" dirty="0" smtClean="0"/>
+              <a:t> la </a:t>
+            </a:r>
+            <a:r>
+              <a:rPr lang="en-US" sz="2000" dirty="0" err="1" smtClean="0"/>
+              <a:t>mejor</a:t>
+            </a:r>
+            <a:r>
+              <a:rPr lang="en-US" sz="2000" dirty="0" smtClean="0"/>
+              <a:t> </a:t>
+            </a:r>
+            <a:r>
+              <a:rPr lang="en-US" sz="2000" dirty="0" err="1" smtClean="0"/>
+              <a:t>solución</a:t>
+            </a:r>
+            <a:endParaRPr lang="es-AR" sz="2000" dirty="0"/>
+          </a:p>
+        </p:txBody>
+      </p:sp>
+    </p:spTree>
+    <p:extLst>
+      <p:ext uri="{BB962C8B-B14F-4D97-AF65-F5344CB8AC3E}">
+        <p14:creationId xmlns:p14="http://schemas.microsoft.com/office/powerpoint/2010/main" val="2559275626"/>
+      </p:ext>
+    </p:extLst>
+  </p:cSld>
+  <p:clrMapOvr>
+    <a:masterClrMapping/>
+  </p:clrMapOvr>
+</p:sld>
+</file>
+
+<file path=ppt/slides/slide14.xml><?xml version="1.0" encoding="utf-8"?>
+<p:sld xmlns:a="http://schemas.openxmlformats.org/drawingml/2006/main" xmlns:r="http://schemas.openxmlformats.org/officeDocument/2006/relationships" xmlns:p="http://schemas.openxmlformats.org/presentationml/2006/main">
+  <p:cSld>
+    <p:spTree>
+      <p:nvGrpSpPr>
+        <p:cNvPr id="1" name=""/>
+        <p:cNvGrpSpPr/>
+        <p:nvPr/>
+      </p:nvGrpSpPr>
+      <p:grpSpPr>
+        <a:xfrm>
+          <a:off x="0" y="0"/>
+          <a:ext cx="0" cy="0"/>
+          <a:chOff x="0" y="0"/>
+          <a:chExt cx="0" cy="0"/>
+        </a:xfrm>
+      </p:grpSpPr>
+      <p:sp>
+        <p:nvSpPr>
+          <p:cNvPr id="2" name="Title 1"/>
+          <p:cNvSpPr>
+            <a:spLocks noGrp="1"/>
+          </p:cNvSpPr>
+          <p:nvPr>
+            <p:ph type="title"/>
+          </p:nvPr>
+        </p:nvSpPr>
+        <p:spPr>
+          <a:xfrm>
+            <a:off x="457200" y="274638"/>
+            <a:ext cx="8229600" cy="418058"/>
+          </a:xfrm>
+        </p:spPr>
+        <p:txBody>
+          <a:bodyPr>
+            <a:normAutofit fontScale="90000"/>
+          </a:bodyPr>
+          <a:lstStyle/>
+          <a:p>
+            <a:pPr algn="r"/>
+            <a:r>
+              <a:rPr lang="en-US" sz="2400" dirty="0" err="1" smtClean="0"/>
+              <a:t>Algoritmo</a:t>
+            </a:r>
+            <a:r>
+              <a:rPr lang="en-US" sz="2400" dirty="0" smtClean="0"/>
+              <a:t> </a:t>
+            </a:r>
+            <a:r>
+              <a:rPr lang="en-US" sz="2400" dirty="0" err="1" smtClean="0"/>
+              <a:t>Propuesto</a:t>
+            </a:r>
+            <a:endParaRPr lang="en-US" sz="2400" dirty="0" smtClean="0"/>
+          </a:p>
+        </p:txBody>
+      </p:sp>
+      <p:sp>
+        <p:nvSpPr>
+          <p:cNvPr id="3" name="Content Placeholder 2"/>
+          <p:cNvSpPr>
+            <a:spLocks noGrp="1"/>
+          </p:cNvSpPr>
+          <p:nvPr>
+            <p:ph idx="1"/>
+          </p:nvPr>
+        </p:nvSpPr>
+        <p:spPr>
+          <a:xfrm>
+            <a:off x="457200" y="908720"/>
+            <a:ext cx="8229600" cy="5217443"/>
+          </a:xfrm>
+        </p:spPr>
+        <p:txBody>
+          <a:bodyPr>
+            <a:normAutofit/>
+          </a:bodyPr>
+          <a:lstStyle/>
+          <a:p>
+            <a:r>
+              <a:rPr lang="en-US" sz="2800" dirty="0" smtClean="0"/>
+              <a:t>Hash de un </a:t>
+            </a:r>
+            <a:r>
+              <a:rPr lang="en-US" sz="2800" dirty="0" err="1" smtClean="0"/>
+              <a:t>individuo</a:t>
+            </a:r>
+            <a:endParaRPr lang="en-US" sz="2800" dirty="0" smtClean="0"/>
+          </a:p>
+          <a:p>
+            <a:pPr lvl="1">
+              <a:buFont typeface="Wingdings" pitchFamily="2" charset="2"/>
+              <a:buChar char="§"/>
+            </a:pPr>
+            <a:r>
+              <a:rPr lang="en-US" sz="2000" dirty="0" smtClean="0"/>
+              <a:t>Se </a:t>
+            </a:r>
+            <a:r>
+              <a:rPr lang="en-US" sz="2000" dirty="0" err="1" smtClean="0"/>
+              <a:t>evaluaron</a:t>
+            </a:r>
+            <a:r>
+              <a:rPr lang="en-US" sz="2000" dirty="0" smtClean="0"/>
+              <a:t> dos </a:t>
+            </a:r>
+            <a:r>
+              <a:rPr lang="en-US" sz="2000" dirty="0" err="1" smtClean="0"/>
+              <a:t>opciones</a:t>
+            </a:r>
+            <a:endParaRPr lang="en-US" sz="2000" dirty="0" smtClean="0"/>
+          </a:p>
+          <a:p>
+            <a:pPr lvl="1">
+              <a:buFont typeface="Wingdings" pitchFamily="2" charset="2"/>
+              <a:buChar char="§"/>
+            </a:pPr>
+            <a:r>
+              <a:rPr lang="en-US" sz="2000" dirty="0" err="1" smtClean="0"/>
+              <a:t>Opción</a:t>
+            </a:r>
+            <a:r>
+              <a:rPr lang="en-US" sz="2000" dirty="0" smtClean="0"/>
+              <a:t> 1: 6@2@5@1@4@8@3@7</a:t>
+            </a:r>
+          </a:p>
+          <a:p>
+            <a:pPr lvl="1">
+              <a:buFont typeface="Wingdings" pitchFamily="2" charset="2"/>
+              <a:buChar char="§"/>
+            </a:pPr>
+            <a:r>
+              <a:rPr lang="en-US" sz="2000" dirty="0" err="1" smtClean="0"/>
+              <a:t>Opción</a:t>
+            </a:r>
+            <a:r>
+              <a:rPr lang="en-US" sz="2000" dirty="0" smtClean="0"/>
+              <a:t> 2: 5@1@3#6@2@8@</a:t>
+            </a:r>
+            <a:endParaRPr lang="es-AR" sz="2000" dirty="0"/>
+          </a:p>
+        </p:txBody>
+      </p:sp>
+      <p:pic>
+        <p:nvPicPr>
+          <p:cNvPr id="4" name="Picture 3"/>
+          <p:cNvPicPr>
+            <a:picLocks noChangeAspect="1"/>
+          </p:cNvPicPr>
+          <p:nvPr/>
+        </p:nvPicPr>
+        <p:blipFill>
+          <a:blip r:embed="rId2">
+            <a:extLst>
+              <a:ext uri="{28A0092B-C50C-407E-A947-70E740481C1C}">
+                <a14:useLocalDpi xmlns:a14="http://schemas.microsoft.com/office/drawing/2010/main" val="0"/>
+              </a:ext>
+            </a:extLst>
+          </a:blip>
+          <a:stretch>
+            <a:fillRect/>
+          </a:stretch>
+        </p:blipFill>
+        <p:spPr>
+          <a:xfrm>
+            <a:off x="0" y="3212976"/>
+            <a:ext cx="9144000" cy="2310938"/>
+          </a:xfrm>
+          <a:prstGeom prst="rect">
+            <a:avLst/>
+          </a:prstGeom>
+        </p:spPr>
+      </p:pic>
+    </p:spTree>
+    <p:extLst>
+      <p:ext uri="{BB962C8B-B14F-4D97-AF65-F5344CB8AC3E}">
+        <p14:creationId xmlns:p14="http://schemas.microsoft.com/office/powerpoint/2010/main" val="3410467042"/>
+      </p:ext>
+    </p:extLst>
+  </p:cSld>
+  <p:clrMapOvr>
+    <a:masterClrMapping/>
+  </p:clrMapOvr>
+</p:sld>
+</file>
+
+<file path=ppt/slides/slide15.xml><?xml version="1.0" encoding="utf-8"?>
+<p:sld xmlns:a="http://schemas.openxmlformats.org/drawingml/2006/main" xmlns:r="http://schemas.openxmlformats.org/officeDocument/2006/relationships" xmlns:p="http://schemas.openxmlformats.org/presentationml/2006/main">
+  <p:cSld>
+    <p:spTree>
+      <p:nvGrpSpPr>
+        <p:cNvPr id="1" name=""/>
+        <p:cNvGrpSpPr/>
+        <p:nvPr/>
+      </p:nvGrpSpPr>
+      <p:grpSpPr>
+        <a:xfrm>
+          <a:off x="0" y="0"/>
+          <a:ext cx="0" cy="0"/>
+          <a:chOff x="0" y="0"/>
+          <a:chExt cx="0" cy="0"/>
+        </a:xfrm>
+      </p:grpSpPr>
+      <p:sp>
+        <p:nvSpPr>
+          <p:cNvPr id="2" name="Title 1"/>
+          <p:cNvSpPr>
+            <a:spLocks noGrp="1"/>
+          </p:cNvSpPr>
+          <p:nvPr>
+            <p:ph type="title"/>
+          </p:nvPr>
+        </p:nvSpPr>
+        <p:spPr>
+          <a:xfrm>
+            <a:off x="457200" y="274638"/>
+            <a:ext cx="8229600" cy="418058"/>
+          </a:xfrm>
+        </p:spPr>
+        <p:txBody>
+          <a:bodyPr>
+            <a:normAutofit fontScale="90000"/>
+          </a:bodyPr>
+          <a:lstStyle/>
+          <a:p>
+            <a:pPr algn="r"/>
+            <a:r>
+              <a:rPr lang="en-US" sz="2400" dirty="0" err="1" smtClean="0"/>
+              <a:t>Algoritmo</a:t>
+            </a:r>
+            <a:r>
+              <a:rPr lang="en-US" sz="2400" dirty="0" smtClean="0"/>
+              <a:t> </a:t>
+            </a:r>
+            <a:r>
+              <a:rPr lang="en-US" sz="2400" dirty="0" err="1" smtClean="0"/>
+              <a:t>Propuesto</a:t>
+            </a:r>
+            <a:endParaRPr lang="en-US" sz="2400" dirty="0" smtClean="0"/>
+          </a:p>
+        </p:txBody>
+      </p:sp>
+      <p:sp>
+        <p:nvSpPr>
+          <p:cNvPr id="3" name="Content Placeholder 2"/>
+          <p:cNvSpPr>
+            <a:spLocks noGrp="1"/>
+          </p:cNvSpPr>
+          <p:nvPr>
+            <p:ph idx="1"/>
+          </p:nvPr>
+        </p:nvSpPr>
+        <p:spPr>
+          <a:xfrm>
+            <a:off x="457200" y="908720"/>
+            <a:ext cx="8229600" cy="5217443"/>
+          </a:xfrm>
+        </p:spPr>
+        <p:txBody>
+          <a:bodyPr>
+            <a:normAutofit/>
+          </a:bodyPr>
+          <a:lstStyle/>
+          <a:p>
+            <a:r>
+              <a:rPr lang="en-US" sz="2800" dirty="0" err="1" smtClean="0"/>
               <a:t>Búsquedas</a:t>
             </a:r>
             <a:r>
@@ -4630,7 +5139,7 @@
 </p:sld>
 </file>
 
-<file path=ppt/slides/slide14.xml><?xml version="1.0" encoding="utf-8"?>
+<file path=ppt/slides/slide16.xml><?xml version="1.0" encoding="utf-8"?>
 <p:sld xmlns:a="http://schemas.openxmlformats.org/drawingml/2006/main" xmlns:r="http://schemas.openxmlformats.org/officeDocument/2006/relationships" xmlns:p="http://schemas.openxmlformats.org/presentationml/2006/main">
   <p:cSld>
     <p:spTree>
@@ -4789,7 +5298,7 @@
 </p:sld>
 </file>
 
-<file path=ppt/slides/slide15.xml><?xml version="1.0" encoding="utf-8"?>
+<file path=ppt/slides/slide17.xml><?xml version="1.0" encoding="utf-8"?>
 <p:sld xmlns:a="http://schemas.openxmlformats.org/drawingml/2006/main" xmlns:r="http://schemas.openxmlformats.org/officeDocument/2006/relationships" xmlns:p="http://schemas.openxmlformats.org/presentationml/2006/main">
   <p:cSld>
     <p:spTree>
@@ -4873,11 +5382,7 @@
             </a:r>
             <a:r>
               <a:rPr lang="en-US" sz="2800" dirty="0" smtClean="0"/>
-              <a:t> </a:t>
-            </a:r>
-            <a:r>
-              <a:rPr lang="en-US" sz="2800" dirty="0" smtClean="0"/>
-              <a:t>de </a:t>
+              <a:t> de </a:t>
             </a:r>
             <a:r>
               <a:rPr lang="en-US" sz="2800" dirty="0" err="1" smtClean="0"/>
@@ -4944,11 +5449,7 @@
             </a:r>
             <a:r>
               <a:rPr lang="en-US" sz="2000" dirty="0" smtClean="0"/>
-              <a:t> </a:t>
-            </a:r>
-            <a:r>
-              <a:rPr lang="en-US" sz="2000" dirty="0" smtClean="0"/>
-              <a:t>local</a:t>
+              <a:t> local</a:t>
             </a:r>
             <a:endParaRPr lang="es-AR" sz="1600" dirty="0"/>
           </a:p>
@@ -4956,7 +5457,7 @@
       </p:sp>
       <p:pic>
         <p:nvPicPr>
-          <p:cNvPr id="4" name="Picture 3"/>
+          <p:cNvPr id="5" name="Picture 4"/>
           <p:cNvPicPr>
             <a:picLocks noChangeAspect="1"/>
           </p:cNvPicPr>
@@ -4976,8 +5477,8 @@
         </p:blipFill>
         <p:spPr>
           <a:xfrm>
-            <a:off x="395535" y="1844824"/>
-            <a:ext cx="8385571" cy="4752528"/>
+            <a:off x="235287" y="1771349"/>
+            <a:ext cx="8657193" cy="4906470"/>
           </a:xfrm>
           <a:prstGeom prst="rect">
             <a:avLst/>
@@ -4988,435 +5489,6 @@
     <p:extLst>
       <p:ext uri="{BB962C8B-B14F-4D97-AF65-F5344CB8AC3E}">
         <p14:creationId xmlns:p14="http://schemas.microsoft.com/office/powerpoint/2010/main" val="3984026809"/>
-      </p:ext>
-    </p:extLst>
-  </p:cSld>
-  <p:clrMapOvr>
-    <a:masterClrMapping/>
-  </p:clrMapOvr>
-</p:sld>
-</file>
-
-<file path=ppt/slides/slide16.xml><?xml version="1.0" encoding="utf-8"?>
-<p:sld xmlns:a="http://schemas.openxmlformats.org/drawingml/2006/main" xmlns:r="http://schemas.openxmlformats.org/officeDocument/2006/relationships" xmlns:p="http://schemas.openxmlformats.org/presentationml/2006/main">
-  <p:cSld>
-    <p:spTree>
-      <p:nvGrpSpPr>
-        <p:cNvPr id="1" name=""/>
-        <p:cNvGrpSpPr/>
-        <p:nvPr/>
-      </p:nvGrpSpPr>
-      <p:grpSpPr>
-        <a:xfrm>
-          <a:off x="0" y="0"/>
-          <a:ext cx="0" cy="0"/>
-          <a:chOff x="0" y="0"/>
-          <a:chExt cx="0" cy="0"/>
-        </a:xfrm>
-      </p:grpSpPr>
-      <p:sp>
-        <p:nvSpPr>
-          <p:cNvPr id="2" name="Title 1"/>
-          <p:cNvSpPr>
-            <a:spLocks noGrp="1"/>
-          </p:cNvSpPr>
-          <p:nvPr>
-            <p:ph type="title"/>
-          </p:nvPr>
-        </p:nvSpPr>
-        <p:spPr>
-          <a:xfrm>
-            <a:off x="457200" y="274638"/>
-            <a:ext cx="8229600" cy="418058"/>
-          </a:xfrm>
-        </p:spPr>
-        <p:txBody>
-          <a:bodyPr>
-            <a:normAutofit fontScale="90000"/>
-          </a:bodyPr>
-          <a:lstStyle/>
-          <a:p>
-            <a:pPr algn="r"/>
-            <a:r>
-              <a:rPr lang="en-US" sz="2400" dirty="0" err="1" smtClean="0"/>
-              <a:t>Algoritmo</a:t>
-            </a:r>
-            <a:r>
-              <a:rPr lang="en-US" sz="2400" dirty="0" smtClean="0"/>
-              <a:t> </a:t>
-            </a:r>
-            <a:r>
-              <a:rPr lang="en-US" sz="2400" dirty="0" err="1" smtClean="0"/>
-              <a:t>Propuesto</a:t>
-            </a:r>
-            <a:endParaRPr lang="en-US" sz="2400" dirty="0" smtClean="0"/>
-          </a:p>
-        </p:txBody>
-      </p:sp>
-      <p:pic>
-        <p:nvPicPr>
-          <p:cNvPr id="4" name="Content Placeholder 3"/>
-          <p:cNvPicPr>
-            <a:picLocks noGrp="1" noChangeAspect="1"/>
-          </p:cNvPicPr>
-          <p:nvPr>
-            <p:ph idx="1"/>
-          </p:nvPr>
-        </p:nvPicPr>
-        <p:blipFill>
-          <a:blip r:embed="rId2">
-            <a:extLst>
-              <a:ext uri="{28A0092B-C50C-407E-A947-70E740481C1C}">
-                <a14:useLocalDpi xmlns:a14="http://schemas.microsoft.com/office/drawing/2010/main" val="0"/>
-              </a:ext>
-            </a:extLst>
-          </a:blip>
-          <a:stretch>
-            <a:fillRect/>
-          </a:stretch>
-        </p:blipFill>
-        <p:spPr>
-          <a:xfrm>
-            <a:off x="457200" y="1032161"/>
-            <a:ext cx="8229600" cy="4969890"/>
-          </a:xfrm>
-        </p:spPr>
-      </p:pic>
-    </p:spTree>
-    <p:extLst>
-      <p:ext uri="{BB962C8B-B14F-4D97-AF65-F5344CB8AC3E}">
-        <p14:creationId xmlns:p14="http://schemas.microsoft.com/office/powerpoint/2010/main" val="2559275626"/>
-      </p:ext>
-    </p:extLst>
-  </p:cSld>
-  <p:clrMapOvr>
-    <a:masterClrMapping/>
-  </p:clrMapOvr>
-</p:sld>
-</file>
-
-<file path=ppt/slides/slide17.xml><?xml version="1.0" encoding="utf-8"?>
-<p:sld xmlns:a="http://schemas.openxmlformats.org/drawingml/2006/main" xmlns:r="http://schemas.openxmlformats.org/officeDocument/2006/relationships" xmlns:p="http://schemas.openxmlformats.org/presentationml/2006/main">
-  <p:cSld>
-    <p:spTree>
-      <p:nvGrpSpPr>
-        <p:cNvPr id="1" name=""/>
-        <p:cNvGrpSpPr/>
-        <p:nvPr/>
-      </p:nvGrpSpPr>
-      <p:grpSpPr>
-        <a:xfrm>
-          <a:off x="0" y="0"/>
-          <a:ext cx="0" cy="0"/>
-          <a:chOff x="0" y="0"/>
-          <a:chExt cx="0" cy="0"/>
-        </a:xfrm>
-      </p:grpSpPr>
-      <p:sp>
-        <p:nvSpPr>
-          <p:cNvPr id="2" name="Title 1"/>
-          <p:cNvSpPr>
-            <a:spLocks noGrp="1"/>
-          </p:cNvSpPr>
-          <p:nvPr>
-            <p:ph type="title"/>
-          </p:nvPr>
-        </p:nvSpPr>
-        <p:spPr>
-          <a:xfrm>
-            <a:off x="457200" y="274638"/>
-            <a:ext cx="8229600" cy="418058"/>
-          </a:xfrm>
-        </p:spPr>
-        <p:txBody>
-          <a:bodyPr>
-            <a:normAutofit fontScale="90000"/>
-          </a:bodyPr>
-          <a:lstStyle/>
-          <a:p>
-            <a:pPr algn="r"/>
-            <a:r>
-              <a:rPr lang="en-US" sz="2400" dirty="0" err="1" smtClean="0"/>
-              <a:t>Algoritmo</a:t>
-            </a:r>
-            <a:r>
-              <a:rPr lang="en-US" sz="2400" dirty="0" smtClean="0"/>
-              <a:t> </a:t>
-            </a:r>
-            <a:r>
-              <a:rPr lang="en-US" sz="2400" dirty="0" err="1" smtClean="0"/>
-              <a:t>Propuesto</a:t>
-            </a:r>
-            <a:endParaRPr lang="en-US" sz="2400" dirty="0" smtClean="0"/>
-          </a:p>
-        </p:txBody>
-      </p:sp>
-      <p:sp>
-        <p:nvSpPr>
-          <p:cNvPr id="3" name="Content Placeholder 2"/>
-          <p:cNvSpPr>
-            <a:spLocks noGrp="1"/>
-          </p:cNvSpPr>
-          <p:nvPr>
-            <p:ph idx="1"/>
-          </p:nvPr>
-        </p:nvSpPr>
-        <p:spPr>
-          <a:xfrm>
-            <a:off x="457200" y="908720"/>
-            <a:ext cx="8229600" cy="5217443"/>
-          </a:xfrm>
-        </p:spPr>
-        <p:txBody>
-          <a:bodyPr>
-            <a:normAutofit/>
-          </a:bodyPr>
-          <a:lstStyle/>
-          <a:p>
-            <a:r>
-              <a:rPr lang="en-US" sz="2800" dirty="0" err="1" smtClean="0"/>
-              <a:t>Evaluación</a:t>
-            </a:r>
-            <a:r>
-              <a:rPr lang="en-US" sz="2800" dirty="0" smtClean="0"/>
-              <a:t> de la </a:t>
-            </a:r>
-            <a:r>
-              <a:rPr lang="en-US" sz="2800" dirty="0" err="1" smtClean="0"/>
-              <a:t>condición</a:t>
-            </a:r>
-            <a:r>
-              <a:rPr lang="en-US" sz="2800" dirty="0" smtClean="0"/>
-              <a:t> </a:t>
-            </a:r>
-            <a:r>
-              <a:rPr lang="en-US" sz="2800" dirty="0" smtClean="0"/>
-              <a:t>de </a:t>
-            </a:r>
-            <a:r>
-              <a:rPr lang="en-US" sz="2800" dirty="0" err="1" smtClean="0"/>
-              <a:t>parada</a:t>
-            </a:r>
-            <a:endParaRPr lang="en-US" sz="2800" dirty="0" smtClean="0"/>
-          </a:p>
-          <a:p>
-            <a:pPr lvl="1">
-              <a:buFont typeface="Wingdings" pitchFamily="2" charset="2"/>
-              <a:buChar char="§"/>
-            </a:pPr>
-            <a:r>
-              <a:rPr lang="en-US" sz="2000" dirty="0" err="1" smtClean="0"/>
-              <a:t>Mínima</a:t>
-            </a:r>
-            <a:r>
-              <a:rPr lang="en-US" sz="2000" dirty="0" smtClean="0"/>
-              <a:t> </a:t>
-            </a:r>
-            <a:r>
-              <a:rPr lang="en-US" sz="2000" dirty="0" err="1" smtClean="0"/>
-              <a:t>cantidad</a:t>
-            </a:r>
-            <a:r>
-              <a:rPr lang="en-US" sz="2000" dirty="0" smtClean="0"/>
-              <a:t> de </a:t>
-            </a:r>
-            <a:r>
-              <a:rPr lang="en-US" sz="2000" dirty="0" err="1" smtClean="0"/>
-              <a:t>generaciones</a:t>
-            </a:r>
-            <a:endParaRPr lang="en-US" sz="2000" dirty="0" smtClean="0"/>
-          </a:p>
-          <a:p>
-            <a:pPr lvl="1">
-              <a:buFont typeface="Wingdings" pitchFamily="2" charset="2"/>
-              <a:buChar char="§"/>
-            </a:pPr>
-            <a:r>
-              <a:rPr lang="en-US" sz="2000" dirty="0" err="1" smtClean="0"/>
-              <a:t>Ultimas</a:t>
-            </a:r>
-            <a:r>
-              <a:rPr lang="en-US" sz="2000" dirty="0" smtClean="0"/>
-              <a:t> X </a:t>
-            </a:r>
-            <a:r>
-              <a:rPr lang="en-US" sz="2000" dirty="0" err="1" smtClean="0"/>
-              <a:t>generaciónes</a:t>
-            </a:r>
-            <a:r>
-              <a:rPr lang="en-US" sz="2000" dirty="0" smtClean="0"/>
-              <a:t> </a:t>
-            </a:r>
-            <a:r>
-              <a:rPr lang="en-US" sz="2000" dirty="0" smtClean="0"/>
-              <a:t>sin </a:t>
-            </a:r>
-            <a:r>
-              <a:rPr lang="en-US" sz="2000" dirty="0" err="1" smtClean="0"/>
-              <a:t>que</a:t>
-            </a:r>
-            <a:r>
-              <a:rPr lang="en-US" sz="2000" dirty="0" smtClean="0"/>
-              <a:t> </a:t>
-            </a:r>
-            <a:r>
-              <a:rPr lang="en-US" sz="2000" dirty="0" err="1" smtClean="0"/>
-              <a:t>haya</a:t>
-            </a:r>
-            <a:r>
-              <a:rPr lang="en-US" sz="2000" dirty="0" smtClean="0"/>
-              <a:t> </a:t>
-            </a:r>
-            <a:r>
-              <a:rPr lang="en-US" sz="2000" dirty="0" err="1" smtClean="0"/>
-              <a:t>mejorado</a:t>
-            </a:r>
-            <a:r>
-              <a:rPr lang="en-US" sz="2000" dirty="0" smtClean="0"/>
-              <a:t> el </a:t>
-            </a:r>
-            <a:r>
-              <a:rPr lang="en-US" sz="2000" dirty="0" err="1" smtClean="0"/>
-              <a:t>beneficio</a:t>
-            </a:r>
-            <a:r>
-              <a:rPr lang="en-US" sz="2000" dirty="0" smtClean="0"/>
-              <a:t> de la </a:t>
-            </a:r>
-            <a:r>
-              <a:rPr lang="en-US" sz="2000" dirty="0" err="1" smtClean="0"/>
-              <a:t>mejor</a:t>
-            </a:r>
-            <a:r>
-              <a:rPr lang="en-US" sz="2000" dirty="0" smtClean="0"/>
-              <a:t> </a:t>
-            </a:r>
-            <a:r>
-              <a:rPr lang="en-US" sz="2000" dirty="0" err="1" smtClean="0"/>
-              <a:t>solución</a:t>
-            </a:r>
-            <a:endParaRPr lang="en-US" sz="2000" dirty="0" smtClean="0"/>
-          </a:p>
-          <a:p>
-            <a:pPr lvl="1">
-              <a:buFont typeface="Wingdings" pitchFamily="2" charset="2"/>
-              <a:buChar char="§"/>
-            </a:pPr>
-            <a:r>
-              <a:rPr lang="en-US" sz="2000" dirty="0" smtClean="0"/>
-              <a:t>Si no se </a:t>
-            </a:r>
-            <a:r>
-              <a:rPr lang="en-US" sz="2000" dirty="0" err="1" smtClean="0"/>
-              <a:t>cumplen</a:t>
-            </a:r>
-            <a:r>
-              <a:rPr lang="en-US" sz="2000" dirty="0" smtClean="0"/>
-              <a:t> </a:t>
-            </a:r>
-            <a:r>
-              <a:rPr lang="en-US" sz="2000" dirty="0" err="1" smtClean="0"/>
-              <a:t>las</a:t>
-            </a:r>
-            <a:r>
-              <a:rPr lang="en-US" sz="2000" dirty="0" smtClean="0"/>
-              <a:t> </a:t>
-            </a:r>
-            <a:r>
-              <a:rPr lang="en-US" sz="2000" dirty="0" err="1" smtClean="0"/>
-              <a:t>condiciones</a:t>
-            </a:r>
-            <a:r>
-              <a:rPr lang="en-US" sz="2000" dirty="0" smtClean="0"/>
-              <a:t>, </a:t>
-            </a:r>
-            <a:r>
-              <a:rPr lang="en-US" sz="2000" dirty="0" err="1" smtClean="0"/>
-              <a:t>comienza</a:t>
-            </a:r>
-            <a:r>
-              <a:rPr lang="en-US" sz="2000" dirty="0" smtClean="0"/>
-              <a:t> un </a:t>
-            </a:r>
-            <a:r>
-              <a:rPr lang="en-US" sz="2000" dirty="0" err="1" smtClean="0"/>
-              <a:t>nuevo</a:t>
-            </a:r>
-            <a:r>
-              <a:rPr lang="en-US" sz="2000" dirty="0" smtClean="0"/>
-              <a:t> </a:t>
-            </a:r>
-            <a:r>
-              <a:rPr lang="en-US" sz="2000" dirty="0" err="1" smtClean="0"/>
-              <a:t>ciclo</a:t>
-            </a:r>
-            <a:r>
-              <a:rPr lang="en-US" sz="2000" dirty="0" smtClean="0"/>
-              <a:t> </a:t>
-            </a:r>
-            <a:r>
-              <a:rPr lang="en-US" sz="2000" dirty="0" err="1" smtClean="0"/>
-              <a:t>evolucionando</a:t>
-            </a:r>
-            <a:r>
-              <a:rPr lang="en-US" sz="2000" dirty="0" smtClean="0"/>
-              <a:t> la </a:t>
-            </a:r>
-            <a:r>
-              <a:rPr lang="en-US" sz="2000" dirty="0" err="1" smtClean="0"/>
-              <a:t>población</a:t>
-            </a:r>
-            <a:endParaRPr lang="en-US" sz="2000" dirty="0" smtClean="0"/>
-          </a:p>
-          <a:p>
-            <a:pPr lvl="1">
-              <a:buFont typeface="Wingdings" pitchFamily="2" charset="2"/>
-              <a:buChar char="§"/>
-            </a:pPr>
-            <a:r>
-              <a:rPr lang="en-US" sz="2000" dirty="0" smtClean="0"/>
-              <a:t>Si se </a:t>
-            </a:r>
-            <a:r>
-              <a:rPr lang="en-US" sz="2000" dirty="0" err="1" smtClean="0"/>
-              <a:t>cumplen</a:t>
-            </a:r>
-            <a:r>
-              <a:rPr lang="en-US" sz="2000" dirty="0" smtClean="0"/>
-              <a:t>, </a:t>
-            </a:r>
-            <a:r>
-              <a:rPr lang="en-US" sz="2000" dirty="0" err="1" smtClean="0"/>
-              <a:t>r</a:t>
-            </a:r>
-            <a:r>
-              <a:rPr lang="en-US" sz="2000" dirty="0" err="1" smtClean="0"/>
-              <a:t>etorna</a:t>
-            </a:r>
-            <a:r>
-              <a:rPr lang="en-US" sz="2000" dirty="0" smtClean="0"/>
-              <a:t> la </a:t>
-            </a:r>
-            <a:r>
-              <a:rPr lang="en-US" sz="2000" dirty="0" err="1" smtClean="0"/>
-              <a:t>mejor</a:t>
-            </a:r>
-            <a:r>
-              <a:rPr lang="en-US" sz="2000" dirty="0" smtClean="0"/>
-              <a:t> </a:t>
-            </a:r>
-            <a:r>
-              <a:rPr lang="en-US" sz="2000" dirty="0" err="1" smtClean="0"/>
-              <a:t>solución</a:t>
-            </a:r>
-            <a:endParaRPr lang="es-AR" sz="2000" dirty="0"/>
-          </a:p>
-        </p:txBody>
-      </p:sp>
-    </p:spTree>
-    <p:extLst>
-      <p:ext uri="{BB962C8B-B14F-4D97-AF65-F5344CB8AC3E}">
-        <p14:creationId xmlns:p14="http://schemas.microsoft.com/office/powerpoint/2010/main" val="2559275626"/>
       </p:ext>
     </p:extLst>
   </p:cSld>
@@ -5468,303 +5540,53 @@
             <a:pPr algn="r"/>
             <a:r>
               <a:rPr lang="en-US" sz="2400" dirty="0" err="1" smtClean="0"/>
-              <a:t>Resultados</a:t>
+              <a:t>Algoritmo</a:t>
+            </a:r>
+            <a:r>
+              <a:rPr lang="en-US" sz="2400" dirty="0" smtClean="0"/>
+              <a:t> </a:t>
+            </a:r>
+            <a:r>
+              <a:rPr lang="en-US" sz="2400" dirty="0" err="1" smtClean="0"/>
+              <a:t>Propuesto</a:t>
             </a:r>
             <a:endParaRPr lang="en-US" sz="2400" dirty="0" smtClean="0"/>
           </a:p>
         </p:txBody>
       </p:sp>
-      <p:sp>
-        <p:nvSpPr>
-          <p:cNvPr id="3" name="Content Placeholder 2"/>
-          <p:cNvSpPr>
-            <a:spLocks noGrp="1"/>
-          </p:cNvSpPr>
+      <p:pic>
+        <p:nvPicPr>
+          <p:cNvPr id="5" name="Content Placeholder 4"/>
+          <p:cNvPicPr>
+            <a:picLocks noGrp="1" noChangeAspect="1"/>
+          </p:cNvPicPr>
           <p:nvPr>
             <p:ph idx="1"/>
           </p:nvPr>
-        </p:nvSpPr>
+        </p:nvPicPr>
+        <p:blipFill>
+          <a:blip r:embed="rId2">
+            <a:extLst>
+              <a:ext uri="{28A0092B-C50C-407E-A947-70E740481C1C}">
+                <a14:useLocalDpi xmlns:a14="http://schemas.microsoft.com/office/drawing/2010/main" val="0"/>
+              </a:ext>
+            </a:extLst>
+          </a:blip>
+          <a:stretch>
+            <a:fillRect/>
+          </a:stretch>
+        </p:blipFill>
         <p:spPr>
           <a:xfrm>
-            <a:off x="457200" y="908720"/>
-            <a:ext cx="8229600" cy="5217443"/>
+            <a:off x="539552" y="1124744"/>
+            <a:ext cx="8346619" cy="5040560"/>
           </a:xfrm>
         </p:spPr>
-        <p:txBody>
-          <a:bodyPr>
-            <a:normAutofit/>
-          </a:bodyPr>
-          <a:lstStyle/>
-          <a:p>
-            <a:r>
-              <a:rPr lang="es-ES" sz="2000" dirty="0" smtClean="0"/>
-              <a:t>Trabajos previos</a:t>
-            </a:r>
-          </a:p>
-          <a:p>
-            <a:pPr lvl="1"/>
-            <a:r>
-              <a:rPr lang="es-ES" sz="1600" dirty="0" smtClean="0"/>
-              <a:t>Optimización multinivel de Chao </a:t>
-            </a:r>
-            <a:r>
-              <a:rPr lang="es-ES" sz="1600" dirty="0"/>
-              <a:t>et al</a:t>
-            </a:r>
-            <a:r>
-              <a:rPr lang="es-ES" sz="1600" dirty="0" smtClean="0"/>
-              <a:t>.  (CGW)</a:t>
-            </a:r>
-          </a:p>
-          <a:p>
-            <a:pPr lvl="1"/>
-            <a:r>
-              <a:rPr lang="es-AR" sz="1600" dirty="0" err="1"/>
-              <a:t>Tabu</a:t>
-            </a:r>
-            <a:r>
-              <a:rPr lang="es-AR" sz="1600" dirty="0"/>
-              <a:t> </a:t>
-            </a:r>
-            <a:r>
-              <a:rPr lang="es-AR" sz="1600" dirty="0" err="1"/>
-              <a:t>Search</a:t>
-            </a:r>
-            <a:r>
-              <a:rPr lang="es-AR" sz="1600" dirty="0"/>
-              <a:t> de </a:t>
-            </a:r>
-            <a:r>
-              <a:rPr lang="es-AR" sz="1600" dirty="0" err="1"/>
-              <a:t>Tang</a:t>
-            </a:r>
-            <a:r>
-              <a:rPr lang="es-AR" sz="1600" dirty="0"/>
-              <a:t> y </a:t>
-            </a:r>
-            <a:r>
-              <a:rPr lang="es-AR" sz="1600" dirty="0" smtClean="0"/>
-              <a:t>Miller-</a:t>
-            </a:r>
-            <a:r>
-              <a:rPr lang="es-AR" sz="1600" dirty="0" err="1" smtClean="0"/>
-              <a:t>Hooks</a:t>
-            </a:r>
-            <a:r>
-              <a:rPr lang="es-AR" sz="1600" dirty="0" smtClean="0"/>
-              <a:t> (TMH)</a:t>
-            </a:r>
-            <a:endParaRPr lang="es-ES" sz="1600" dirty="0" smtClean="0"/>
-          </a:p>
-          <a:p>
-            <a:pPr lvl="1"/>
-            <a:r>
-              <a:rPr lang="fr-FR" sz="1600" dirty="0" err="1"/>
-              <a:t>Memetic</a:t>
-            </a:r>
-            <a:r>
-              <a:rPr lang="fr-FR" sz="1600" dirty="0"/>
-              <a:t> </a:t>
-            </a:r>
-            <a:r>
-              <a:rPr lang="fr-FR" sz="1600" dirty="0" err="1"/>
-              <a:t>Algorithm</a:t>
-            </a:r>
-            <a:r>
-              <a:rPr lang="fr-FR" sz="1600" dirty="0"/>
-              <a:t> (MA) de </a:t>
-            </a:r>
-            <a:r>
-              <a:rPr lang="fr-FR" sz="1600" dirty="0" err="1"/>
-              <a:t>Bouly</a:t>
-            </a:r>
-            <a:r>
-              <a:rPr lang="fr-FR" sz="1600" dirty="0"/>
-              <a:t> et al</a:t>
-            </a:r>
-            <a:r>
-              <a:rPr lang="fr-FR" sz="1600" dirty="0" smtClean="0"/>
-              <a:t>.</a:t>
-            </a:r>
-          </a:p>
-          <a:p>
-            <a:pPr lvl="1"/>
-            <a:r>
-              <a:rPr lang="fr-FR" sz="1600" dirty="0" err="1"/>
-              <a:t>Ant</a:t>
-            </a:r>
-            <a:r>
-              <a:rPr lang="fr-FR" sz="1600" dirty="0"/>
-              <a:t> </a:t>
-            </a:r>
-            <a:r>
-              <a:rPr lang="fr-FR" sz="1600" dirty="0" err="1"/>
-              <a:t>Colony</a:t>
-            </a:r>
-            <a:r>
-              <a:rPr lang="fr-FR" sz="1600" dirty="0"/>
-              <a:t> </a:t>
-            </a:r>
-            <a:r>
-              <a:rPr lang="fr-FR" sz="1600" dirty="0" err="1"/>
-              <a:t>Optimization</a:t>
-            </a:r>
-            <a:r>
-              <a:rPr lang="fr-FR" sz="1600" dirty="0"/>
-              <a:t> (</a:t>
-            </a:r>
-            <a:r>
-              <a:rPr lang="fr-FR" sz="1600" dirty="0" err="1"/>
-              <a:t>ACOseq</a:t>
-            </a:r>
-            <a:r>
-              <a:rPr lang="fr-FR" sz="1600" dirty="0"/>
-              <a:t>) de </a:t>
-            </a:r>
-            <a:r>
-              <a:rPr lang="fr-FR" sz="1600" dirty="0" err="1"/>
-              <a:t>Ke</a:t>
-            </a:r>
-            <a:r>
-              <a:rPr lang="fr-FR" sz="1600" dirty="0"/>
-              <a:t> et al</a:t>
-            </a:r>
-            <a:r>
-              <a:rPr lang="fr-FR" sz="1600" dirty="0" smtClean="0"/>
-              <a:t>.</a:t>
-            </a:r>
-          </a:p>
-          <a:p>
-            <a:pPr lvl="1"/>
-            <a:r>
-              <a:rPr lang="en-US" sz="1600" dirty="0"/>
-              <a:t>Variable Neighborhood Search (</a:t>
-            </a:r>
-            <a:r>
-              <a:rPr lang="en-US" sz="1600" dirty="0" err="1"/>
-              <a:t>VNSslow</a:t>
-            </a:r>
-            <a:r>
-              <a:rPr lang="en-US" sz="1600" dirty="0"/>
-              <a:t>) de </a:t>
-            </a:r>
-            <a:r>
-              <a:rPr lang="en-US" sz="1600" dirty="0" err="1"/>
-              <a:t>Archetti</a:t>
-            </a:r>
-            <a:r>
-              <a:rPr lang="en-US" sz="1600" dirty="0"/>
-              <a:t> et al</a:t>
-            </a:r>
-            <a:r>
-              <a:rPr lang="en-US" sz="1600" dirty="0" smtClean="0"/>
-              <a:t>.</a:t>
-            </a:r>
-            <a:endParaRPr lang="es-ES" sz="1600" dirty="0" smtClean="0"/>
-          </a:p>
-          <a:p>
-            <a:r>
-              <a:rPr lang="es-ES" sz="2000" dirty="0" smtClean="0"/>
-              <a:t>Por instancia</a:t>
-            </a:r>
-          </a:p>
-          <a:p>
-            <a:pPr lvl="1"/>
-            <a:r>
-              <a:rPr lang="es-ES" sz="1600" dirty="0" smtClean="0"/>
-              <a:t>TODO imagen de los resultados para 6 instancias en sol final</a:t>
-            </a:r>
-          </a:p>
-          <a:p>
-            <a:r>
-              <a:rPr lang="es-ES" sz="2000" dirty="0" smtClean="0"/>
-              <a:t>Global</a:t>
-            </a:r>
-          </a:p>
-          <a:p>
-            <a:pPr lvl="1"/>
-            <a:r>
-              <a:rPr lang="es-ES" sz="1600" dirty="0" smtClean="0"/>
-              <a:t>TODO explicar columnas</a:t>
-            </a:r>
-          </a:p>
-          <a:p>
-            <a:pPr lvl="1"/>
-            <a:endParaRPr lang="es-ES" sz="1600" dirty="0" smtClean="0"/>
-          </a:p>
-          <a:p>
-            <a:pPr lvl="1"/>
-            <a:r>
-              <a:rPr lang="es-ES" sz="1600" dirty="0" smtClean="0"/>
-              <a:t>TODO imagen de la diferencias de sumas</a:t>
-            </a:r>
-          </a:p>
-          <a:p>
-            <a:endParaRPr lang="es-ES" sz="2000" dirty="0" smtClean="0"/>
-          </a:p>
-        </p:txBody>
-      </p:sp>
-      <p:graphicFrame>
-        <p:nvGraphicFramePr>
-          <p:cNvPr id="4" name="Object 3"/>
-          <p:cNvGraphicFramePr>
-            <a:graphicFrameLocks noChangeAspect="1"/>
-          </p:cNvGraphicFramePr>
-          <p:nvPr>
-            <p:extLst>
-              <p:ext uri="{D42A27DB-BD31-4B8C-83A1-F6EECF244321}">
-                <p14:modId xmlns:p14="http://schemas.microsoft.com/office/powerpoint/2010/main" val="2011832794"/>
-              </p:ext>
-            </p:extLst>
-          </p:nvPr>
-        </p:nvGraphicFramePr>
-        <p:xfrm>
-          <a:off x="4139952" y="3717032"/>
-          <a:ext cx="2960329" cy="720080"/>
-        </p:xfrm>
-        <a:graphic>
-          <a:graphicData uri="http://schemas.openxmlformats.org/presentationml/2006/ole">
-            <mc:AlternateContent xmlns:mc="http://schemas.openxmlformats.org/markup-compatibility/2006">
-              <mc:Choice xmlns:v="urn:schemas-microsoft-com:vml" Requires="v">
-                <p:oleObj spid="_x0000_s1053" name="Equation" r:id="rId3" imgW="1409400" imgH="342720" progId="Equation.3">
-                  <p:embed/>
-                </p:oleObj>
-              </mc:Choice>
-              <mc:Fallback>
-                <p:oleObj name="Equation" r:id="rId3" imgW="1409400" imgH="342720" progId="Equation.3">
-                  <p:embed/>
-                  <p:pic>
-                    <p:nvPicPr>
-                      <p:cNvPr id="0" name=""/>
-                      <p:cNvPicPr/>
-                      <p:nvPr/>
-                    </p:nvPicPr>
-                    <p:blipFill>
-                      <a:blip r:embed="rId4"/>
-                      <a:stretch>
-                        <a:fillRect/>
-                      </a:stretch>
-                    </p:blipFill>
-                    <p:spPr>
-                      <a:xfrm>
-                        <a:off x="4139952" y="3717032"/>
-                        <a:ext cx="2960329" cy="720080"/>
-                      </a:xfrm>
-                      <a:prstGeom prst="rect">
-                        <a:avLst/>
-                      </a:prstGeom>
-                    </p:spPr>
-                  </p:pic>
-                </p:oleObj>
-              </mc:Fallback>
-            </mc:AlternateContent>
-          </a:graphicData>
-        </a:graphic>
-      </p:graphicFrame>
+      </p:pic>
     </p:spTree>
     <p:extLst>
       <p:ext uri="{BB962C8B-B14F-4D97-AF65-F5344CB8AC3E}">
-        <p14:creationId xmlns:p14="http://schemas.microsoft.com/office/powerpoint/2010/main" val="512476657"/>
+        <p14:creationId xmlns:p14="http://schemas.microsoft.com/office/powerpoint/2010/main" val="2559275626"/>
       </p:ext>
     </p:extLst>
   </p:cSld>
@@ -5816,7 +5638,7 @@
             <a:pPr algn="r"/>
             <a:r>
               <a:rPr lang="en-US" sz="2400" dirty="0" err="1" smtClean="0"/>
-              <a:t>Conclusiones</a:t>
+              <a:t>Resultados</a:t>
             </a:r>
             <a:endParaRPr lang="en-US" sz="2400" dirty="0" smtClean="0"/>
           </a:p>
@@ -5846,152 +5668,191 @@
           <a:p>
             <a:r>
               <a:rPr lang="es-ES" sz="2800" dirty="0" smtClean="0"/>
-              <a:t>Los resultados fueron muy buenos, </a:t>
-            </a:r>
-            <a:r>
-              <a:rPr lang="es-AR" sz="2800" dirty="0" smtClean="0"/>
-              <a:t>un </a:t>
-            </a:r>
-            <a:r>
-              <a:rPr lang="es-AR" sz="2800" dirty="0"/>
-              <a:t>70% de los resultados llegaron a la mejor solución conocida de la instancia </a:t>
-            </a:r>
-            <a:r>
-              <a:rPr lang="es-AR" sz="2800" dirty="0" smtClean="0"/>
-              <a:t>testeada.</a:t>
-            </a:r>
-          </a:p>
-          <a:p>
-            <a:r>
-              <a:rPr lang="en-US" sz="2800" dirty="0" smtClean="0"/>
-              <a:t>El restante 30% </a:t>
-            </a:r>
-            <a:r>
-              <a:rPr lang="en-US" sz="2800" dirty="0" err="1" smtClean="0"/>
-              <a:t>obtuvo</a:t>
-            </a:r>
-            <a:r>
-              <a:rPr lang="en-US" sz="2800" dirty="0" smtClean="0"/>
-              <a:t> </a:t>
-            </a:r>
-            <a:r>
-              <a:rPr lang="en-US" sz="2800" dirty="0" err="1" smtClean="0"/>
-              <a:t>valores</a:t>
-            </a:r>
-            <a:r>
-              <a:rPr lang="en-US" sz="2800" dirty="0" smtClean="0"/>
-              <a:t> </a:t>
-            </a:r>
-            <a:r>
-              <a:rPr lang="en-US" sz="2800" dirty="0" err="1" smtClean="0"/>
-              <a:t>muy</a:t>
-            </a:r>
-            <a:r>
-              <a:rPr lang="en-US" sz="2800" dirty="0" smtClean="0"/>
-              <a:t> </a:t>
-            </a:r>
-            <a:r>
-              <a:rPr lang="en-US" sz="2800" dirty="0" err="1" smtClean="0"/>
-              <a:t>competitivos</a:t>
-            </a:r>
-            <a:r>
-              <a:rPr lang="en-US" sz="2800" dirty="0" smtClean="0"/>
-              <a:t> con los </a:t>
-            </a:r>
-            <a:r>
-              <a:rPr lang="en-US" sz="2800" dirty="0" err="1" smtClean="0"/>
-              <a:t>mejores</a:t>
-            </a:r>
-            <a:r>
-              <a:rPr lang="en-US" sz="2800" dirty="0" smtClean="0"/>
-              <a:t> </a:t>
-            </a:r>
-            <a:r>
-              <a:rPr lang="en-US" sz="2800" dirty="0" err="1" smtClean="0"/>
-              <a:t>trabajos</a:t>
-            </a:r>
-            <a:r>
-              <a:rPr lang="en-US" sz="2800" dirty="0" smtClean="0"/>
-              <a:t> </a:t>
-            </a:r>
-            <a:r>
-              <a:rPr lang="en-US" sz="2800" dirty="0" err="1" smtClean="0"/>
-              <a:t>previos</a:t>
-            </a:r>
-            <a:r>
-              <a:rPr lang="en-US" sz="2800" dirty="0" smtClean="0"/>
+              <a:t>Se compararon los resultados con los siguientes trabajos previos:</a:t>
+            </a:r>
+          </a:p>
+          <a:p>
+            <a:pPr lvl="1">
+              <a:buFont typeface="Wingdings" pitchFamily="2" charset="2"/>
+              <a:buChar char="§"/>
+            </a:pPr>
+            <a:r>
+              <a:rPr lang="es-ES" sz="2000" dirty="0" smtClean="0"/>
+              <a:t>Optimización multinivel de Chao </a:t>
+            </a:r>
+            <a:r>
+              <a:rPr lang="es-ES" sz="2000" dirty="0"/>
+              <a:t>et al</a:t>
+            </a:r>
+            <a:r>
+              <a:rPr lang="es-ES" sz="2000" dirty="0" smtClean="0"/>
+              <a:t>.  (CGW)</a:t>
+            </a:r>
+          </a:p>
+          <a:p>
+            <a:pPr lvl="1">
+              <a:buFont typeface="Wingdings" pitchFamily="2" charset="2"/>
+              <a:buChar char="§"/>
+            </a:pPr>
+            <a:r>
+              <a:rPr lang="es-AR" sz="2000" dirty="0" err="1"/>
+              <a:t>Tabu</a:t>
+            </a:r>
+            <a:r>
+              <a:rPr lang="es-AR" sz="2000" dirty="0"/>
+              <a:t> </a:t>
+            </a:r>
+            <a:r>
+              <a:rPr lang="es-AR" sz="2000" dirty="0" err="1"/>
+              <a:t>Search</a:t>
+            </a:r>
+            <a:r>
+              <a:rPr lang="es-AR" sz="2000" dirty="0"/>
+              <a:t> de </a:t>
+            </a:r>
+            <a:r>
+              <a:rPr lang="es-AR" sz="2000" dirty="0" err="1"/>
+              <a:t>Tang</a:t>
+            </a:r>
+            <a:r>
+              <a:rPr lang="es-AR" sz="2000" dirty="0"/>
+              <a:t> y </a:t>
+            </a:r>
+            <a:r>
+              <a:rPr lang="es-AR" sz="2000" dirty="0" smtClean="0"/>
+              <a:t>Miller-</a:t>
+            </a:r>
+            <a:r>
+              <a:rPr lang="es-AR" sz="2000" dirty="0" err="1" smtClean="0"/>
+              <a:t>Hooks</a:t>
+            </a:r>
+            <a:r>
+              <a:rPr lang="es-AR" sz="2000" dirty="0" smtClean="0"/>
+              <a:t> (TMH)</a:t>
+            </a:r>
+            <a:endParaRPr lang="es-ES" sz="2000" dirty="0" smtClean="0"/>
+          </a:p>
+          <a:p>
+            <a:pPr lvl="1">
+              <a:buFont typeface="Wingdings" pitchFamily="2" charset="2"/>
+              <a:buChar char="§"/>
+            </a:pPr>
+            <a:r>
+              <a:rPr lang="fr-FR" sz="2000" dirty="0" err="1"/>
+              <a:t>Memetic</a:t>
+            </a:r>
+            <a:r>
+              <a:rPr lang="fr-FR" sz="2000" dirty="0"/>
+              <a:t> </a:t>
+            </a:r>
+            <a:r>
+              <a:rPr lang="fr-FR" sz="2000" dirty="0" err="1"/>
+              <a:t>Algorithm</a:t>
+            </a:r>
+            <a:r>
+              <a:rPr lang="fr-FR" sz="2000" dirty="0"/>
+              <a:t> (MA) de </a:t>
+            </a:r>
+            <a:r>
+              <a:rPr lang="fr-FR" sz="2000" dirty="0" err="1"/>
+              <a:t>Bouly</a:t>
+            </a:r>
+            <a:r>
+              <a:rPr lang="fr-FR" sz="2000" dirty="0"/>
+              <a:t> et al</a:t>
+            </a:r>
+            <a:r>
+              <a:rPr lang="fr-FR" sz="2000" dirty="0" smtClean="0"/>
               <a:t>.</a:t>
             </a:r>
           </a:p>
           <a:p>
-            <a:r>
-              <a:rPr lang="en-US" sz="2800" dirty="0" smtClean="0"/>
-              <a:t>El BRKGA </a:t>
-            </a:r>
-            <a:r>
-              <a:rPr lang="en-US" sz="2800" dirty="0" err="1" smtClean="0"/>
-              <a:t>puro</a:t>
-            </a:r>
-            <a:r>
-              <a:rPr lang="en-US" sz="2800" dirty="0" smtClean="0"/>
-              <a:t> no </a:t>
-            </a:r>
-            <a:r>
-              <a:rPr lang="en-US" sz="2800" dirty="0" err="1" smtClean="0"/>
-              <a:t>es</a:t>
-            </a:r>
-            <a:r>
-              <a:rPr lang="en-US" sz="2800" dirty="0" smtClean="0"/>
-              <a:t> </a:t>
-            </a:r>
-            <a:r>
-              <a:rPr lang="en-US" sz="2800" dirty="0" err="1" smtClean="0"/>
-              <a:t>bueno</a:t>
-            </a:r>
-            <a:r>
-              <a:rPr lang="en-US" sz="2800" dirty="0" smtClean="0"/>
-              <a:t> </a:t>
-            </a:r>
-            <a:r>
-              <a:rPr lang="en-US" sz="2800" dirty="0" err="1" smtClean="0"/>
-              <a:t>para</a:t>
-            </a:r>
-            <a:r>
-              <a:rPr lang="en-US" sz="2800" dirty="0" smtClean="0"/>
-              <a:t> </a:t>
-            </a:r>
-            <a:r>
-              <a:rPr lang="en-US" sz="2800" dirty="0" err="1" smtClean="0"/>
-              <a:t>instancias</a:t>
-            </a:r>
-            <a:r>
-              <a:rPr lang="en-US" sz="2800" dirty="0" smtClean="0"/>
-              <a:t> </a:t>
-            </a:r>
-            <a:r>
-              <a:rPr lang="en-US" sz="2800" dirty="0" err="1" smtClean="0"/>
-              <a:t>grandes</a:t>
-            </a:r>
-            <a:r>
-              <a:rPr lang="en-US" sz="2800" dirty="0" smtClean="0"/>
-              <a:t> del </a:t>
-            </a:r>
-            <a:r>
-              <a:rPr lang="en-US" sz="2800" dirty="0" err="1" smtClean="0"/>
-              <a:t>problema</a:t>
-            </a:r>
-            <a:r>
-              <a:rPr lang="en-US" sz="2800" dirty="0" smtClean="0"/>
+            <a:pPr lvl="1">
+              <a:buFont typeface="Wingdings" pitchFamily="2" charset="2"/>
+              <a:buChar char="§"/>
+            </a:pPr>
+            <a:r>
+              <a:rPr lang="fr-FR" sz="2000" dirty="0" err="1"/>
+              <a:t>Ant</a:t>
+            </a:r>
+            <a:r>
+              <a:rPr lang="fr-FR" sz="2000" dirty="0"/>
+              <a:t> </a:t>
+            </a:r>
+            <a:r>
+              <a:rPr lang="fr-FR" sz="2000" dirty="0" err="1"/>
+              <a:t>Colony</a:t>
+            </a:r>
+            <a:r>
+              <a:rPr lang="fr-FR" sz="2000" dirty="0"/>
+              <a:t> </a:t>
+            </a:r>
+            <a:r>
+              <a:rPr lang="fr-FR" sz="2000" dirty="0" err="1"/>
+              <a:t>Optimization</a:t>
+            </a:r>
+            <a:r>
+              <a:rPr lang="fr-FR" sz="2000" dirty="0"/>
+              <a:t> (</a:t>
+            </a:r>
+            <a:r>
+              <a:rPr lang="fr-FR" sz="2000" dirty="0" err="1"/>
+              <a:t>ACOseq</a:t>
+            </a:r>
+            <a:r>
+              <a:rPr lang="fr-FR" sz="2000" dirty="0"/>
+              <a:t>) de </a:t>
+            </a:r>
+            <a:r>
+              <a:rPr lang="fr-FR" sz="2000" dirty="0" err="1"/>
+              <a:t>Ke</a:t>
+            </a:r>
+            <a:r>
+              <a:rPr lang="fr-FR" sz="2000" dirty="0"/>
+              <a:t> et al</a:t>
+            </a:r>
+            <a:r>
+              <a:rPr lang="fr-FR" sz="2000" dirty="0" smtClean="0"/>
               <a:t>.</a:t>
             </a:r>
-            <a:endParaRPr lang="es-ES" sz="2800" dirty="0" smtClean="0"/>
+          </a:p>
+          <a:p>
+            <a:pPr lvl="1">
+              <a:buFont typeface="Wingdings" pitchFamily="2" charset="2"/>
+              <a:buChar char="§"/>
+            </a:pPr>
+            <a:r>
+              <a:rPr lang="en-US" sz="2000" dirty="0"/>
+              <a:t>Variable Neighborhood Search (</a:t>
+            </a:r>
+            <a:r>
+              <a:rPr lang="en-US" sz="2000" dirty="0" err="1"/>
+              <a:t>VNSslow</a:t>
+            </a:r>
+            <a:r>
+              <a:rPr lang="en-US" sz="2000" dirty="0"/>
+              <a:t>) de </a:t>
+            </a:r>
+            <a:r>
+              <a:rPr lang="en-US" sz="2000" dirty="0" err="1"/>
+              <a:t>Archetti</a:t>
+            </a:r>
+            <a:r>
+              <a:rPr lang="en-US" sz="2000" dirty="0"/>
+              <a:t> et al</a:t>
+            </a:r>
+            <a:r>
+              <a:rPr lang="en-US" sz="2000" dirty="0" smtClean="0"/>
+              <a:t>.</a:t>
+            </a:r>
+            <a:endParaRPr lang="es-ES" sz="2000" dirty="0" smtClean="0"/>
           </a:p>
         </p:txBody>
       </p:sp>
     </p:spTree>
     <p:extLst>
       <p:ext uri="{BB962C8B-B14F-4D97-AF65-F5344CB8AC3E}">
-        <p14:creationId xmlns:p14="http://schemas.microsoft.com/office/powerpoint/2010/main" val="962634165"/>
+        <p14:creationId xmlns:p14="http://schemas.microsoft.com/office/powerpoint/2010/main" val="293670459"/>
       </p:ext>
     </p:extLst>
   </p:cSld>
@@ -6419,15 +6280,7 @@
             <a:pPr algn="r"/>
             <a:r>
               <a:rPr lang="en-US" sz="2400" dirty="0" err="1" smtClean="0"/>
-              <a:t>Trabajos</a:t>
-            </a:r>
-            <a:r>
-              <a:rPr lang="en-US" sz="2400" dirty="0" smtClean="0"/>
-              <a:t> </a:t>
-            </a:r>
-            <a:r>
-              <a:rPr lang="en-US" sz="2400" dirty="0" err="1" smtClean="0"/>
-              <a:t>futuros</a:t>
+              <a:t>Resultados</a:t>
             </a:r>
             <a:endParaRPr lang="en-US" sz="2400" dirty="0" smtClean="0"/>
           </a:p>
@@ -6457,11 +6310,1335 @@
           <a:p>
             <a:r>
               <a:rPr lang="es-ES" sz="2800" dirty="0" smtClean="0"/>
-              <a:t>Seria </a:t>
+              <a:t>Resultados </a:t>
+            </a:r>
+            <a:r>
+              <a:rPr lang="es-ES" sz="2800" dirty="0" err="1" smtClean="0"/>
+              <a:t>brkga</a:t>
             </a:r>
             <a:r>
               <a:rPr lang="es-ES" sz="2800" dirty="0" smtClean="0"/>
-              <a:t>útil una herramienta para visualizar los caminos generados.</a:t>
+              <a:t> puro deco</a:t>
+            </a:r>
+            <a:r>
+              <a:rPr lang="es-ES" sz="2800" dirty="0" smtClean="0"/>
+              <a:t>dificador simple y goloso:</a:t>
+            </a:r>
+          </a:p>
+          <a:p>
+            <a:pPr marL="0" indent="0">
+              <a:buNone/>
+            </a:pPr>
+            <a:endParaRPr lang="es-ES" sz="2800" dirty="0" smtClean="0"/>
+          </a:p>
+          <a:p>
+            <a:pPr marL="0" indent="0">
+              <a:buNone/>
+            </a:pPr>
+            <a:endParaRPr lang="es-ES" sz="2000" dirty="0" smtClean="0"/>
+          </a:p>
+          <a:p>
+            <a:pPr marL="0" indent="0">
+              <a:buNone/>
+            </a:pPr>
+            <a:endParaRPr lang="es-ES" sz="2000" dirty="0" smtClean="0"/>
+          </a:p>
+        </p:txBody>
+      </p:sp>
+      <p:pic>
+        <p:nvPicPr>
+          <p:cNvPr id="10" name="Picture 9"/>
+          <p:cNvPicPr>
+            <a:picLocks noChangeAspect="1"/>
+          </p:cNvPicPr>
+          <p:nvPr/>
+        </p:nvPicPr>
+        <p:blipFill>
+          <a:blip r:embed="rId2">
+            <a:extLst>
+              <a:ext uri="{28A0092B-C50C-407E-A947-70E740481C1C}">
+                <a14:useLocalDpi xmlns:a14="http://schemas.microsoft.com/office/drawing/2010/main" val="0"/>
+              </a:ext>
+            </a:extLst>
+          </a:blip>
+          <a:stretch>
+            <a:fillRect/>
+          </a:stretch>
+        </p:blipFill>
+        <p:spPr>
+          <a:xfrm>
+            <a:off x="107504" y="3717032"/>
+            <a:ext cx="8878539" cy="1771897"/>
+          </a:xfrm>
+          <a:prstGeom prst="rect">
+            <a:avLst/>
+          </a:prstGeom>
+        </p:spPr>
+      </p:pic>
+      <p:pic>
+        <p:nvPicPr>
+          <p:cNvPr id="11" name="Picture 10"/>
+          <p:cNvPicPr>
+            <a:picLocks noChangeAspect="1"/>
+          </p:cNvPicPr>
+          <p:nvPr/>
+        </p:nvPicPr>
+        <p:blipFill>
+          <a:blip r:embed="rId3">
+            <a:extLst>
+              <a:ext uri="{28A0092B-C50C-407E-A947-70E740481C1C}">
+                <a14:useLocalDpi xmlns:a14="http://schemas.microsoft.com/office/drawing/2010/main" val="0"/>
+              </a:ext>
+            </a:extLst>
+          </a:blip>
+          <a:stretch>
+            <a:fillRect/>
+          </a:stretch>
+        </p:blipFill>
+        <p:spPr>
+          <a:xfrm>
+            <a:off x="107504" y="1628799"/>
+            <a:ext cx="8907118" cy="1810003"/>
+          </a:xfrm>
+          <a:prstGeom prst="rect">
+            <a:avLst/>
+          </a:prstGeom>
+        </p:spPr>
+      </p:pic>
+    </p:spTree>
+    <p:extLst>
+      <p:ext uri="{BB962C8B-B14F-4D97-AF65-F5344CB8AC3E}">
+        <p14:creationId xmlns:p14="http://schemas.microsoft.com/office/powerpoint/2010/main" val="512476657"/>
+      </p:ext>
+    </p:extLst>
+  </p:cSld>
+  <p:clrMapOvr>
+    <a:masterClrMapping/>
+  </p:clrMapOvr>
+</p:sld>
+</file>
+
+<file path=ppt/slides/slide21.xml><?xml version="1.0" encoding="utf-8"?>
+<p:sld xmlns:a="http://schemas.openxmlformats.org/drawingml/2006/main" xmlns:r="http://schemas.openxmlformats.org/officeDocument/2006/relationships" xmlns:p="http://schemas.openxmlformats.org/presentationml/2006/main">
+  <p:cSld>
+    <p:spTree>
+      <p:nvGrpSpPr>
+        <p:cNvPr id="1" name=""/>
+        <p:cNvGrpSpPr/>
+        <p:nvPr/>
+      </p:nvGrpSpPr>
+      <p:grpSpPr>
+        <a:xfrm>
+          <a:off x="0" y="0"/>
+          <a:ext cx="0" cy="0"/>
+          <a:chOff x="0" y="0"/>
+          <a:chExt cx="0" cy="0"/>
+        </a:xfrm>
+      </p:grpSpPr>
+      <p:sp>
+        <p:nvSpPr>
+          <p:cNvPr id="2" name="Title 1"/>
+          <p:cNvSpPr>
+            <a:spLocks noGrp="1"/>
+          </p:cNvSpPr>
+          <p:nvPr>
+            <p:ph type="title"/>
+          </p:nvPr>
+        </p:nvSpPr>
+        <p:spPr>
+          <a:xfrm>
+            <a:off x="457200" y="274638"/>
+            <a:ext cx="8229600" cy="418058"/>
+          </a:xfrm>
+        </p:spPr>
+        <p:txBody>
+          <a:bodyPr>
+            <a:normAutofit fontScale="90000"/>
+          </a:bodyPr>
+          <a:lstStyle/>
+          <a:p>
+            <a:pPr algn="r"/>
+            <a:r>
+              <a:rPr lang="en-US" sz="2400" dirty="0" err="1" smtClean="0"/>
+              <a:t>Resultados</a:t>
+            </a:r>
+            <a:endParaRPr lang="en-US" sz="2400" dirty="0" smtClean="0"/>
+          </a:p>
+        </p:txBody>
+      </p:sp>
+      <p:sp>
+        <p:nvSpPr>
+          <p:cNvPr id="3" name="Content Placeholder 2"/>
+          <p:cNvSpPr>
+            <a:spLocks noGrp="1"/>
+          </p:cNvSpPr>
+          <p:nvPr>
+            <p:ph idx="1"/>
+          </p:nvPr>
+        </p:nvSpPr>
+        <p:spPr>
+          <a:xfrm>
+            <a:off x="457200" y="908720"/>
+            <a:ext cx="8229600" cy="5217443"/>
+          </a:xfrm>
+        </p:spPr>
+        <p:txBody>
+          <a:bodyPr>
+            <a:normAutofit/>
+          </a:bodyPr>
+          <a:lstStyle/>
+          <a:p>
+            <a:r>
+              <a:rPr lang="es-ES" sz="2800" dirty="0"/>
+              <a:t>Resultados </a:t>
+            </a:r>
+            <a:r>
+              <a:rPr lang="es-ES" sz="2800" dirty="0" err="1"/>
+              <a:t>brkga</a:t>
+            </a:r>
+            <a:r>
+              <a:rPr lang="es-ES" sz="2800" dirty="0"/>
+              <a:t> con las búsquedas locales</a:t>
+            </a:r>
+            <a:r>
+              <a:rPr lang="es-ES" sz="2800" dirty="0" smtClean="0"/>
+              <a:t>:</a:t>
+            </a:r>
+          </a:p>
+          <a:p>
+            <a:pPr marL="0" indent="0">
+              <a:buNone/>
+            </a:pPr>
+            <a:endParaRPr lang="es-ES" sz="2800" dirty="0"/>
+          </a:p>
+          <a:p>
+            <a:endParaRPr lang="es-ES" sz="2800" dirty="0" smtClean="0"/>
+          </a:p>
+          <a:p>
+            <a:pPr marL="0" indent="0">
+              <a:buNone/>
+            </a:pPr>
+            <a:endParaRPr lang="es-ES" sz="2000" dirty="0" smtClean="0"/>
+          </a:p>
+        </p:txBody>
+      </p:sp>
+      <p:pic>
+        <p:nvPicPr>
+          <p:cNvPr id="6" name="Picture 5"/>
+          <p:cNvPicPr>
+            <a:picLocks noChangeAspect="1"/>
+          </p:cNvPicPr>
+          <p:nvPr/>
+        </p:nvPicPr>
+        <p:blipFill>
+          <a:blip r:embed="rId2">
+            <a:extLst>
+              <a:ext uri="{28A0092B-C50C-407E-A947-70E740481C1C}">
+                <a14:useLocalDpi xmlns:a14="http://schemas.microsoft.com/office/drawing/2010/main" val="0"/>
+              </a:ext>
+            </a:extLst>
+          </a:blip>
+          <a:stretch>
+            <a:fillRect/>
+          </a:stretch>
+        </p:blipFill>
+        <p:spPr>
+          <a:xfrm>
+            <a:off x="127967" y="2533525"/>
+            <a:ext cx="8888065" cy="1790950"/>
+          </a:xfrm>
+          <a:prstGeom prst="rect">
+            <a:avLst/>
+          </a:prstGeom>
+        </p:spPr>
+      </p:pic>
+    </p:spTree>
+    <p:extLst>
+      <p:ext uri="{BB962C8B-B14F-4D97-AF65-F5344CB8AC3E}">
+        <p14:creationId xmlns:p14="http://schemas.microsoft.com/office/powerpoint/2010/main" val="321265640"/>
+      </p:ext>
+    </p:extLst>
+  </p:cSld>
+  <p:clrMapOvr>
+    <a:masterClrMapping/>
+  </p:clrMapOvr>
+</p:sld>
+</file>
+
+<file path=ppt/slides/slide22.xml><?xml version="1.0" encoding="utf-8"?>
+<p:sld xmlns:a="http://schemas.openxmlformats.org/drawingml/2006/main" xmlns:r="http://schemas.openxmlformats.org/officeDocument/2006/relationships" xmlns:p="http://schemas.openxmlformats.org/presentationml/2006/main">
+  <p:cSld>
+    <p:spTree>
+      <p:nvGrpSpPr>
+        <p:cNvPr id="1" name=""/>
+        <p:cNvGrpSpPr/>
+        <p:nvPr/>
+      </p:nvGrpSpPr>
+      <p:grpSpPr>
+        <a:xfrm>
+          <a:off x="0" y="0"/>
+          <a:ext cx="0" cy="0"/>
+          <a:chOff x="0" y="0"/>
+          <a:chExt cx="0" cy="0"/>
+        </a:xfrm>
+      </p:grpSpPr>
+      <p:sp>
+        <p:nvSpPr>
+          <p:cNvPr id="2" name="Title 1"/>
+          <p:cNvSpPr>
+            <a:spLocks noGrp="1"/>
+          </p:cNvSpPr>
+          <p:nvPr>
+            <p:ph type="title"/>
+          </p:nvPr>
+        </p:nvSpPr>
+        <p:spPr>
+          <a:xfrm>
+            <a:off x="457200" y="274638"/>
+            <a:ext cx="8229600" cy="418058"/>
+          </a:xfrm>
+        </p:spPr>
+        <p:txBody>
+          <a:bodyPr>
+            <a:normAutofit fontScale="90000"/>
+          </a:bodyPr>
+          <a:lstStyle/>
+          <a:p>
+            <a:pPr algn="r"/>
+            <a:r>
+              <a:rPr lang="en-US" sz="2400" dirty="0" err="1" smtClean="0"/>
+              <a:t>Resultados</a:t>
+            </a:r>
+            <a:endParaRPr lang="en-US" sz="2400" dirty="0" smtClean="0"/>
+          </a:p>
+        </p:txBody>
+      </p:sp>
+      <p:sp>
+        <p:nvSpPr>
+          <p:cNvPr id="3" name="Content Placeholder 2"/>
+          <p:cNvSpPr>
+            <a:spLocks noGrp="1"/>
+          </p:cNvSpPr>
+          <p:nvPr>
+            <p:ph idx="1"/>
+          </p:nvPr>
+        </p:nvSpPr>
+        <p:spPr>
+          <a:xfrm>
+            <a:off x="457200" y="908720"/>
+            <a:ext cx="8229600" cy="5217443"/>
+          </a:xfrm>
+        </p:spPr>
+        <p:txBody>
+          <a:bodyPr>
+            <a:normAutofit/>
+          </a:bodyPr>
+          <a:lstStyle/>
+          <a:p>
+            <a:r>
+              <a:rPr lang="es-ES" sz="2800" dirty="0" smtClean="0"/>
+              <a:t>Síntesis resultados:</a:t>
+            </a:r>
+          </a:p>
+          <a:p>
+            <a:pPr marL="0" indent="0">
+              <a:buNone/>
+            </a:pPr>
+            <a:endParaRPr lang="es-ES" sz="2000" dirty="0" smtClean="0"/>
+          </a:p>
+        </p:txBody>
+      </p:sp>
+      <p:graphicFrame>
+        <p:nvGraphicFramePr>
+          <p:cNvPr id="4" name="Object 3"/>
+          <p:cNvGraphicFramePr>
+            <a:graphicFrameLocks noChangeAspect="1"/>
+          </p:cNvGraphicFramePr>
+          <p:nvPr>
+            <p:extLst>
+              <p:ext uri="{D42A27DB-BD31-4B8C-83A1-F6EECF244321}">
+                <p14:modId xmlns:p14="http://schemas.microsoft.com/office/powerpoint/2010/main" val="4148631786"/>
+              </p:ext>
+            </p:extLst>
+          </p:nvPr>
+        </p:nvGraphicFramePr>
+        <p:xfrm>
+          <a:off x="4860032" y="1609304"/>
+          <a:ext cx="2960329" cy="720080"/>
+        </p:xfrm>
+        <a:graphic>
+          <a:graphicData uri="http://schemas.openxmlformats.org/presentationml/2006/ole">
+            <mc:AlternateContent xmlns:mc="http://schemas.openxmlformats.org/markup-compatibility/2006">
+              <mc:Choice xmlns:v="urn:schemas-microsoft-com:vml" Requires="v">
+                <p:oleObj spid="_x0000_s2076" name="Equation" r:id="rId3" imgW="1409400" imgH="342720" progId="Equation.3">
+                  <p:embed/>
+                </p:oleObj>
+              </mc:Choice>
+              <mc:Fallback>
+                <p:oleObj name="Equation" r:id="rId3" imgW="1409400" imgH="342720" progId="Equation.3">
+                  <p:embed/>
+                  <p:pic>
+                    <p:nvPicPr>
+                      <p:cNvPr id="0" name=""/>
+                      <p:cNvPicPr/>
+                      <p:nvPr/>
+                    </p:nvPicPr>
+                    <p:blipFill>
+                      <a:blip r:embed="rId4"/>
+                      <a:stretch>
+                        <a:fillRect/>
+                      </a:stretch>
+                    </p:blipFill>
+                    <p:spPr>
+                      <a:xfrm>
+                        <a:off x="4860032" y="1609304"/>
+                        <a:ext cx="2960329" cy="720080"/>
+                      </a:xfrm>
+                      <a:prstGeom prst="rect">
+                        <a:avLst/>
+                      </a:prstGeom>
+                    </p:spPr>
+                  </p:pic>
+                </p:oleObj>
+              </mc:Fallback>
+            </mc:AlternateContent>
+          </a:graphicData>
+        </a:graphic>
+      </p:graphicFrame>
+      <p:graphicFrame>
+        <p:nvGraphicFramePr>
+          <p:cNvPr id="7" name="Object 6"/>
+          <p:cNvGraphicFramePr>
+            <a:graphicFrameLocks noChangeAspect="1"/>
+          </p:cNvGraphicFramePr>
+          <p:nvPr>
+            <p:extLst>
+              <p:ext uri="{D42A27DB-BD31-4B8C-83A1-F6EECF244321}">
+                <p14:modId xmlns:p14="http://schemas.microsoft.com/office/powerpoint/2010/main" val="1515382667"/>
+              </p:ext>
+            </p:extLst>
+          </p:nvPr>
+        </p:nvGraphicFramePr>
+        <p:xfrm>
+          <a:off x="4832350" y="2636838"/>
+          <a:ext cx="3014663" cy="719137"/>
+        </p:xfrm>
+        <a:graphic>
+          <a:graphicData uri="http://schemas.openxmlformats.org/presentationml/2006/ole">
+            <mc:AlternateContent xmlns:mc="http://schemas.openxmlformats.org/markup-compatibility/2006">
+              <mc:Choice xmlns:v="urn:schemas-microsoft-com:vml" Requires="v">
+                <p:oleObj spid="_x0000_s2077" name="Equation" r:id="rId5" imgW="1434960" imgH="342720" progId="Equation.3">
+                  <p:embed/>
+                </p:oleObj>
+              </mc:Choice>
+              <mc:Fallback>
+                <p:oleObj name="Equation" r:id="rId5" imgW="1434960" imgH="342720" progId="Equation.3">
+                  <p:embed/>
+                  <p:pic>
+                    <p:nvPicPr>
+                      <p:cNvPr id="0" name="Object 3"/>
+                      <p:cNvPicPr>
+                        <a:picLocks noChangeAspect="1" noChangeArrowheads="1"/>
+                      </p:cNvPicPr>
+                      <p:nvPr/>
+                    </p:nvPicPr>
+                    <p:blipFill>
+                      <a:blip r:embed="rId6"/>
+                      <a:srcRect/>
+                      <a:stretch>
+                        <a:fillRect/>
+                      </a:stretch>
+                    </p:blipFill>
+                    <p:spPr bwMode="auto">
+                      <a:xfrm>
+                        <a:off x="4832350" y="2636838"/>
+                        <a:ext cx="3014663" cy="719137"/>
+                      </a:xfrm>
+                      <a:prstGeom prst="rect">
+                        <a:avLst/>
+                      </a:prstGeom>
+                      <a:noFill/>
+                      <a:ln>
+                        <a:noFill/>
+                      </a:ln>
+                      <a:extLst>
+                        <a:ext uri="{909E8E84-426E-40DD-AFC4-6F175D3DCCD1}">
+                          <a14:hiddenFill xmlns:a14="http://schemas.microsoft.com/office/drawing/2010/main">
+                            <a:solidFill>
+                              <a:srgbClr val="FFFFFF"/>
+                            </a:solidFill>
+                          </a14:hiddenFill>
+                        </a:ext>
+                        <a:ext uri="{91240B29-F687-4F45-9708-019B960494DF}">
+                          <a14:hiddenLine xmlns:a14="http://schemas.microsoft.com/office/drawing/2010/main" w="9525">
+                            <a:solidFill>
+                              <a:srgbClr val="000000"/>
+                            </a:solidFill>
+                            <a:miter lim="800000"/>
+                            <a:headEnd/>
+                            <a:tailEnd/>
+                          </a14:hiddenLine>
+                        </a:ext>
+                      </a:extLst>
+                    </p:spPr>
+                  </p:pic>
+                </p:oleObj>
+              </mc:Fallback>
+            </mc:AlternateContent>
+          </a:graphicData>
+        </a:graphic>
+      </p:graphicFrame>
+      <p:graphicFrame>
+        <p:nvGraphicFramePr>
+          <p:cNvPr id="9" name="Object 8"/>
+          <p:cNvGraphicFramePr>
+            <a:graphicFrameLocks noChangeAspect="1"/>
+          </p:cNvGraphicFramePr>
+          <p:nvPr>
+            <p:extLst>
+              <p:ext uri="{D42A27DB-BD31-4B8C-83A1-F6EECF244321}">
+                <p14:modId xmlns:p14="http://schemas.microsoft.com/office/powerpoint/2010/main" val="482211451"/>
+              </p:ext>
+            </p:extLst>
+          </p:nvPr>
+        </p:nvGraphicFramePr>
+        <p:xfrm>
+          <a:off x="5126038" y="3751263"/>
+          <a:ext cx="2481262" cy="504825"/>
+        </p:xfrm>
+        <a:graphic>
+          <a:graphicData uri="http://schemas.openxmlformats.org/presentationml/2006/ole">
+            <mc:AlternateContent xmlns:mc="http://schemas.openxmlformats.org/markup-compatibility/2006">
+              <mc:Choice xmlns:v="urn:schemas-microsoft-com:vml" Requires="v">
+                <p:oleObj spid="_x0000_s2078" name="Equation" r:id="rId7" imgW="1180800" imgH="241200" progId="Equation.3">
+                  <p:embed/>
+                </p:oleObj>
+              </mc:Choice>
+              <mc:Fallback>
+                <p:oleObj name="Equation" r:id="rId7" imgW="1180800" imgH="241200" progId="Equation.3">
+                  <p:embed/>
+                  <p:pic>
+                    <p:nvPicPr>
+                      <p:cNvPr id="0" name="Object 6"/>
+                      <p:cNvPicPr>
+                        <a:picLocks noChangeAspect="1" noChangeArrowheads="1"/>
+                      </p:cNvPicPr>
+                      <p:nvPr/>
+                    </p:nvPicPr>
+                    <p:blipFill>
+                      <a:blip r:embed="rId8"/>
+                      <a:srcRect/>
+                      <a:stretch>
+                        <a:fillRect/>
+                      </a:stretch>
+                    </p:blipFill>
+                    <p:spPr bwMode="auto">
+                      <a:xfrm>
+                        <a:off x="5126038" y="3751263"/>
+                        <a:ext cx="2481262" cy="504825"/>
+                      </a:xfrm>
+                      <a:prstGeom prst="rect">
+                        <a:avLst/>
+                      </a:prstGeom>
+                      <a:noFill/>
+                      <a:ln>
+                        <a:noFill/>
+                      </a:ln>
+                      <a:extLst>
+                        <a:ext uri="{909E8E84-426E-40DD-AFC4-6F175D3DCCD1}">
+                          <a14:hiddenFill xmlns:a14="http://schemas.microsoft.com/office/drawing/2010/main">
+                            <a:solidFill>
+                              <a:srgbClr val="FFFFFF"/>
+                            </a:solidFill>
+                          </a14:hiddenFill>
+                        </a:ext>
+                        <a:ext uri="{91240B29-F687-4F45-9708-019B960494DF}">
+                          <a14:hiddenLine xmlns:a14="http://schemas.microsoft.com/office/drawing/2010/main" w="9525">
+                            <a:solidFill>
+                              <a:srgbClr val="000000"/>
+                            </a:solidFill>
+                            <a:miter lim="800000"/>
+                            <a:headEnd/>
+                            <a:tailEnd/>
+                          </a14:hiddenLine>
+                        </a:ext>
+                      </a:extLst>
+                    </p:spPr>
+                  </p:pic>
+                </p:oleObj>
+              </mc:Fallback>
+            </mc:AlternateContent>
+          </a:graphicData>
+        </a:graphic>
+      </p:graphicFrame>
+      <p:pic>
+        <p:nvPicPr>
+          <p:cNvPr id="11" name="Picture 10"/>
+          <p:cNvPicPr>
+            <a:picLocks noChangeAspect="1"/>
+          </p:cNvPicPr>
+          <p:nvPr/>
+        </p:nvPicPr>
+        <p:blipFill>
+          <a:blip r:embed="rId9">
+            <a:extLst>
+              <a:ext uri="{28A0092B-C50C-407E-A947-70E740481C1C}">
+                <a14:useLocalDpi xmlns:a14="http://schemas.microsoft.com/office/drawing/2010/main" val="0"/>
+              </a:ext>
+            </a:extLst>
+          </a:blip>
+          <a:stretch>
+            <a:fillRect/>
+          </a:stretch>
+        </p:blipFill>
+        <p:spPr>
+          <a:xfrm>
+            <a:off x="899592" y="1628800"/>
+            <a:ext cx="3781953" cy="2934109"/>
+          </a:xfrm>
+          <a:prstGeom prst="rect">
+            <a:avLst/>
+          </a:prstGeom>
+        </p:spPr>
+      </p:pic>
+    </p:spTree>
+    <p:extLst>
+      <p:ext uri="{BB962C8B-B14F-4D97-AF65-F5344CB8AC3E}">
+        <p14:creationId xmlns:p14="http://schemas.microsoft.com/office/powerpoint/2010/main" val="4165633388"/>
+      </p:ext>
+    </p:extLst>
+  </p:cSld>
+  <p:clrMapOvr>
+    <a:masterClrMapping/>
+  </p:clrMapOvr>
+</p:sld>
+</file>
+
+<file path=ppt/slides/slide23.xml><?xml version="1.0" encoding="utf-8"?>
+<p:sld xmlns:a="http://schemas.openxmlformats.org/drawingml/2006/main" xmlns:r="http://schemas.openxmlformats.org/officeDocument/2006/relationships" xmlns:p="http://schemas.openxmlformats.org/presentationml/2006/main">
+  <p:cSld>
+    <p:spTree>
+      <p:nvGrpSpPr>
+        <p:cNvPr id="1" name=""/>
+        <p:cNvGrpSpPr/>
+        <p:nvPr/>
+      </p:nvGrpSpPr>
+      <p:grpSpPr>
+        <a:xfrm>
+          <a:off x="0" y="0"/>
+          <a:ext cx="0" cy="0"/>
+          <a:chOff x="0" y="0"/>
+          <a:chExt cx="0" cy="0"/>
+        </a:xfrm>
+      </p:grpSpPr>
+      <p:sp>
+        <p:nvSpPr>
+          <p:cNvPr id="2" name="Title 1"/>
+          <p:cNvSpPr>
+            <a:spLocks noGrp="1"/>
+          </p:cNvSpPr>
+          <p:nvPr>
+            <p:ph type="title"/>
+          </p:nvPr>
+        </p:nvSpPr>
+        <p:spPr>
+          <a:xfrm>
+            <a:off x="457200" y="274638"/>
+            <a:ext cx="8229600" cy="418058"/>
+          </a:xfrm>
+        </p:spPr>
+        <p:txBody>
+          <a:bodyPr>
+            <a:normAutofit fontScale="90000"/>
+          </a:bodyPr>
+          <a:lstStyle/>
+          <a:p>
+            <a:pPr algn="r"/>
+            <a:r>
+              <a:rPr lang="en-US" sz="2400" dirty="0" err="1" smtClean="0"/>
+              <a:t>Conclusiones</a:t>
+            </a:r>
+            <a:endParaRPr lang="en-US" sz="2400" dirty="0" smtClean="0"/>
+          </a:p>
+        </p:txBody>
+      </p:sp>
+      <p:sp>
+        <p:nvSpPr>
+          <p:cNvPr id="3" name="Content Placeholder 2"/>
+          <p:cNvSpPr>
+            <a:spLocks noGrp="1"/>
+          </p:cNvSpPr>
+          <p:nvPr>
+            <p:ph idx="1"/>
+          </p:nvPr>
+        </p:nvSpPr>
+        <p:spPr>
+          <a:xfrm>
+            <a:off x="457200" y="908720"/>
+            <a:ext cx="8229600" cy="5217443"/>
+          </a:xfrm>
+        </p:spPr>
+        <p:txBody>
+          <a:bodyPr>
+            <a:normAutofit/>
+          </a:bodyPr>
+          <a:lstStyle/>
+          <a:p>
+            <a:r>
+              <a:rPr lang="en-US" sz="2800" dirty="0" smtClean="0"/>
+              <a:t>Un </a:t>
+            </a:r>
+            <a:r>
+              <a:rPr lang="es-AR" sz="2800" dirty="0" smtClean="0"/>
+              <a:t>70</a:t>
+            </a:r>
+            <a:r>
+              <a:rPr lang="es-AR" sz="2800" dirty="0"/>
+              <a:t>% de los resultados llegaron a la mejor solución conocida de la instancia </a:t>
+            </a:r>
+            <a:r>
+              <a:rPr lang="es-AR" sz="2800" dirty="0" smtClean="0"/>
+              <a:t>testeada.</a:t>
+            </a:r>
+          </a:p>
+          <a:p>
+            <a:r>
+              <a:rPr lang="en-US" sz="2800" dirty="0" smtClean="0"/>
+              <a:t>El restante 30% </a:t>
+            </a:r>
+            <a:r>
+              <a:rPr lang="en-US" sz="2800" dirty="0" err="1" smtClean="0"/>
+              <a:t>obtuvo</a:t>
+            </a:r>
+            <a:r>
+              <a:rPr lang="en-US" sz="2800" dirty="0" smtClean="0"/>
+              <a:t> </a:t>
+            </a:r>
+            <a:r>
+              <a:rPr lang="en-US" sz="2800" dirty="0" err="1" smtClean="0"/>
+              <a:t>valores</a:t>
+            </a:r>
+            <a:r>
+              <a:rPr lang="en-US" sz="2800" dirty="0" smtClean="0"/>
+              <a:t> </a:t>
+            </a:r>
+            <a:r>
+              <a:rPr lang="en-US" sz="2800" dirty="0" err="1" smtClean="0"/>
+              <a:t>competitivos</a:t>
+            </a:r>
+            <a:r>
+              <a:rPr lang="en-US" sz="2800" dirty="0" smtClean="0"/>
+              <a:t> </a:t>
+            </a:r>
+            <a:r>
+              <a:rPr lang="en-US" sz="2800" dirty="0" smtClean="0"/>
+              <a:t>con los </a:t>
+            </a:r>
+            <a:r>
+              <a:rPr lang="en-US" sz="2800" dirty="0" err="1" smtClean="0"/>
+              <a:t>mejores</a:t>
+            </a:r>
+            <a:r>
+              <a:rPr lang="en-US" sz="2800" dirty="0" smtClean="0"/>
+              <a:t> </a:t>
+            </a:r>
+            <a:r>
+              <a:rPr lang="en-US" sz="2800" dirty="0" err="1" smtClean="0"/>
+              <a:t>trabajos</a:t>
+            </a:r>
+            <a:r>
+              <a:rPr lang="en-US" sz="2800" dirty="0" smtClean="0"/>
+              <a:t> </a:t>
+            </a:r>
+            <a:r>
+              <a:rPr lang="en-US" sz="2800" dirty="0" err="1" smtClean="0"/>
+              <a:t>previos</a:t>
+            </a:r>
+            <a:r>
+              <a:rPr lang="en-US" sz="2800" dirty="0" smtClean="0"/>
+              <a:t>.</a:t>
+            </a:r>
+          </a:p>
+          <a:p>
+            <a:r>
+              <a:rPr lang="en-US" sz="2800" dirty="0" smtClean="0"/>
+              <a:t>El BRKGA </a:t>
+            </a:r>
+            <a:r>
+              <a:rPr lang="en-US" sz="2800" dirty="0" err="1" smtClean="0"/>
+              <a:t>puro</a:t>
+            </a:r>
+            <a:r>
+              <a:rPr lang="en-US" sz="2800" dirty="0" smtClean="0"/>
+              <a:t> no </a:t>
+            </a:r>
+            <a:r>
+              <a:rPr lang="en-US" sz="2800" dirty="0" err="1" smtClean="0"/>
+              <a:t>es</a:t>
+            </a:r>
+            <a:r>
+              <a:rPr lang="en-US" sz="2800" dirty="0" smtClean="0"/>
+              <a:t> </a:t>
+            </a:r>
+            <a:r>
+              <a:rPr lang="en-US" sz="2800" dirty="0" err="1" smtClean="0"/>
+              <a:t>bueno</a:t>
+            </a:r>
+            <a:r>
+              <a:rPr lang="en-US" sz="2800" dirty="0" smtClean="0"/>
+              <a:t> </a:t>
+            </a:r>
+            <a:r>
+              <a:rPr lang="en-US" sz="2800" dirty="0" err="1" smtClean="0"/>
+              <a:t>para</a:t>
+            </a:r>
+            <a:r>
+              <a:rPr lang="en-US" sz="2800" dirty="0" smtClean="0"/>
+              <a:t> </a:t>
+            </a:r>
+            <a:r>
+              <a:rPr lang="en-US" sz="2800" dirty="0" err="1" smtClean="0"/>
+              <a:t>instancias</a:t>
+            </a:r>
+            <a:r>
+              <a:rPr lang="en-US" sz="2800" dirty="0" smtClean="0"/>
+              <a:t> </a:t>
+            </a:r>
+            <a:r>
+              <a:rPr lang="en-US" sz="2800" dirty="0" err="1" smtClean="0"/>
+              <a:t>grandes</a:t>
+            </a:r>
+            <a:r>
+              <a:rPr lang="en-US" sz="2800" dirty="0" smtClean="0"/>
+              <a:t> del </a:t>
+            </a:r>
+            <a:r>
+              <a:rPr lang="en-US" sz="2800" dirty="0" err="1" smtClean="0"/>
+              <a:t>problema</a:t>
+            </a:r>
+            <a:r>
+              <a:rPr lang="en-US" sz="2800" dirty="0" smtClean="0"/>
+              <a:t>.</a:t>
+            </a:r>
+            <a:endParaRPr lang="es-ES" sz="2800" dirty="0" smtClean="0"/>
+          </a:p>
+        </p:txBody>
+      </p:sp>
+    </p:spTree>
+    <p:extLst>
+      <p:ext uri="{BB962C8B-B14F-4D97-AF65-F5344CB8AC3E}">
+        <p14:creationId xmlns:p14="http://schemas.microsoft.com/office/powerpoint/2010/main" val="962634165"/>
+      </p:ext>
+    </p:extLst>
+  </p:cSld>
+  <p:clrMapOvr>
+    <a:masterClrMapping/>
+  </p:clrMapOvr>
+</p:sld>
+</file>
+
+<file path=ppt/slides/slide24.xml><?xml version="1.0" encoding="utf-8"?>
+<p:sld xmlns:a="http://schemas.openxmlformats.org/drawingml/2006/main" xmlns:r="http://schemas.openxmlformats.org/officeDocument/2006/relationships" xmlns:p="http://schemas.openxmlformats.org/presentationml/2006/main">
+  <p:cSld>
+    <p:spTree>
+      <p:nvGrpSpPr>
+        <p:cNvPr id="1" name=""/>
+        <p:cNvGrpSpPr/>
+        <p:nvPr/>
+      </p:nvGrpSpPr>
+      <p:grpSpPr>
+        <a:xfrm>
+          <a:off x="0" y="0"/>
+          <a:ext cx="0" cy="0"/>
+          <a:chOff x="0" y="0"/>
+          <a:chExt cx="0" cy="0"/>
+        </a:xfrm>
+      </p:grpSpPr>
+      <p:sp>
+        <p:nvSpPr>
+          <p:cNvPr id="2" name="Title 1"/>
+          <p:cNvSpPr>
+            <a:spLocks noGrp="1"/>
+          </p:cNvSpPr>
+          <p:nvPr>
+            <p:ph type="title"/>
+          </p:nvPr>
+        </p:nvSpPr>
+        <p:spPr>
+          <a:xfrm>
+            <a:off x="457200" y="274638"/>
+            <a:ext cx="8229600" cy="418058"/>
+          </a:xfrm>
+        </p:spPr>
+        <p:txBody>
+          <a:bodyPr>
+            <a:normAutofit fontScale="90000"/>
+          </a:bodyPr>
+          <a:lstStyle/>
+          <a:p>
+            <a:pPr algn="r"/>
+            <a:r>
+              <a:rPr lang="en-US" sz="2400" dirty="0" err="1" smtClean="0"/>
+              <a:t>Conclusiones</a:t>
+            </a:r>
+            <a:endParaRPr lang="en-US" sz="2400" dirty="0" smtClean="0"/>
+          </a:p>
+        </p:txBody>
+      </p:sp>
+      <p:sp>
+        <p:nvSpPr>
+          <p:cNvPr id="3" name="Content Placeholder 2"/>
+          <p:cNvSpPr>
+            <a:spLocks noGrp="1"/>
+          </p:cNvSpPr>
+          <p:nvPr>
+            <p:ph idx="1"/>
+          </p:nvPr>
+        </p:nvSpPr>
+        <p:spPr>
+          <a:xfrm>
+            <a:off x="457200" y="908720"/>
+            <a:ext cx="8229600" cy="5217443"/>
+          </a:xfrm>
+        </p:spPr>
+        <p:txBody>
+          <a:bodyPr>
+            <a:normAutofit/>
+          </a:bodyPr>
+          <a:lstStyle/>
+          <a:p>
+            <a:r>
+              <a:rPr lang="en-US" sz="2800" dirty="0" err="1" smtClean="0"/>
+              <a:t>Aportes</a:t>
+            </a:r>
+            <a:r>
+              <a:rPr lang="en-US" sz="2800" dirty="0" smtClean="0"/>
+              <a:t> a </a:t>
+            </a:r>
+            <a:r>
+              <a:rPr lang="en-US" sz="2800" dirty="0" err="1" smtClean="0"/>
+              <a:t>futuros</a:t>
+            </a:r>
+            <a:r>
+              <a:rPr lang="en-US" sz="2800" dirty="0" smtClean="0"/>
+              <a:t> </a:t>
+            </a:r>
+            <a:r>
+              <a:rPr lang="en-US" sz="2800" dirty="0" err="1" smtClean="0"/>
+              <a:t>trabajos</a:t>
+            </a:r>
+            <a:r>
+              <a:rPr lang="en-US" sz="2800" dirty="0" smtClean="0"/>
+              <a:t> con </a:t>
+            </a:r>
+            <a:r>
+              <a:rPr lang="en-US" sz="2800" dirty="0" err="1" smtClean="0"/>
+              <a:t>brkga</a:t>
+            </a:r>
+            <a:r>
+              <a:rPr lang="en-US" sz="2800" dirty="0" smtClean="0"/>
+              <a:t>:</a:t>
+            </a:r>
+          </a:p>
+          <a:p>
+            <a:pPr lvl="1"/>
+            <a:r>
+              <a:rPr lang="en-US" sz="2400" dirty="0" smtClean="0"/>
+              <a:t>Se </a:t>
+            </a:r>
+            <a:r>
+              <a:rPr lang="en-US" sz="2400" dirty="0" err="1" smtClean="0"/>
+              <a:t>implementaron</a:t>
+            </a:r>
+            <a:r>
+              <a:rPr lang="en-US" sz="2400" dirty="0" smtClean="0"/>
+              <a:t> </a:t>
+            </a:r>
+            <a:r>
+              <a:rPr lang="en-US" sz="2400" dirty="0" err="1" smtClean="0"/>
+              <a:t>variantes</a:t>
+            </a:r>
+            <a:r>
+              <a:rPr lang="en-US" sz="2400" dirty="0" smtClean="0"/>
+              <a:t> de </a:t>
+            </a:r>
+            <a:r>
+              <a:rPr lang="en-US" sz="2400" dirty="0" err="1" smtClean="0"/>
+              <a:t>decodificadores</a:t>
+            </a:r>
+            <a:endParaRPr lang="en-US" sz="2400" dirty="0" smtClean="0"/>
+          </a:p>
+          <a:p>
+            <a:pPr lvl="1"/>
+            <a:r>
+              <a:rPr lang="en-US" sz="2400" dirty="0" smtClean="0"/>
+              <a:t>Se </a:t>
+            </a:r>
+            <a:r>
+              <a:rPr lang="en-US" sz="2400" dirty="0" err="1" smtClean="0"/>
+              <a:t>implementaron</a:t>
+            </a:r>
+            <a:r>
+              <a:rPr lang="en-US" sz="2400" dirty="0" smtClean="0"/>
+              <a:t> dos </a:t>
+            </a:r>
+            <a:r>
+              <a:rPr lang="en-US" sz="2400" dirty="0" err="1" smtClean="0"/>
+              <a:t>formas</a:t>
+            </a:r>
+            <a:r>
+              <a:rPr lang="en-US" sz="2400" dirty="0" smtClean="0"/>
+              <a:t> de </a:t>
+            </a:r>
+            <a:r>
+              <a:rPr lang="en-US" sz="2400" dirty="0" err="1" smtClean="0"/>
+              <a:t>calcular</a:t>
+            </a:r>
+            <a:r>
+              <a:rPr lang="en-US" sz="2400" dirty="0" smtClean="0"/>
+              <a:t> el hash </a:t>
+            </a:r>
+            <a:r>
+              <a:rPr lang="en-US" sz="2400" dirty="0" err="1" smtClean="0"/>
+              <a:t>para</a:t>
+            </a:r>
+            <a:r>
+              <a:rPr lang="en-US" sz="2400" dirty="0" smtClean="0"/>
+              <a:t> resolver el </a:t>
+            </a:r>
+            <a:r>
+              <a:rPr lang="en-US" sz="2400" dirty="0" err="1" smtClean="0"/>
+              <a:t>problema</a:t>
+            </a:r>
+            <a:r>
+              <a:rPr lang="en-US" sz="2400" dirty="0" smtClean="0"/>
+              <a:t> de </a:t>
+            </a:r>
+            <a:r>
+              <a:rPr lang="en-US" sz="2400" dirty="0" err="1" smtClean="0"/>
+              <a:t>individuos</a:t>
+            </a:r>
+            <a:r>
+              <a:rPr lang="en-US" sz="2400" dirty="0" smtClean="0"/>
+              <a:t> </a:t>
+            </a:r>
+            <a:r>
+              <a:rPr lang="en-US" sz="2400" dirty="0" err="1" smtClean="0"/>
+              <a:t>repetidos</a:t>
+            </a:r>
+            <a:endParaRPr lang="en-US" sz="2400" dirty="0" smtClean="0"/>
+          </a:p>
+          <a:p>
+            <a:pPr lvl="1"/>
+            <a:r>
+              <a:rPr lang="en-US" sz="2400" dirty="0" smtClean="0"/>
+              <a:t>Se </a:t>
+            </a:r>
+            <a:r>
+              <a:rPr lang="en-US" sz="2400" dirty="0" err="1" smtClean="0"/>
+              <a:t>implementaron</a:t>
+            </a:r>
+            <a:r>
+              <a:rPr lang="en-US" sz="2400" dirty="0" smtClean="0"/>
+              <a:t> </a:t>
+            </a:r>
+            <a:r>
+              <a:rPr lang="en-US" sz="2400" dirty="0" err="1" smtClean="0"/>
+              <a:t>diversas</a:t>
+            </a:r>
+            <a:r>
+              <a:rPr lang="en-US" sz="2400" dirty="0" smtClean="0"/>
+              <a:t> </a:t>
+            </a:r>
+            <a:r>
+              <a:rPr lang="en-US" sz="2400" dirty="0" err="1" smtClean="0"/>
+              <a:t>búsquedas</a:t>
+            </a:r>
+            <a:r>
+              <a:rPr lang="en-US" sz="2400" dirty="0" smtClean="0"/>
+              <a:t> locales y un </a:t>
+            </a:r>
+            <a:r>
+              <a:rPr lang="en-US" sz="2400" dirty="0" err="1" smtClean="0"/>
+              <a:t>codificador</a:t>
+            </a:r>
+            <a:r>
+              <a:rPr lang="en-US" sz="2400" dirty="0" smtClean="0"/>
+              <a:t> de </a:t>
+            </a:r>
+            <a:r>
+              <a:rPr lang="en-US" sz="2400" dirty="0" err="1" smtClean="0"/>
+              <a:t>soluciones</a:t>
+            </a:r>
+            <a:r>
+              <a:rPr lang="en-US" sz="2400" dirty="0" smtClean="0"/>
+              <a:t> </a:t>
+            </a:r>
+            <a:r>
+              <a:rPr lang="en-US" sz="2400" dirty="0" err="1" smtClean="0"/>
+              <a:t>para</a:t>
+            </a:r>
+            <a:r>
+              <a:rPr lang="en-US" sz="2400" dirty="0" smtClean="0"/>
+              <a:t> </a:t>
+            </a:r>
+            <a:r>
+              <a:rPr lang="en-US" sz="2400" dirty="0" err="1" smtClean="0"/>
+              <a:t>mantener</a:t>
+            </a:r>
+            <a:r>
+              <a:rPr lang="en-US" sz="2400" dirty="0"/>
+              <a:t> </a:t>
+            </a:r>
+            <a:r>
+              <a:rPr lang="en-US" sz="2400" dirty="0" smtClean="0"/>
+              <a:t>la </a:t>
+            </a:r>
+            <a:r>
+              <a:rPr lang="en-US" sz="2400" dirty="0" err="1" smtClean="0"/>
+              <a:t>consistencia</a:t>
+            </a:r>
+            <a:r>
+              <a:rPr lang="en-US" sz="2400" dirty="0" smtClean="0"/>
+              <a:t> entre los </a:t>
+            </a:r>
+            <a:r>
+              <a:rPr lang="en-US" sz="2400" dirty="0" err="1" smtClean="0"/>
+              <a:t>individuos</a:t>
+            </a:r>
+            <a:r>
+              <a:rPr lang="en-US" sz="2400" dirty="0" smtClean="0"/>
+              <a:t> y </a:t>
+            </a:r>
+            <a:r>
+              <a:rPr lang="en-US" sz="2400" dirty="0" err="1" smtClean="0"/>
+              <a:t>sus</a:t>
+            </a:r>
+            <a:r>
+              <a:rPr lang="en-US" sz="2400" dirty="0" smtClean="0"/>
+              <a:t> genes</a:t>
+            </a:r>
+          </a:p>
+          <a:p>
+            <a:pPr lvl="1"/>
+            <a:r>
+              <a:rPr lang="en-US" sz="2400" dirty="0" err="1" smtClean="0"/>
+              <a:t>Todos</a:t>
+            </a:r>
+            <a:r>
+              <a:rPr lang="en-US" sz="2400" dirty="0" smtClean="0"/>
+              <a:t> los </a:t>
+            </a:r>
+            <a:r>
+              <a:rPr lang="en-US" sz="2400" dirty="0" err="1" smtClean="0"/>
+              <a:t>algoritmos</a:t>
+            </a:r>
+            <a:r>
+              <a:rPr lang="en-US" sz="2400" dirty="0" smtClean="0"/>
+              <a:t> </a:t>
+            </a:r>
+            <a:r>
+              <a:rPr lang="en-US" sz="2400" dirty="0" err="1" smtClean="0"/>
+              <a:t>fueron</a:t>
+            </a:r>
+            <a:r>
+              <a:rPr lang="en-US" sz="2400" dirty="0" smtClean="0"/>
+              <a:t> </a:t>
+            </a:r>
+            <a:r>
+              <a:rPr lang="en-US" sz="2400" dirty="0" err="1" smtClean="0"/>
+              <a:t>implementados</a:t>
+            </a:r>
+            <a:r>
+              <a:rPr lang="en-US" sz="2400" dirty="0" smtClean="0"/>
+              <a:t> </a:t>
+            </a:r>
+            <a:r>
+              <a:rPr lang="en-US" sz="2400" dirty="0" err="1" smtClean="0"/>
+              <a:t>teniendo</a:t>
+            </a:r>
+            <a:r>
+              <a:rPr lang="en-US" sz="2400" dirty="0" smtClean="0"/>
+              <a:t> en </a:t>
+            </a:r>
+            <a:r>
+              <a:rPr lang="en-US" sz="2400" dirty="0" err="1" smtClean="0"/>
+              <a:t>cuenta</a:t>
+            </a:r>
+            <a:r>
+              <a:rPr lang="en-US" sz="2400" dirty="0" smtClean="0"/>
+              <a:t> los </a:t>
+            </a:r>
+            <a:r>
+              <a:rPr lang="en-US" sz="2400" dirty="0" err="1" smtClean="0"/>
+              <a:t>ordenes</a:t>
+            </a:r>
+            <a:r>
+              <a:rPr lang="en-US" sz="2400" dirty="0" smtClean="0"/>
+              <a:t> de </a:t>
+            </a:r>
+            <a:r>
+              <a:rPr lang="en-US" sz="2400" dirty="0" err="1" smtClean="0"/>
+              <a:t>complejidad</a:t>
+            </a:r>
+            <a:endParaRPr lang="en-US" sz="2400" dirty="0" smtClean="0"/>
+          </a:p>
+          <a:p>
+            <a:pPr lvl="1"/>
+            <a:r>
+              <a:rPr lang="en-US" sz="2400" dirty="0" smtClean="0"/>
+              <a:t>Se </a:t>
+            </a:r>
+            <a:r>
+              <a:rPr lang="en-US" sz="2400" dirty="0" err="1" smtClean="0"/>
+              <a:t>realizaron</a:t>
+            </a:r>
+            <a:r>
+              <a:rPr lang="en-US" sz="2400" dirty="0" smtClean="0"/>
+              <a:t> multiples </a:t>
+            </a:r>
+            <a:r>
+              <a:rPr lang="en-US" sz="2400" dirty="0" err="1" smtClean="0"/>
+              <a:t>pruebas</a:t>
+            </a:r>
+            <a:r>
+              <a:rPr lang="en-US" sz="2400" dirty="0" smtClean="0"/>
+              <a:t> de </a:t>
+            </a:r>
+            <a:r>
+              <a:rPr lang="en-US" sz="2400" dirty="0" err="1" smtClean="0"/>
+              <a:t>eficiencia</a:t>
+            </a:r>
+            <a:r>
+              <a:rPr lang="en-US" sz="2400" dirty="0" smtClean="0"/>
+              <a:t> </a:t>
+            </a:r>
+            <a:r>
+              <a:rPr lang="en-US" sz="2400" dirty="0" err="1" smtClean="0"/>
+              <a:t>variando</a:t>
+            </a:r>
+            <a:r>
+              <a:rPr lang="en-US" sz="2400" dirty="0" smtClean="0"/>
+              <a:t> </a:t>
+            </a:r>
+            <a:r>
+              <a:rPr lang="en-US" sz="2400" dirty="0" err="1" smtClean="0"/>
+              <a:t>las</a:t>
+            </a:r>
+            <a:r>
+              <a:rPr lang="en-US" sz="2400" dirty="0" smtClean="0"/>
+              <a:t> </a:t>
+            </a:r>
+            <a:r>
+              <a:rPr lang="en-US" sz="2400" dirty="0" err="1" smtClean="0"/>
+              <a:t>configuraciones</a:t>
+            </a:r>
+            <a:r>
+              <a:rPr lang="en-US" sz="2400" dirty="0" smtClean="0"/>
+              <a:t> </a:t>
+            </a:r>
+            <a:r>
+              <a:rPr lang="en-US" sz="2400" dirty="0" err="1" smtClean="0"/>
+              <a:t>generales</a:t>
+            </a:r>
+            <a:endParaRPr lang="es-ES" sz="2400" dirty="0" smtClean="0"/>
+          </a:p>
+        </p:txBody>
+      </p:sp>
+    </p:spTree>
+    <p:extLst>
+      <p:ext uri="{BB962C8B-B14F-4D97-AF65-F5344CB8AC3E}">
+        <p14:creationId xmlns:p14="http://schemas.microsoft.com/office/powerpoint/2010/main" val="2430268116"/>
+      </p:ext>
+    </p:extLst>
+  </p:cSld>
+  <p:clrMapOvr>
+    <a:masterClrMapping/>
+  </p:clrMapOvr>
+</p:sld>
+</file>
+
+<file path=ppt/slides/slide25.xml><?xml version="1.0" encoding="utf-8"?>
+<p:sld xmlns:a="http://schemas.openxmlformats.org/drawingml/2006/main" xmlns:r="http://schemas.openxmlformats.org/officeDocument/2006/relationships" xmlns:p="http://schemas.openxmlformats.org/presentationml/2006/main">
+  <p:cSld>
+    <p:spTree>
+      <p:nvGrpSpPr>
+        <p:cNvPr id="1" name=""/>
+        <p:cNvGrpSpPr/>
+        <p:nvPr/>
+      </p:nvGrpSpPr>
+      <p:grpSpPr>
+        <a:xfrm>
+          <a:off x="0" y="0"/>
+          <a:ext cx="0" cy="0"/>
+          <a:chOff x="0" y="0"/>
+          <a:chExt cx="0" cy="0"/>
+        </a:xfrm>
+      </p:grpSpPr>
+      <p:sp>
+        <p:nvSpPr>
+          <p:cNvPr id="2" name="Title 1"/>
+          <p:cNvSpPr>
+            <a:spLocks noGrp="1"/>
+          </p:cNvSpPr>
+          <p:nvPr>
+            <p:ph type="title"/>
+          </p:nvPr>
+        </p:nvSpPr>
+        <p:spPr>
+          <a:xfrm>
+            <a:off x="457200" y="274638"/>
+            <a:ext cx="8229600" cy="418058"/>
+          </a:xfrm>
+        </p:spPr>
+        <p:txBody>
+          <a:bodyPr>
+            <a:normAutofit fontScale="90000"/>
+          </a:bodyPr>
+          <a:lstStyle/>
+          <a:p>
+            <a:pPr algn="r"/>
+            <a:r>
+              <a:rPr lang="en-US" sz="2400" dirty="0" err="1" smtClean="0"/>
+              <a:t>Trabajos</a:t>
+            </a:r>
+            <a:r>
+              <a:rPr lang="en-US" sz="2400" dirty="0" smtClean="0"/>
+              <a:t> </a:t>
+            </a:r>
+            <a:r>
+              <a:rPr lang="en-US" sz="2400" dirty="0" err="1" smtClean="0"/>
+              <a:t>futuros</a:t>
+            </a:r>
+            <a:endParaRPr lang="en-US" sz="2400" dirty="0" smtClean="0"/>
+          </a:p>
+        </p:txBody>
+      </p:sp>
+      <p:sp>
+        <p:nvSpPr>
+          <p:cNvPr id="3" name="Content Placeholder 2"/>
+          <p:cNvSpPr>
+            <a:spLocks noGrp="1"/>
+          </p:cNvSpPr>
+          <p:nvPr>
+            <p:ph idx="1"/>
+          </p:nvPr>
+        </p:nvSpPr>
+        <p:spPr>
+          <a:xfrm>
+            <a:off x="457200" y="908720"/>
+            <a:ext cx="8229600" cy="5217443"/>
+          </a:xfrm>
+        </p:spPr>
+        <p:txBody>
+          <a:bodyPr>
+            <a:normAutofit/>
+          </a:bodyPr>
+          <a:lstStyle/>
+          <a:p>
+            <a:r>
+              <a:rPr lang="es-ES" sz="2800" dirty="0" smtClean="0"/>
+              <a:t>Seria útil una herramienta para visualizar los caminos generados.</a:t>
             </a:r>
           </a:p>
           <a:p>
@@ -6497,8 +7674,45 @@
             </a:pPr>
             <a:r>
               <a:rPr lang="es-ES" sz="2000" dirty="0" smtClean="0"/>
-              <a:t>Que cada alelo represente un vehículo con su ruta en vez de un cliente</a:t>
-            </a:r>
+              <a:t>Que cada alelo represente un vehículo con su ruta en vez de un </a:t>
+            </a:r>
+            <a:r>
+              <a:rPr lang="es-ES" sz="2000" dirty="0" smtClean="0"/>
+              <a:t>cliente</a:t>
+            </a:r>
+          </a:p>
+          <a:p>
+            <a:r>
+              <a:rPr lang="es-ES" sz="2800" dirty="0" smtClean="0"/>
+              <a:t>Analizar si existe alguna variante del </a:t>
+            </a:r>
+            <a:r>
+              <a:rPr lang="es-ES" sz="2800" dirty="0" err="1" smtClean="0"/>
+              <a:t>brkga</a:t>
+            </a:r>
+            <a:r>
+              <a:rPr lang="es-ES" sz="2800" dirty="0" smtClean="0"/>
+              <a:t> que genere buenos resultados sin depender de las búsquedas locales.</a:t>
+            </a:r>
+          </a:p>
+          <a:p>
+            <a:pPr lvl="1">
+              <a:buFont typeface="Wingdings" pitchFamily="2" charset="2"/>
+              <a:buChar char="§"/>
+            </a:pPr>
+            <a:r>
+              <a:rPr lang="es-ES" sz="2000" dirty="0" smtClean="0"/>
+              <a:t>Si no existe se podría decir que el </a:t>
+            </a:r>
+            <a:r>
+              <a:rPr lang="es-ES" sz="2000" dirty="0" err="1" smtClean="0"/>
+              <a:t>brkga</a:t>
+            </a:r>
+            <a:r>
+              <a:rPr lang="es-ES" sz="2000" dirty="0" smtClean="0"/>
+              <a:t> no es bueno para TOP</a:t>
+            </a:r>
+            <a:endParaRPr lang="es-ES" sz="2000" dirty="0" smtClean="0"/>
           </a:p>
           <a:p>
             <a:pPr lvl="1"/>
@@ -6519,7 +7733,7 @@
 </p:sld>
 </file>
 
-<file path=ppt/slides/slide21.xml><?xml version="1.0" encoding="utf-8"?>
+<file path=ppt/slides/slide26.xml><?xml version="1.0" encoding="utf-8"?>
 <p:sld xmlns:a="http://schemas.openxmlformats.org/drawingml/2006/main" xmlns:r="http://schemas.openxmlformats.org/officeDocument/2006/relationships" xmlns:p="http://schemas.openxmlformats.org/presentationml/2006/main">
   <p:cSld>
     <p:spTree>

</xml_diff>